<commit_message>
Fnc ptr presentation 2
</commit_message>
<xml_diff>
--- a/FunctionPointer/Function Pointers proviz.pptx
+++ b/FunctionPointer/Function Pointers proviz.pptx
@@ -5,7 +5,7 @@
     <p:sldMasterId id="2147483659" r:id="rId1"/>
   </p:sldMasterIdLst>
   <p:notesMasterIdLst>
-    <p:notesMasterId r:id="rId12"/>
+    <p:notesMasterId r:id="rId14"/>
   </p:notesMasterIdLst>
   <p:sldIdLst>
     <p:sldId id="256" r:id="rId2"/>
@@ -16,22 +16,24 @@
     <p:sldId id="259" r:id="rId7"/>
     <p:sldId id="270" r:id="rId8"/>
     <p:sldId id="271" r:id="rId9"/>
-    <p:sldId id="265" r:id="rId10"/>
-    <p:sldId id="266" r:id="rId11"/>
+    <p:sldId id="272" r:id="rId10"/>
+    <p:sldId id="273" r:id="rId11"/>
+    <p:sldId id="265" r:id="rId12"/>
+    <p:sldId id="266" r:id="rId13"/>
   </p:sldIdLst>
   <p:sldSz cx="9144000" cy="5143500" type="screen16x9"/>
   <p:notesSz cx="6858000" cy="9144000"/>
   <p:embeddedFontLst>
     <p:embeddedFont>
       <p:font typeface="Proxima Nova" panose="020B0604020202020204" charset="0"/>
-      <p:regular r:id="rId13"/>
-      <p:bold r:id="rId14"/>
-      <p:italic r:id="rId15"/>
-      <p:boldItalic r:id="rId16"/>
+      <p:regular r:id="rId15"/>
+      <p:bold r:id="rId16"/>
+      <p:italic r:id="rId17"/>
+      <p:boldItalic r:id="rId18"/>
     </p:embeddedFont>
     <p:embeddedFont>
       <p:font typeface="Proxima Nova Extrabold" panose="020B0604020202020204" charset="0"/>
-      <p:bold r:id="rId17"/>
+      <p:bold r:id="rId19"/>
     </p:embeddedFont>
   </p:embeddedFontLst>
   <p:defaultTextStyle>
@@ -832,6 +834,219 @@
   <p:cSld>
     <p:spTree>
       <p:nvGrpSpPr>
+        <p:cNvPr id="1" name="Shape 68"/>
+        <p:cNvGrpSpPr/>
+        <p:nvPr/>
+      </p:nvGrpSpPr>
+      <p:grpSpPr>
+        <a:xfrm>
+          <a:off x="0" y="0"/>
+          <a:ext cx="0" cy="0"/>
+          <a:chOff x="0" y="0"/>
+          <a:chExt cx="0" cy="0"/>
+        </a:xfrm>
+      </p:grpSpPr>
+      <p:sp>
+        <p:nvSpPr>
+          <p:cNvPr id="69" name="Google Shape;69;ge35dfbd706_0_27:notes"/>
+          <p:cNvSpPr>
+            <a:spLocks noGrp="1" noRot="1" noChangeAspect="1"/>
+          </p:cNvSpPr>
+          <p:nvPr>
+            <p:ph type="sldImg" idx="2"/>
+          </p:nvPr>
+        </p:nvSpPr>
+        <p:spPr>
+          <a:xfrm>
+            <a:off x="381000" y="685800"/>
+            <a:ext cx="6096000" cy="3429000"/>
+          </a:xfrm>
+          <a:custGeom>
+            <a:avLst/>
+            <a:gdLst/>
+            <a:ahLst/>
+            <a:cxnLst/>
+            <a:rect l="l" t="t" r="r" b="b"/>
+            <a:pathLst>
+              <a:path w="120000" h="120000" extrusionOk="0">
+                <a:moveTo>
+                  <a:pt x="0" y="0"/>
+                </a:moveTo>
+                <a:lnTo>
+                  <a:pt x="120000" y="0"/>
+                </a:lnTo>
+                <a:lnTo>
+                  <a:pt x="120000" y="120000"/>
+                </a:lnTo>
+                <a:lnTo>
+                  <a:pt x="0" y="120000"/>
+                </a:lnTo>
+                <a:close/>
+              </a:path>
+            </a:pathLst>
+          </a:custGeom>
+        </p:spPr>
+      </p:sp>
+      <p:sp>
+        <p:nvSpPr>
+          <p:cNvPr id="70" name="Google Shape;70;ge35dfbd706_0_27:notes"/>
+          <p:cNvSpPr txBox="1">
+            <a:spLocks noGrp="1"/>
+          </p:cNvSpPr>
+          <p:nvPr>
+            <p:ph type="body" idx="1"/>
+          </p:nvPr>
+        </p:nvSpPr>
+        <p:spPr>
+          <a:xfrm>
+            <a:off x="685800" y="4343400"/>
+            <a:ext cx="5486400" cy="4114800"/>
+          </a:xfrm>
+          <a:prstGeom prst="rect">
+            <a:avLst/>
+          </a:prstGeom>
+        </p:spPr>
+        <p:txBody>
+          <a:bodyPr spcFirstLastPara="1" wrap="square" lIns="91425" tIns="91425" rIns="91425" bIns="91425" anchor="t" anchorCtr="0">
+            <a:noAutofit/>
+          </a:bodyPr>
+          <a:lstStyle/>
+          <a:p>
+            <a:pPr marL="0" lvl="0" indent="0" algn="l" rtl="0">
+              <a:spcBef>
+                <a:spcPts val="0"/>
+              </a:spcBef>
+              <a:spcAft>
+                <a:spcPts val="0"/>
+              </a:spcAft>
+              <a:buNone/>
+            </a:pPr>
+            <a:endParaRPr/>
+          </a:p>
+        </p:txBody>
+      </p:sp>
+    </p:spTree>
+    <p:extLst>
+      <p:ext uri="{BB962C8B-B14F-4D97-AF65-F5344CB8AC3E}">
+        <p14:creationId xmlns:p14="http://schemas.microsoft.com/office/powerpoint/2010/main" val="2303714926"/>
+      </p:ext>
+    </p:extLst>
+  </p:cSld>
+  <p:clrMapOvr>
+    <a:masterClrMapping/>
+  </p:clrMapOvr>
+</p:notes>
+</file>
+
+<file path=ppt/notesSlides/notesSlide11.xml><?xml version="1.0" encoding="utf-8"?>
+<p:notes xmlns:a="http://schemas.openxmlformats.org/drawingml/2006/main" xmlns:r="http://schemas.openxmlformats.org/officeDocument/2006/relationships" xmlns:p="http://schemas.openxmlformats.org/presentationml/2006/main" showMasterSp="0" showMasterPhAnim="0">
+  <p:cSld>
+    <p:spTree>
+      <p:nvGrpSpPr>
+        <p:cNvPr id="1" name="Shape 134"/>
+        <p:cNvGrpSpPr/>
+        <p:nvPr/>
+      </p:nvGrpSpPr>
+      <p:grpSpPr>
+        <a:xfrm>
+          <a:off x="0" y="0"/>
+          <a:ext cx="0" cy="0"/>
+          <a:chOff x="0" y="0"/>
+          <a:chExt cx="0" cy="0"/>
+        </a:xfrm>
+      </p:grpSpPr>
+      <p:sp>
+        <p:nvSpPr>
+          <p:cNvPr id="135" name="Google Shape;135;gb576238e23_0_19:notes"/>
+          <p:cNvSpPr>
+            <a:spLocks noGrp="1" noRot="1" noChangeAspect="1"/>
+          </p:cNvSpPr>
+          <p:nvPr>
+            <p:ph type="sldImg" idx="2"/>
+          </p:nvPr>
+        </p:nvSpPr>
+        <p:spPr>
+          <a:xfrm>
+            <a:off x="381000" y="685800"/>
+            <a:ext cx="6096000" cy="3429000"/>
+          </a:xfrm>
+          <a:custGeom>
+            <a:avLst/>
+            <a:gdLst/>
+            <a:ahLst/>
+            <a:cxnLst/>
+            <a:rect l="l" t="t" r="r" b="b"/>
+            <a:pathLst>
+              <a:path w="120000" h="120000" extrusionOk="0">
+                <a:moveTo>
+                  <a:pt x="0" y="0"/>
+                </a:moveTo>
+                <a:lnTo>
+                  <a:pt x="120000" y="0"/>
+                </a:lnTo>
+                <a:lnTo>
+                  <a:pt x="120000" y="120000"/>
+                </a:lnTo>
+                <a:lnTo>
+                  <a:pt x="0" y="120000"/>
+                </a:lnTo>
+                <a:close/>
+              </a:path>
+            </a:pathLst>
+          </a:custGeom>
+        </p:spPr>
+      </p:sp>
+      <p:sp>
+        <p:nvSpPr>
+          <p:cNvPr id="136" name="Google Shape;136;gb576238e23_0_19:notes"/>
+          <p:cNvSpPr txBox="1">
+            <a:spLocks noGrp="1"/>
+          </p:cNvSpPr>
+          <p:nvPr>
+            <p:ph type="body" idx="1"/>
+          </p:nvPr>
+        </p:nvSpPr>
+        <p:spPr>
+          <a:xfrm>
+            <a:off x="685800" y="4343400"/>
+            <a:ext cx="5486400" cy="4114800"/>
+          </a:xfrm>
+          <a:prstGeom prst="rect">
+            <a:avLst/>
+          </a:prstGeom>
+        </p:spPr>
+        <p:txBody>
+          <a:bodyPr spcFirstLastPara="1" wrap="square" lIns="91425" tIns="91425" rIns="91425" bIns="91425" anchor="t" anchorCtr="0">
+            <a:noAutofit/>
+          </a:bodyPr>
+          <a:lstStyle/>
+          <a:p>
+            <a:pPr marL="0" lvl="0" indent="0" algn="l" rtl="0">
+              <a:spcBef>
+                <a:spcPts val="0"/>
+              </a:spcBef>
+              <a:spcAft>
+                <a:spcPts val="0"/>
+              </a:spcAft>
+              <a:buNone/>
+            </a:pPr>
+            <a:endParaRPr/>
+          </a:p>
+        </p:txBody>
+      </p:sp>
+    </p:spTree>
+  </p:cSld>
+  <p:clrMapOvr>
+    <a:masterClrMapping/>
+  </p:clrMapOvr>
+</p:notes>
+</file>
+
+<file path=ppt/notesSlides/notesSlide12.xml><?xml version="1.0" encoding="utf-8"?>
+<p:notes xmlns:a="http://schemas.openxmlformats.org/drawingml/2006/main" xmlns:r="http://schemas.openxmlformats.org/officeDocument/2006/relationships" xmlns:p="http://schemas.openxmlformats.org/presentationml/2006/main" showMasterSp="0" showMasterPhAnim="0">
+  <p:cSld>
+    <p:spTree>
+      <p:nvGrpSpPr>
         <p:cNvPr id="1" name="Shape 144"/>
         <p:cNvGrpSpPr/>
         <p:nvPr/>
@@ -1684,7 +1899,7 @@
   <p:cSld>
     <p:spTree>
       <p:nvGrpSpPr>
-        <p:cNvPr id="1" name="Shape 134"/>
+        <p:cNvPr id="1" name="Shape 68"/>
         <p:cNvGrpSpPr/>
         <p:nvPr/>
       </p:nvGrpSpPr>
@@ -1698,7 +1913,7 @@
       </p:grpSpPr>
       <p:sp>
         <p:nvSpPr>
-          <p:cNvPr id="135" name="Google Shape;135;gb576238e23_0_19:notes"/>
+          <p:cNvPr id="69" name="Google Shape;69;ge35dfbd706_0_27:notes"/>
           <p:cNvSpPr>
             <a:spLocks noGrp="1" noRot="1" noChangeAspect="1"/>
           </p:cNvSpPr>
@@ -1739,7 +1954,7 @@
       </p:sp>
       <p:sp>
         <p:nvSpPr>
-          <p:cNvPr id="136" name="Google Shape;136;gb576238e23_0_19:notes"/>
+          <p:cNvPr id="70" name="Google Shape;70;ge35dfbd706_0_27:notes"/>
           <p:cNvSpPr txBox="1">
             <a:spLocks noGrp="1"/>
           </p:cNvSpPr>
@@ -1776,6 +1991,11 @@
         </p:txBody>
       </p:sp>
     </p:spTree>
+    <p:extLst>
+      <p:ext uri="{BB962C8B-B14F-4D97-AF65-F5344CB8AC3E}">
+        <p14:creationId xmlns:p14="http://schemas.microsoft.com/office/powerpoint/2010/main" val="3008367328"/>
+      </p:ext>
+    </p:extLst>
   </p:cSld>
   <p:clrMapOvr>
     <a:masterClrMapping/>
@@ -2173,370 +2393,6 @@
 </file>
 
 <file path=ppt/slideLayouts/slideLayout10.xml><?xml version="1.0" encoding="utf-8"?>
-<p:sldLayout xmlns:a="http://schemas.openxmlformats.org/drawingml/2006/main" xmlns:r="http://schemas.openxmlformats.org/officeDocument/2006/relationships" xmlns:p="http://schemas.openxmlformats.org/presentationml/2006/main" matchingName="Big number">
-  <p:cSld name="BIG_NUMBER">
-    <p:spTree>
-      <p:nvGrpSpPr>
-        <p:cNvPr id="1" name="Shape 44"/>
-        <p:cNvGrpSpPr/>
-        <p:nvPr/>
-      </p:nvGrpSpPr>
-      <p:grpSpPr>
-        <a:xfrm>
-          <a:off x="0" y="0"/>
-          <a:ext cx="0" cy="0"/>
-          <a:chOff x="0" y="0"/>
-          <a:chExt cx="0" cy="0"/>
-        </a:xfrm>
-      </p:grpSpPr>
-      <p:sp>
-        <p:nvSpPr>
-          <p:cNvPr id="45" name="Google Shape;45;p11"/>
-          <p:cNvSpPr txBox="1">
-            <a:spLocks noGrp="1"/>
-          </p:cNvSpPr>
-          <p:nvPr>
-            <p:ph type="title" hasCustomPrompt="1"/>
-          </p:nvPr>
-        </p:nvSpPr>
-        <p:spPr>
-          <a:xfrm>
-            <a:off x="311700" y="1106125"/>
-            <a:ext cx="8520600" cy="1963500"/>
-          </a:xfrm>
-          <a:prstGeom prst="rect">
-            <a:avLst/>
-          </a:prstGeom>
-        </p:spPr>
-        <p:txBody>
-          <a:bodyPr spcFirstLastPara="1" wrap="square" lIns="91425" tIns="91425" rIns="91425" bIns="91425" anchor="b" anchorCtr="0">
-            <a:normAutofit/>
-          </a:bodyPr>
-          <a:lstStyle>
-            <a:lvl1pPr lvl="0" algn="ctr">
-              <a:spcBef>
-                <a:spcPts val="0"/>
-              </a:spcBef>
-              <a:spcAft>
-                <a:spcPts val="0"/>
-              </a:spcAft>
-              <a:buSzPts val="12000"/>
-              <a:buNone/>
-              <a:defRPr sz="12000"/>
-            </a:lvl1pPr>
-            <a:lvl2pPr lvl="1" algn="ctr">
-              <a:spcBef>
-                <a:spcPts val="0"/>
-              </a:spcBef>
-              <a:spcAft>
-                <a:spcPts val="0"/>
-              </a:spcAft>
-              <a:buSzPts val="12000"/>
-              <a:buNone/>
-              <a:defRPr sz="12000"/>
-            </a:lvl2pPr>
-            <a:lvl3pPr lvl="2" algn="ctr">
-              <a:spcBef>
-                <a:spcPts val="0"/>
-              </a:spcBef>
-              <a:spcAft>
-                <a:spcPts val="0"/>
-              </a:spcAft>
-              <a:buSzPts val="12000"/>
-              <a:buNone/>
-              <a:defRPr sz="12000"/>
-            </a:lvl3pPr>
-            <a:lvl4pPr lvl="3" algn="ctr">
-              <a:spcBef>
-                <a:spcPts val="0"/>
-              </a:spcBef>
-              <a:spcAft>
-                <a:spcPts val="0"/>
-              </a:spcAft>
-              <a:buSzPts val="12000"/>
-              <a:buNone/>
-              <a:defRPr sz="12000"/>
-            </a:lvl4pPr>
-            <a:lvl5pPr lvl="4" algn="ctr">
-              <a:spcBef>
-                <a:spcPts val="0"/>
-              </a:spcBef>
-              <a:spcAft>
-                <a:spcPts val="0"/>
-              </a:spcAft>
-              <a:buSzPts val="12000"/>
-              <a:buNone/>
-              <a:defRPr sz="12000"/>
-            </a:lvl5pPr>
-            <a:lvl6pPr lvl="5" algn="ctr">
-              <a:spcBef>
-                <a:spcPts val="0"/>
-              </a:spcBef>
-              <a:spcAft>
-                <a:spcPts val="0"/>
-              </a:spcAft>
-              <a:buSzPts val="12000"/>
-              <a:buNone/>
-              <a:defRPr sz="12000"/>
-            </a:lvl6pPr>
-            <a:lvl7pPr lvl="6" algn="ctr">
-              <a:spcBef>
-                <a:spcPts val="0"/>
-              </a:spcBef>
-              <a:spcAft>
-                <a:spcPts val="0"/>
-              </a:spcAft>
-              <a:buSzPts val="12000"/>
-              <a:buNone/>
-              <a:defRPr sz="12000"/>
-            </a:lvl7pPr>
-            <a:lvl8pPr lvl="7" algn="ctr">
-              <a:spcBef>
-                <a:spcPts val="0"/>
-              </a:spcBef>
-              <a:spcAft>
-                <a:spcPts val="0"/>
-              </a:spcAft>
-              <a:buSzPts val="12000"/>
-              <a:buNone/>
-              <a:defRPr sz="12000"/>
-            </a:lvl8pPr>
-            <a:lvl9pPr lvl="8" algn="ctr">
-              <a:spcBef>
-                <a:spcPts val="0"/>
-              </a:spcBef>
-              <a:spcAft>
-                <a:spcPts val="0"/>
-              </a:spcAft>
-              <a:buSzPts val="12000"/>
-              <a:buNone/>
-              <a:defRPr sz="12000"/>
-            </a:lvl9pPr>
-          </a:lstStyle>
-          <a:p>
-            <a:r>
-              <a:t>xx%</a:t>
-            </a:r>
-          </a:p>
-        </p:txBody>
-      </p:sp>
-      <p:sp>
-        <p:nvSpPr>
-          <p:cNvPr id="46" name="Google Shape;46;p11"/>
-          <p:cNvSpPr txBox="1">
-            <a:spLocks noGrp="1"/>
-          </p:cNvSpPr>
-          <p:nvPr>
-            <p:ph type="body" idx="1"/>
-          </p:nvPr>
-        </p:nvSpPr>
-        <p:spPr>
-          <a:xfrm>
-            <a:off x="311700" y="3152225"/>
-            <a:ext cx="8520600" cy="1300800"/>
-          </a:xfrm>
-          <a:prstGeom prst="rect">
-            <a:avLst/>
-          </a:prstGeom>
-        </p:spPr>
-        <p:txBody>
-          <a:bodyPr spcFirstLastPara="1" wrap="square" lIns="91425" tIns="91425" rIns="91425" bIns="91425" anchor="t" anchorCtr="0">
-            <a:normAutofit/>
-          </a:bodyPr>
-          <a:lstStyle>
-            <a:lvl1pPr marL="457200" lvl="0" indent="-342900" algn="ctr">
-              <a:spcBef>
-                <a:spcPts val="0"/>
-              </a:spcBef>
-              <a:spcAft>
-                <a:spcPts val="0"/>
-              </a:spcAft>
-              <a:buSzPts val="1800"/>
-              <a:buChar char="●"/>
-              <a:defRPr/>
-            </a:lvl1pPr>
-            <a:lvl2pPr marL="914400" lvl="1" indent="-317500" algn="ctr">
-              <a:spcBef>
-                <a:spcPts val="0"/>
-              </a:spcBef>
-              <a:spcAft>
-                <a:spcPts val="0"/>
-              </a:spcAft>
-              <a:buSzPts val="1400"/>
-              <a:buChar char="○"/>
-              <a:defRPr/>
-            </a:lvl2pPr>
-            <a:lvl3pPr marL="1371600" lvl="2" indent="-317500" algn="ctr">
-              <a:spcBef>
-                <a:spcPts val="0"/>
-              </a:spcBef>
-              <a:spcAft>
-                <a:spcPts val="0"/>
-              </a:spcAft>
-              <a:buSzPts val="1400"/>
-              <a:buChar char="■"/>
-              <a:defRPr/>
-            </a:lvl3pPr>
-            <a:lvl4pPr marL="1828800" lvl="3" indent="-317500" algn="ctr">
-              <a:spcBef>
-                <a:spcPts val="0"/>
-              </a:spcBef>
-              <a:spcAft>
-                <a:spcPts val="0"/>
-              </a:spcAft>
-              <a:buSzPts val="1400"/>
-              <a:buChar char="●"/>
-              <a:defRPr/>
-            </a:lvl4pPr>
-            <a:lvl5pPr marL="2286000" lvl="4" indent="-317500" algn="ctr">
-              <a:spcBef>
-                <a:spcPts val="0"/>
-              </a:spcBef>
-              <a:spcAft>
-                <a:spcPts val="0"/>
-              </a:spcAft>
-              <a:buSzPts val="1400"/>
-              <a:buChar char="○"/>
-              <a:defRPr/>
-            </a:lvl5pPr>
-            <a:lvl6pPr marL="2743200" lvl="5" indent="-317500" algn="ctr">
-              <a:spcBef>
-                <a:spcPts val="0"/>
-              </a:spcBef>
-              <a:spcAft>
-                <a:spcPts val="0"/>
-              </a:spcAft>
-              <a:buSzPts val="1400"/>
-              <a:buChar char="■"/>
-              <a:defRPr/>
-            </a:lvl6pPr>
-            <a:lvl7pPr marL="3200400" lvl="6" indent="-317500" algn="ctr">
-              <a:spcBef>
-                <a:spcPts val="0"/>
-              </a:spcBef>
-              <a:spcAft>
-                <a:spcPts val="0"/>
-              </a:spcAft>
-              <a:buSzPts val="1400"/>
-              <a:buChar char="●"/>
-              <a:defRPr/>
-            </a:lvl7pPr>
-            <a:lvl8pPr marL="3657600" lvl="7" indent="-317500" algn="ctr">
-              <a:spcBef>
-                <a:spcPts val="0"/>
-              </a:spcBef>
-              <a:spcAft>
-                <a:spcPts val="0"/>
-              </a:spcAft>
-              <a:buSzPts val="1400"/>
-              <a:buChar char="○"/>
-              <a:defRPr/>
-            </a:lvl8pPr>
-            <a:lvl9pPr marL="4114800" lvl="8" indent="-317500" algn="ctr">
-              <a:spcBef>
-                <a:spcPts val="0"/>
-              </a:spcBef>
-              <a:spcAft>
-                <a:spcPts val="0"/>
-              </a:spcAft>
-              <a:buSzPts val="1400"/>
-              <a:buChar char="■"/>
-              <a:defRPr/>
-            </a:lvl9pPr>
-          </a:lstStyle>
-          <a:p>
-            <a:endParaRPr/>
-          </a:p>
-        </p:txBody>
-      </p:sp>
-      <p:sp>
-        <p:nvSpPr>
-          <p:cNvPr id="47" name="Google Shape;47;p11"/>
-          <p:cNvSpPr txBox="1">
-            <a:spLocks noGrp="1"/>
-          </p:cNvSpPr>
-          <p:nvPr>
-            <p:ph type="sldNum" idx="12"/>
-          </p:nvPr>
-        </p:nvSpPr>
-        <p:spPr>
-          <a:xfrm>
-            <a:off x="8472458" y="4663217"/>
-            <a:ext cx="548700" cy="393600"/>
-          </a:xfrm>
-          <a:prstGeom prst="rect">
-            <a:avLst/>
-          </a:prstGeom>
-        </p:spPr>
-        <p:txBody>
-          <a:bodyPr spcFirstLastPara="1" wrap="square" lIns="91425" tIns="91425" rIns="91425" bIns="91425" anchor="ctr" anchorCtr="0">
-            <a:normAutofit/>
-          </a:bodyPr>
-          <a:lstStyle>
-            <a:lvl1pPr lvl="0">
-              <a:buNone/>
-              <a:defRPr/>
-            </a:lvl1pPr>
-            <a:lvl2pPr lvl="1">
-              <a:buNone/>
-              <a:defRPr/>
-            </a:lvl2pPr>
-            <a:lvl3pPr lvl="2">
-              <a:buNone/>
-              <a:defRPr/>
-            </a:lvl3pPr>
-            <a:lvl4pPr lvl="3">
-              <a:buNone/>
-              <a:defRPr/>
-            </a:lvl4pPr>
-            <a:lvl5pPr lvl="4">
-              <a:buNone/>
-              <a:defRPr/>
-            </a:lvl5pPr>
-            <a:lvl6pPr lvl="5">
-              <a:buNone/>
-              <a:defRPr/>
-            </a:lvl6pPr>
-            <a:lvl7pPr lvl="6">
-              <a:buNone/>
-              <a:defRPr/>
-            </a:lvl7pPr>
-            <a:lvl8pPr lvl="7">
-              <a:buNone/>
-              <a:defRPr/>
-            </a:lvl8pPr>
-            <a:lvl9pPr lvl="8">
-              <a:buNone/>
-              <a:defRPr/>
-            </a:lvl9pPr>
-          </a:lstStyle>
-          <a:p>
-            <a:pPr marL="0" lvl="0" indent="0" algn="r" rtl="0">
-              <a:spcBef>
-                <a:spcPts val="0"/>
-              </a:spcBef>
-              <a:spcAft>
-                <a:spcPts val="0"/>
-              </a:spcAft>
-              <a:buNone/>
-            </a:pPr>
-            <a:fld id="{00000000-1234-1234-1234-123412341234}" type="slidenum">
-              <a:rPr lang="en"/>
-              <a:t>‹#›</a:t>
-            </a:fld>
-            <a:endParaRPr/>
-          </a:p>
-        </p:txBody>
-      </p:sp>
-    </p:spTree>
-  </p:cSld>
-  <p:clrMapOvr>
-    <a:masterClrMapping/>
-  </p:clrMapOvr>
-</p:sldLayout>
-</file>
-
-<file path=ppt/slideLayouts/slideLayout11.xml><?xml version="1.0" encoding="utf-8"?>
 <p:sldLayout xmlns:a="http://schemas.openxmlformats.org/drawingml/2006/main" xmlns:r="http://schemas.openxmlformats.org/officeDocument/2006/relationships" xmlns:p="http://schemas.openxmlformats.org/presentationml/2006/main" matchingName="Blank" type="blank">
   <p:cSld name="BLANK">
     <p:spTree>
@@ -2641,239 +2497,6 @@
 </file>
 
 <file path=ppt/slideLayouts/slideLayout2.xml><?xml version="1.0" encoding="utf-8"?>
-<p:sldLayout xmlns:a="http://schemas.openxmlformats.org/drawingml/2006/main" xmlns:r="http://schemas.openxmlformats.org/officeDocument/2006/relationships" xmlns:p="http://schemas.openxmlformats.org/presentationml/2006/main" matchingName="Section header" type="secHead">
-  <p:cSld name="SECTION_HEADER">
-    <p:spTree>
-      <p:nvGrpSpPr>
-        <p:cNvPr id="1" name="Shape 13"/>
-        <p:cNvGrpSpPr/>
-        <p:nvPr/>
-      </p:nvGrpSpPr>
-      <p:grpSpPr>
-        <a:xfrm>
-          <a:off x="0" y="0"/>
-          <a:ext cx="0" cy="0"/>
-          <a:chOff x="0" y="0"/>
-          <a:chExt cx="0" cy="0"/>
-        </a:xfrm>
-      </p:grpSpPr>
-      <p:sp>
-        <p:nvSpPr>
-          <p:cNvPr id="14" name="Google Shape;14;p3"/>
-          <p:cNvSpPr txBox="1">
-            <a:spLocks noGrp="1"/>
-          </p:cNvSpPr>
-          <p:nvPr>
-            <p:ph type="title"/>
-          </p:nvPr>
-        </p:nvSpPr>
-        <p:spPr>
-          <a:xfrm>
-            <a:off x="311700" y="2150850"/>
-            <a:ext cx="8520600" cy="841800"/>
-          </a:xfrm>
-          <a:prstGeom prst="rect">
-            <a:avLst/>
-          </a:prstGeom>
-        </p:spPr>
-        <p:txBody>
-          <a:bodyPr spcFirstLastPara="1" wrap="square" lIns="91425" tIns="91425" rIns="91425" bIns="91425" anchor="ctr" anchorCtr="0">
-            <a:normAutofit/>
-          </a:bodyPr>
-          <a:lstStyle>
-            <a:lvl1pPr lvl="0" algn="ctr">
-              <a:spcBef>
-                <a:spcPts val="0"/>
-              </a:spcBef>
-              <a:spcAft>
-                <a:spcPts val="0"/>
-              </a:spcAft>
-              <a:buSzPts val="3600"/>
-              <a:buNone/>
-              <a:defRPr sz="3600"/>
-            </a:lvl1pPr>
-            <a:lvl2pPr lvl="1" algn="ctr">
-              <a:spcBef>
-                <a:spcPts val="0"/>
-              </a:spcBef>
-              <a:spcAft>
-                <a:spcPts val="0"/>
-              </a:spcAft>
-              <a:buSzPts val="3600"/>
-              <a:buNone/>
-              <a:defRPr sz="3600"/>
-            </a:lvl2pPr>
-            <a:lvl3pPr lvl="2" algn="ctr">
-              <a:spcBef>
-                <a:spcPts val="0"/>
-              </a:spcBef>
-              <a:spcAft>
-                <a:spcPts val="0"/>
-              </a:spcAft>
-              <a:buSzPts val="3600"/>
-              <a:buNone/>
-              <a:defRPr sz="3600"/>
-            </a:lvl3pPr>
-            <a:lvl4pPr lvl="3" algn="ctr">
-              <a:spcBef>
-                <a:spcPts val="0"/>
-              </a:spcBef>
-              <a:spcAft>
-                <a:spcPts val="0"/>
-              </a:spcAft>
-              <a:buSzPts val="3600"/>
-              <a:buNone/>
-              <a:defRPr sz="3600"/>
-            </a:lvl4pPr>
-            <a:lvl5pPr lvl="4" algn="ctr">
-              <a:spcBef>
-                <a:spcPts val="0"/>
-              </a:spcBef>
-              <a:spcAft>
-                <a:spcPts val="0"/>
-              </a:spcAft>
-              <a:buSzPts val="3600"/>
-              <a:buNone/>
-              <a:defRPr sz="3600"/>
-            </a:lvl5pPr>
-            <a:lvl6pPr lvl="5" algn="ctr">
-              <a:spcBef>
-                <a:spcPts val="0"/>
-              </a:spcBef>
-              <a:spcAft>
-                <a:spcPts val="0"/>
-              </a:spcAft>
-              <a:buSzPts val="3600"/>
-              <a:buNone/>
-              <a:defRPr sz="3600"/>
-            </a:lvl6pPr>
-            <a:lvl7pPr lvl="6" algn="ctr">
-              <a:spcBef>
-                <a:spcPts val="0"/>
-              </a:spcBef>
-              <a:spcAft>
-                <a:spcPts val="0"/>
-              </a:spcAft>
-              <a:buSzPts val="3600"/>
-              <a:buNone/>
-              <a:defRPr sz="3600"/>
-            </a:lvl7pPr>
-            <a:lvl8pPr lvl="7" algn="ctr">
-              <a:spcBef>
-                <a:spcPts val="0"/>
-              </a:spcBef>
-              <a:spcAft>
-                <a:spcPts val="0"/>
-              </a:spcAft>
-              <a:buSzPts val="3600"/>
-              <a:buNone/>
-              <a:defRPr sz="3600"/>
-            </a:lvl8pPr>
-            <a:lvl9pPr lvl="8" algn="ctr">
-              <a:spcBef>
-                <a:spcPts val="0"/>
-              </a:spcBef>
-              <a:spcAft>
-                <a:spcPts val="0"/>
-              </a:spcAft>
-              <a:buSzPts val="3600"/>
-              <a:buNone/>
-              <a:defRPr sz="3600"/>
-            </a:lvl9pPr>
-          </a:lstStyle>
-          <a:p>
-            <a:endParaRPr/>
-          </a:p>
-        </p:txBody>
-      </p:sp>
-      <p:sp>
-        <p:nvSpPr>
-          <p:cNvPr id="15" name="Google Shape;15;p3"/>
-          <p:cNvSpPr txBox="1">
-            <a:spLocks noGrp="1"/>
-          </p:cNvSpPr>
-          <p:nvPr>
-            <p:ph type="sldNum" idx="12"/>
-          </p:nvPr>
-        </p:nvSpPr>
-        <p:spPr>
-          <a:xfrm>
-            <a:off x="8472458" y="4663217"/>
-            <a:ext cx="548700" cy="393600"/>
-          </a:xfrm>
-          <a:prstGeom prst="rect">
-            <a:avLst/>
-          </a:prstGeom>
-        </p:spPr>
-        <p:txBody>
-          <a:bodyPr spcFirstLastPara="1" wrap="square" lIns="91425" tIns="91425" rIns="91425" bIns="91425" anchor="ctr" anchorCtr="0">
-            <a:normAutofit/>
-          </a:bodyPr>
-          <a:lstStyle>
-            <a:lvl1pPr lvl="0">
-              <a:buNone/>
-              <a:defRPr/>
-            </a:lvl1pPr>
-            <a:lvl2pPr lvl="1">
-              <a:buNone/>
-              <a:defRPr/>
-            </a:lvl2pPr>
-            <a:lvl3pPr lvl="2">
-              <a:buNone/>
-              <a:defRPr/>
-            </a:lvl3pPr>
-            <a:lvl4pPr lvl="3">
-              <a:buNone/>
-              <a:defRPr/>
-            </a:lvl4pPr>
-            <a:lvl5pPr lvl="4">
-              <a:buNone/>
-              <a:defRPr/>
-            </a:lvl5pPr>
-            <a:lvl6pPr lvl="5">
-              <a:buNone/>
-              <a:defRPr/>
-            </a:lvl6pPr>
-            <a:lvl7pPr lvl="6">
-              <a:buNone/>
-              <a:defRPr/>
-            </a:lvl7pPr>
-            <a:lvl8pPr lvl="7">
-              <a:buNone/>
-              <a:defRPr/>
-            </a:lvl8pPr>
-            <a:lvl9pPr lvl="8">
-              <a:buNone/>
-              <a:defRPr/>
-            </a:lvl9pPr>
-          </a:lstStyle>
-          <a:p>
-            <a:pPr marL="0" lvl="0" indent="0" algn="r" rtl="0">
-              <a:spcBef>
-                <a:spcPts val="0"/>
-              </a:spcBef>
-              <a:spcAft>
-                <a:spcPts val="0"/>
-              </a:spcAft>
-              <a:buNone/>
-            </a:pPr>
-            <a:fld id="{00000000-1234-1234-1234-123412341234}" type="slidenum">
-              <a:rPr lang="en"/>
-              <a:t>‹#›</a:t>
-            </a:fld>
-            <a:endParaRPr/>
-          </a:p>
-        </p:txBody>
-      </p:sp>
-    </p:spTree>
-  </p:cSld>
-  <p:clrMapOvr>
-    <a:masterClrMapping/>
-  </p:clrMapOvr>
-</p:sldLayout>
-</file>
-
-<file path=ppt/slideLayouts/slideLayout3.xml><?xml version="1.0" encoding="utf-8"?>
 <p:sldLayout xmlns:a="http://schemas.openxmlformats.org/drawingml/2006/main" xmlns:r="http://schemas.openxmlformats.org/officeDocument/2006/relationships" xmlns:p="http://schemas.openxmlformats.org/presentationml/2006/main" matchingName="Title and body" type="tx">
   <p:cSld name="TITLE_AND_BODY">
     <p:spTree>
@@ -3235,7 +2858,7 @@
 </p:sldLayout>
 </file>
 
-<file path=ppt/slideLayouts/slideLayout4.xml><?xml version="1.0" encoding="utf-8"?>
+<file path=ppt/slideLayouts/slideLayout3.xml><?xml version="1.0" encoding="utf-8"?>
 <p:sldLayout xmlns:a="http://schemas.openxmlformats.org/drawingml/2006/main" xmlns:r="http://schemas.openxmlformats.org/officeDocument/2006/relationships" xmlns:p="http://schemas.openxmlformats.org/presentationml/2006/main" matchingName="Title and two columns" type="twoColTx">
   <p:cSld name="TITLE_AND_TWO_COLUMNS">
     <p:spTree>
@@ -3726,7 +3349,7 @@
 </p:sldLayout>
 </file>
 
-<file path=ppt/slideLayouts/slideLayout5.xml><?xml version="1.0" encoding="utf-8"?>
+<file path=ppt/slideLayouts/slideLayout4.xml><?xml version="1.0" encoding="utf-8"?>
 <p:sldLayout xmlns:a="http://schemas.openxmlformats.org/drawingml/2006/main" xmlns:r="http://schemas.openxmlformats.org/officeDocument/2006/relationships" xmlns:p="http://schemas.openxmlformats.org/presentationml/2006/main" matchingName="Title only" type="titleOnly">
   <p:cSld name="TITLE_ONLY">
     <p:spTree>
@@ -3959,7 +3582,7 @@
 </p:sldLayout>
 </file>
 
-<file path=ppt/slideLayouts/slideLayout6.xml><?xml version="1.0" encoding="utf-8"?>
+<file path=ppt/slideLayouts/slideLayout5.xml><?xml version="1.0" encoding="utf-8"?>
 <p:sldLayout xmlns:a="http://schemas.openxmlformats.org/drawingml/2006/main" xmlns:r="http://schemas.openxmlformats.org/officeDocument/2006/relationships" xmlns:p="http://schemas.openxmlformats.org/presentationml/2006/main" matchingName="One column text">
   <p:cSld name="ONE_COLUMN_TEXT">
     <p:spTree>
@@ -4321,7 +3944,7 @@
 </p:sldLayout>
 </file>
 
-<file path=ppt/slideLayouts/slideLayout7.xml><?xml version="1.0" encoding="utf-8"?>
+<file path=ppt/slideLayouts/slideLayout6.xml><?xml version="1.0" encoding="utf-8"?>
 <p:sldLayout xmlns:a="http://schemas.openxmlformats.org/drawingml/2006/main" xmlns:r="http://schemas.openxmlformats.org/officeDocument/2006/relationships" xmlns:p="http://schemas.openxmlformats.org/presentationml/2006/main" matchingName="Main point">
   <p:cSld name="MAIN_POINT">
     <p:spTree>
@@ -4554,7 +4177,7 @@
 </p:sldLayout>
 </file>
 
-<file path=ppt/slideLayouts/slideLayout8.xml><?xml version="1.0" encoding="utf-8"?>
+<file path=ppt/slideLayouts/slideLayout7.xml><?xml version="1.0" encoding="utf-8"?>
 <p:sldLayout xmlns:a="http://schemas.openxmlformats.org/drawingml/2006/main" xmlns:r="http://schemas.openxmlformats.org/officeDocument/2006/relationships" xmlns:p="http://schemas.openxmlformats.org/presentationml/2006/main" matchingName="Section title and description">
   <p:cSld name="SECTION_TITLE_AND_DESCRIPTION">
     <p:spTree>
@@ -5112,7 +4735,7 @@
 </p:sldLayout>
 </file>
 
-<file path=ppt/slideLayouts/slideLayout9.xml><?xml version="1.0" encoding="utf-8"?>
+<file path=ppt/slideLayouts/slideLayout8.xml><?xml version="1.0" encoding="utf-8"?>
 <p:sldLayout xmlns:a="http://schemas.openxmlformats.org/drawingml/2006/main" xmlns:r="http://schemas.openxmlformats.org/officeDocument/2006/relationships" xmlns:p="http://schemas.openxmlformats.org/presentationml/2006/main" matchingName="Caption">
   <p:cSld name="CAPTION_ONLY">
     <p:spTree>
@@ -5176,6 +4799,370 @@
       <p:sp>
         <p:nvSpPr>
           <p:cNvPr id="43" name="Google Shape;43;p10"/>
+          <p:cNvSpPr txBox="1">
+            <a:spLocks noGrp="1"/>
+          </p:cNvSpPr>
+          <p:nvPr>
+            <p:ph type="sldNum" idx="12"/>
+          </p:nvPr>
+        </p:nvSpPr>
+        <p:spPr>
+          <a:xfrm>
+            <a:off x="8472458" y="4663217"/>
+            <a:ext cx="548700" cy="393600"/>
+          </a:xfrm>
+          <a:prstGeom prst="rect">
+            <a:avLst/>
+          </a:prstGeom>
+        </p:spPr>
+        <p:txBody>
+          <a:bodyPr spcFirstLastPara="1" wrap="square" lIns="91425" tIns="91425" rIns="91425" bIns="91425" anchor="ctr" anchorCtr="0">
+            <a:normAutofit/>
+          </a:bodyPr>
+          <a:lstStyle>
+            <a:lvl1pPr lvl="0">
+              <a:buNone/>
+              <a:defRPr/>
+            </a:lvl1pPr>
+            <a:lvl2pPr lvl="1">
+              <a:buNone/>
+              <a:defRPr/>
+            </a:lvl2pPr>
+            <a:lvl3pPr lvl="2">
+              <a:buNone/>
+              <a:defRPr/>
+            </a:lvl3pPr>
+            <a:lvl4pPr lvl="3">
+              <a:buNone/>
+              <a:defRPr/>
+            </a:lvl4pPr>
+            <a:lvl5pPr lvl="4">
+              <a:buNone/>
+              <a:defRPr/>
+            </a:lvl5pPr>
+            <a:lvl6pPr lvl="5">
+              <a:buNone/>
+              <a:defRPr/>
+            </a:lvl6pPr>
+            <a:lvl7pPr lvl="6">
+              <a:buNone/>
+              <a:defRPr/>
+            </a:lvl7pPr>
+            <a:lvl8pPr lvl="7">
+              <a:buNone/>
+              <a:defRPr/>
+            </a:lvl8pPr>
+            <a:lvl9pPr lvl="8">
+              <a:buNone/>
+              <a:defRPr/>
+            </a:lvl9pPr>
+          </a:lstStyle>
+          <a:p>
+            <a:pPr marL="0" lvl="0" indent="0" algn="r" rtl="0">
+              <a:spcBef>
+                <a:spcPts val="0"/>
+              </a:spcBef>
+              <a:spcAft>
+                <a:spcPts val="0"/>
+              </a:spcAft>
+              <a:buNone/>
+            </a:pPr>
+            <a:fld id="{00000000-1234-1234-1234-123412341234}" type="slidenum">
+              <a:rPr lang="en"/>
+              <a:t>‹#›</a:t>
+            </a:fld>
+            <a:endParaRPr/>
+          </a:p>
+        </p:txBody>
+      </p:sp>
+    </p:spTree>
+  </p:cSld>
+  <p:clrMapOvr>
+    <a:masterClrMapping/>
+  </p:clrMapOvr>
+</p:sldLayout>
+</file>
+
+<file path=ppt/slideLayouts/slideLayout9.xml><?xml version="1.0" encoding="utf-8"?>
+<p:sldLayout xmlns:a="http://schemas.openxmlformats.org/drawingml/2006/main" xmlns:r="http://schemas.openxmlformats.org/officeDocument/2006/relationships" xmlns:p="http://schemas.openxmlformats.org/presentationml/2006/main" matchingName="Big number">
+  <p:cSld name="BIG_NUMBER">
+    <p:spTree>
+      <p:nvGrpSpPr>
+        <p:cNvPr id="1" name="Shape 44"/>
+        <p:cNvGrpSpPr/>
+        <p:nvPr/>
+      </p:nvGrpSpPr>
+      <p:grpSpPr>
+        <a:xfrm>
+          <a:off x="0" y="0"/>
+          <a:ext cx="0" cy="0"/>
+          <a:chOff x="0" y="0"/>
+          <a:chExt cx="0" cy="0"/>
+        </a:xfrm>
+      </p:grpSpPr>
+      <p:sp>
+        <p:nvSpPr>
+          <p:cNvPr id="45" name="Google Shape;45;p11"/>
+          <p:cNvSpPr txBox="1">
+            <a:spLocks noGrp="1"/>
+          </p:cNvSpPr>
+          <p:nvPr>
+            <p:ph type="title" hasCustomPrompt="1"/>
+          </p:nvPr>
+        </p:nvSpPr>
+        <p:spPr>
+          <a:xfrm>
+            <a:off x="311700" y="1106125"/>
+            <a:ext cx="8520600" cy="1963500"/>
+          </a:xfrm>
+          <a:prstGeom prst="rect">
+            <a:avLst/>
+          </a:prstGeom>
+        </p:spPr>
+        <p:txBody>
+          <a:bodyPr spcFirstLastPara="1" wrap="square" lIns="91425" tIns="91425" rIns="91425" bIns="91425" anchor="b" anchorCtr="0">
+            <a:normAutofit/>
+          </a:bodyPr>
+          <a:lstStyle>
+            <a:lvl1pPr lvl="0" algn="ctr">
+              <a:spcBef>
+                <a:spcPts val="0"/>
+              </a:spcBef>
+              <a:spcAft>
+                <a:spcPts val="0"/>
+              </a:spcAft>
+              <a:buSzPts val="12000"/>
+              <a:buNone/>
+              <a:defRPr sz="12000"/>
+            </a:lvl1pPr>
+            <a:lvl2pPr lvl="1" algn="ctr">
+              <a:spcBef>
+                <a:spcPts val="0"/>
+              </a:spcBef>
+              <a:spcAft>
+                <a:spcPts val="0"/>
+              </a:spcAft>
+              <a:buSzPts val="12000"/>
+              <a:buNone/>
+              <a:defRPr sz="12000"/>
+            </a:lvl2pPr>
+            <a:lvl3pPr lvl="2" algn="ctr">
+              <a:spcBef>
+                <a:spcPts val="0"/>
+              </a:spcBef>
+              <a:spcAft>
+                <a:spcPts val="0"/>
+              </a:spcAft>
+              <a:buSzPts val="12000"/>
+              <a:buNone/>
+              <a:defRPr sz="12000"/>
+            </a:lvl3pPr>
+            <a:lvl4pPr lvl="3" algn="ctr">
+              <a:spcBef>
+                <a:spcPts val="0"/>
+              </a:spcBef>
+              <a:spcAft>
+                <a:spcPts val="0"/>
+              </a:spcAft>
+              <a:buSzPts val="12000"/>
+              <a:buNone/>
+              <a:defRPr sz="12000"/>
+            </a:lvl4pPr>
+            <a:lvl5pPr lvl="4" algn="ctr">
+              <a:spcBef>
+                <a:spcPts val="0"/>
+              </a:spcBef>
+              <a:spcAft>
+                <a:spcPts val="0"/>
+              </a:spcAft>
+              <a:buSzPts val="12000"/>
+              <a:buNone/>
+              <a:defRPr sz="12000"/>
+            </a:lvl5pPr>
+            <a:lvl6pPr lvl="5" algn="ctr">
+              <a:spcBef>
+                <a:spcPts val="0"/>
+              </a:spcBef>
+              <a:spcAft>
+                <a:spcPts val="0"/>
+              </a:spcAft>
+              <a:buSzPts val="12000"/>
+              <a:buNone/>
+              <a:defRPr sz="12000"/>
+            </a:lvl6pPr>
+            <a:lvl7pPr lvl="6" algn="ctr">
+              <a:spcBef>
+                <a:spcPts val="0"/>
+              </a:spcBef>
+              <a:spcAft>
+                <a:spcPts val="0"/>
+              </a:spcAft>
+              <a:buSzPts val="12000"/>
+              <a:buNone/>
+              <a:defRPr sz="12000"/>
+            </a:lvl7pPr>
+            <a:lvl8pPr lvl="7" algn="ctr">
+              <a:spcBef>
+                <a:spcPts val="0"/>
+              </a:spcBef>
+              <a:spcAft>
+                <a:spcPts val="0"/>
+              </a:spcAft>
+              <a:buSzPts val="12000"/>
+              <a:buNone/>
+              <a:defRPr sz="12000"/>
+            </a:lvl8pPr>
+            <a:lvl9pPr lvl="8" algn="ctr">
+              <a:spcBef>
+                <a:spcPts val="0"/>
+              </a:spcBef>
+              <a:spcAft>
+                <a:spcPts val="0"/>
+              </a:spcAft>
+              <a:buSzPts val="12000"/>
+              <a:buNone/>
+              <a:defRPr sz="12000"/>
+            </a:lvl9pPr>
+          </a:lstStyle>
+          <a:p>
+            <a:r>
+              <a:t>xx%</a:t>
+            </a:r>
+          </a:p>
+        </p:txBody>
+      </p:sp>
+      <p:sp>
+        <p:nvSpPr>
+          <p:cNvPr id="46" name="Google Shape;46;p11"/>
+          <p:cNvSpPr txBox="1">
+            <a:spLocks noGrp="1"/>
+          </p:cNvSpPr>
+          <p:nvPr>
+            <p:ph type="body" idx="1"/>
+          </p:nvPr>
+        </p:nvSpPr>
+        <p:spPr>
+          <a:xfrm>
+            <a:off x="311700" y="3152225"/>
+            <a:ext cx="8520600" cy="1300800"/>
+          </a:xfrm>
+          <a:prstGeom prst="rect">
+            <a:avLst/>
+          </a:prstGeom>
+        </p:spPr>
+        <p:txBody>
+          <a:bodyPr spcFirstLastPara="1" wrap="square" lIns="91425" tIns="91425" rIns="91425" bIns="91425" anchor="t" anchorCtr="0">
+            <a:normAutofit/>
+          </a:bodyPr>
+          <a:lstStyle>
+            <a:lvl1pPr marL="457200" lvl="0" indent="-342900" algn="ctr">
+              <a:spcBef>
+                <a:spcPts val="0"/>
+              </a:spcBef>
+              <a:spcAft>
+                <a:spcPts val="0"/>
+              </a:spcAft>
+              <a:buSzPts val="1800"/>
+              <a:buChar char="●"/>
+              <a:defRPr/>
+            </a:lvl1pPr>
+            <a:lvl2pPr marL="914400" lvl="1" indent="-317500" algn="ctr">
+              <a:spcBef>
+                <a:spcPts val="0"/>
+              </a:spcBef>
+              <a:spcAft>
+                <a:spcPts val="0"/>
+              </a:spcAft>
+              <a:buSzPts val="1400"/>
+              <a:buChar char="○"/>
+              <a:defRPr/>
+            </a:lvl2pPr>
+            <a:lvl3pPr marL="1371600" lvl="2" indent="-317500" algn="ctr">
+              <a:spcBef>
+                <a:spcPts val="0"/>
+              </a:spcBef>
+              <a:spcAft>
+                <a:spcPts val="0"/>
+              </a:spcAft>
+              <a:buSzPts val="1400"/>
+              <a:buChar char="■"/>
+              <a:defRPr/>
+            </a:lvl3pPr>
+            <a:lvl4pPr marL="1828800" lvl="3" indent="-317500" algn="ctr">
+              <a:spcBef>
+                <a:spcPts val="0"/>
+              </a:spcBef>
+              <a:spcAft>
+                <a:spcPts val="0"/>
+              </a:spcAft>
+              <a:buSzPts val="1400"/>
+              <a:buChar char="●"/>
+              <a:defRPr/>
+            </a:lvl4pPr>
+            <a:lvl5pPr marL="2286000" lvl="4" indent="-317500" algn="ctr">
+              <a:spcBef>
+                <a:spcPts val="0"/>
+              </a:spcBef>
+              <a:spcAft>
+                <a:spcPts val="0"/>
+              </a:spcAft>
+              <a:buSzPts val="1400"/>
+              <a:buChar char="○"/>
+              <a:defRPr/>
+            </a:lvl5pPr>
+            <a:lvl6pPr marL="2743200" lvl="5" indent="-317500" algn="ctr">
+              <a:spcBef>
+                <a:spcPts val="0"/>
+              </a:spcBef>
+              <a:spcAft>
+                <a:spcPts val="0"/>
+              </a:spcAft>
+              <a:buSzPts val="1400"/>
+              <a:buChar char="■"/>
+              <a:defRPr/>
+            </a:lvl6pPr>
+            <a:lvl7pPr marL="3200400" lvl="6" indent="-317500" algn="ctr">
+              <a:spcBef>
+                <a:spcPts val="0"/>
+              </a:spcBef>
+              <a:spcAft>
+                <a:spcPts val="0"/>
+              </a:spcAft>
+              <a:buSzPts val="1400"/>
+              <a:buChar char="●"/>
+              <a:defRPr/>
+            </a:lvl7pPr>
+            <a:lvl8pPr marL="3657600" lvl="7" indent="-317500" algn="ctr">
+              <a:spcBef>
+                <a:spcPts val="0"/>
+              </a:spcBef>
+              <a:spcAft>
+                <a:spcPts val="0"/>
+              </a:spcAft>
+              <a:buSzPts val="1400"/>
+              <a:buChar char="○"/>
+              <a:defRPr/>
+            </a:lvl8pPr>
+            <a:lvl9pPr marL="4114800" lvl="8" indent="-317500" algn="ctr">
+              <a:spcBef>
+                <a:spcPts val="0"/>
+              </a:spcBef>
+              <a:spcAft>
+                <a:spcPts val="0"/>
+              </a:spcAft>
+              <a:buSzPts val="1400"/>
+              <a:buChar char="■"/>
+              <a:defRPr/>
+            </a:lvl9pPr>
+          </a:lstStyle>
+          <a:p>
+            <a:endParaRPr/>
+          </a:p>
+        </p:txBody>
+      </p:sp>
+      <p:sp>
+        <p:nvSpPr>
+          <p:cNvPr id="47" name="Google Shape;47;p11"/>
           <p:cNvSpPr txBox="1">
             <a:spLocks noGrp="1"/>
           </p:cNvSpPr>
@@ -5828,16 +5815,15 @@
   <p:clrMap bg1="lt1" tx1="dk1" bg2="dk2" tx2="lt2" accent1="accent1" accent2="accent2" accent3="accent3" accent4="accent4" accent5="accent5" accent6="accent6" hlink="hlink" folHlink="folHlink"/>
   <p:sldLayoutIdLst>
     <p:sldLayoutId id="2147483648" r:id="rId1"/>
-    <p:sldLayoutId id="2147483649" r:id="rId2"/>
-    <p:sldLayoutId id="2147483650" r:id="rId3"/>
-    <p:sldLayoutId id="2147483651" r:id="rId4"/>
-    <p:sldLayoutId id="2147483652" r:id="rId5"/>
-    <p:sldLayoutId id="2147483653" r:id="rId6"/>
-    <p:sldLayoutId id="2147483654" r:id="rId7"/>
-    <p:sldLayoutId id="2147483655" r:id="rId8"/>
-    <p:sldLayoutId id="2147483656" r:id="rId9"/>
-    <p:sldLayoutId id="2147483657" r:id="rId10"/>
-    <p:sldLayoutId id="2147483658" r:id="rId11"/>
+    <p:sldLayoutId id="2147483650" r:id="rId2"/>
+    <p:sldLayoutId id="2147483651" r:id="rId3"/>
+    <p:sldLayoutId id="2147483652" r:id="rId4"/>
+    <p:sldLayoutId id="2147483653" r:id="rId5"/>
+    <p:sldLayoutId id="2147483654" r:id="rId6"/>
+    <p:sldLayoutId id="2147483655" r:id="rId7"/>
+    <p:sldLayoutId id="2147483656" r:id="rId8"/>
+    <p:sldLayoutId id="2147483657" r:id="rId9"/>
+    <p:sldLayoutId id="2147483658" r:id="rId10"/>
   </p:sldLayoutIdLst>
   <p:hf sldNum="0" hdr="0" ftr="0" dt="0"/>
   <p:txStyles>
@@ -6692,6 +6678,499 @@
 </file>
 
 <file path=ppt/slides/slide10.xml><?xml version="1.0" encoding="utf-8"?>
+<p:sld xmlns:a="http://schemas.openxmlformats.org/drawingml/2006/main" xmlns:r="http://schemas.openxmlformats.org/officeDocument/2006/relationships" xmlns:p="http://schemas.openxmlformats.org/presentationml/2006/main">
+  <p:cSld>
+    <p:spTree>
+      <p:nvGrpSpPr>
+        <p:cNvPr id="1" name="Shape 71"/>
+        <p:cNvGrpSpPr/>
+        <p:nvPr/>
+      </p:nvGrpSpPr>
+      <p:grpSpPr>
+        <a:xfrm>
+          <a:off x="0" y="0"/>
+          <a:ext cx="0" cy="0"/>
+          <a:chOff x="0" y="0"/>
+          <a:chExt cx="0" cy="0"/>
+        </a:xfrm>
+      </p:grpSpPr>
+      <p:pic>
+        <p:nvPicPr>
+          <p:cNvPr id="72" name="Google Shape;72;p15"/>
+          <p:cNvPicPr preferRelativeResize="0"/>
+          <p:nvPr/>
+        </p:nvPicPr>
+        <p:blipFill>
+          <a:blip r:embed="rId3">
+            <a:alphaModFix/>
+          </a:blip>
+          <a:stretch>
+            <a:fillRect/>
+          </a:stretch>
+        </p:blipFill>
+        <p:spPr>
+          <a:xfrm>
+            <a:off x="0" y="0"/>
+            <a:ext cx="9144000" cy="5143500"/>
+          </a:xfrm>
+          <a:prstGeom prst="rect">
+            <a:avLst/>
+          </a:prstGeom>
+          <a:noFill/>
+          <a:ln>
+            <a:noFill/>
+          </a:ln>
+        </p:spPr>
+      </p:pic>
+      <p:pic>
+        <p:nvPicPr>
+          <p:cNvPr id="73" name="Google Shape;73;p15"/>
+          <p:cNvPicPr preferRelativeResize="0"/>
+          <p:nvPr/>
+        </p:nvPicPr>
+        <p:blipFill>
+          <a:blip r:embed="rId4">
+            <a:alphaModFix/>
+          </a:blip>
+          <a:stretch>
+            <a:fillRect/>
+          </a:stretch>
+        </p:blipFill>
+        <p:spPr>
+          <a:xfrm>
+            <a:off x="7685125" y="4591675"/>
+            <a:ext cx="1371926" cy="441325"/>
+          </a:xfrm>
+          <a:prstGeom prst="rect">
+            <a:avLst/>
+          </a:prstGeom>
+          <a:noFill/>
+          <a:ln>
+            <a:noFill/>
+          </a:ln>
+        </p:spPr>
+      </p:pic>
+      <p:pic>
+        <p:nvPicPr>
+          <p:cNvPr id="74" name="Google Shape;74;p15"/>
+          <p:cNvPicPr preferRelativeResize="0"/>
+          <p:nvPr/>
+        </p:nvPicPr>
+        <p:blipFill>
+          <a:blip r:embed="rId5">
+            <a:alphaModFix/>
+          </a:blip>
+          <a:stretch>
+            <a:fillRect/>
+          </a:stretch>
+        </p:blipFill>
+        <p:spPr>
+          <a:xfrm>
+            <a:off x="-50250" y="0"/>
+            <a:ext cx="1224649" cy="1135175"/>
+          </a:xfrm>
+          <a:prstGeom prst="rect">
+            <a:avLst/>
+          </a:prstGeom>
+          <a:noFill/>
+          <a:ln>
+            <a:noFill/>
+          </a:ln>
+        </p:spPr>
+      </p:pic>
+      <p:sp>
+        <p:nvSpPr>
+          <p:cNvPr id="75" name="Google Shape;75;p15"/>
+          <p:cNvSpPr txBox="1"/>
+          <p:nvPr/>
+        </p:nvSpPr>
+        <p:spPr>
+          <a:xfrm>
+            <a:off x="926550" y="1187902"/>
+            <a:ext cx="7290900" cy="553968"/>
+          </a:xfrm>
+          <a:prstGeom prst="rect">
+            <a:avLst/>
+          </a:prstGeom>
+          <a:noFill/>
+          <a:ln>
+            <a:noFill/>
+          </a:ln>
+        </p:spPr>
+        <p:txBody>
+          <a:bodyPr spcFirstLastPara="1" wrap="square" lIns="91425" tIns="91425" rIns="91425" bIns="91425" anchor="t" anchorCtr="0">
+            <a:spAutoFit/>
+          </a:bodyPr>
+          <a:lstStyle/>
+          <a:p>
+            <a:pPr marL="0" lvl="0" indent="0" algn="ctr" rtl="0">
+              <a:spcBef>
+                <a:spcPts val="0"/>
+              </a:spcBef>
+              <a:spcAft>
+                <a:spcPts val="0"/>
+              </a:spcAft>
+              <a:buNone/>
+            </a:pPr>
+            <a:r>
+              <a:rPr lang="en" sz="2400" b="1" dirty="0">
+                <a:solidFill>
+                  <a:srgbClr val="FFFFFF"/>
+                </a:solidFill>
+              </a:rPr>
+              <a:t>Assign target methods to function pointers</a:t>
+            </a:r>
+            <a:endParaRPr sz="2400" b="1" dirty="0">
+              <a:solidFill>
+                <a:srgbClr val="FFFFFF"/>
+              </a:solidFill>
+            </a:endParaRPr>
+          </a:p>
+        </p:txBody>
+      </p:sp>
+      <p:sp>
+        <p:nvSpPr>
+          <p:cNvPr id="6" name="Google Shape;75;p15">
+            <a:extLst>
+              <a:ext uri="{FF2B5EF4-FFF2-40B4-BE49-F238E27FC236}">
+                <a16:creationId xmlns:a16="http://schemas.microsoft.com/office/drawing/2014/main" id="{7CFE1217-B98E-4247-90AD-8768C8687045}"/>
+              </a:ext>
+            </a:extLst>
+          </p:cNvPr>
+          <p:cNvSpPr txBox="1"/>
+          <p:nvPr/>
+        </p:nvSpPr>
+        <p:spPr>
+          <a:xfrm>
+            <a:off x="775470" y="2270349"/>
+            <a:ext cx="7290900" cy="553968"/>
+          </a:xfrm>
+          <a:prstGeom prst="rect">
+            <a:avLst/>
+          </a:prstGeom>
+          <a:noFill/>
+          <a:ln>
+            <a:noFill/>
+          </a:ln>
+        </p:spPr>
+        <p:txBody>
+          <a:bodyPr spcFirstLastPara="1" wrap="square" lIns="91425" tIns="91425" rIns="91425" bIns="91425" anchor="t" anchorCtr="0">
+            <a:spAutoFit/>
+          </a:bodyPr>
+          <a:lstStyle/>
+          <a:p>
+            <a:pPr marL="0" lvl="0" indent="0" algn="ctr" rtl="0">
+              <a:spcBef>
+                <a:spcPts val="0"/>
+              </a:spcBef>
+              <a:spcAft>
+                <a:spcPts val="0"/>
+              </a:spcAft>
+              <a:buNone/>
+            </a:pPr>
+            <a:r>
+              <a:rPr lang="en" sz="2400" b="1" dirty="0">
+                <a:solidFill>
+                  <a:srgbClr val="FFFFFF"/>
+                </a:solidFill>
+              </a:rPr>
+              <a:t>EXAMPLE</a:t>
+            </a:r>
+            <a:endParaRPr sz="2400" b="1" dirty="0">
+              <a:solidFill>
+                <a:srgbClr val="FFFFFF"/>
+              </a:solidFill>
+            </a:endParaRPr>
+          </a:p>
+        </p:txBody>
+      </p:sp>
+    </p:spTree>
+    <p:extLst>
+      <p:ext uri="{BB962C8B-B14F-4D97-AF65-F5344CB8AC3E}">
+        <p14:creationId xmlns:p14="http://schemas.microsoft.com/office/powerpoint/2010/main" val="906761070"/>
+      </p:ext>
+    </p:extLst>
+  </p:cSld>
+  <p:clrMapOvr>
+    <a:masterClrMapping/>
+  </p:clrMapOvr>
+</p:sld>
+</file>
+
+<file path=ppt/slides/slide11.xml><?xml version="1.0" encoding="utf-8"?>
+<p:sld xmlns:a="http://schemas.openxmlformats.org/drawingml/2006/main" xmlns:r="http://schemas.openxmlformats.org/officeDocument/2006/relationships" xmlns:p="http://schemas.openxmlformats.org/presentationml/2006/main">
+  <p:cSld>
+    <p:spTree>
+      <p:nvGrpSpPr>
+        <p:cNvPr id="1" name="Shape 137"/>
+        <p:cNvGrpSpPr/>
+        <p:nvPr/>
+      </p:nvGrpSpPr>
+      <p:grpSpPr>
+        <a:xfrm>
+          <a:off x="0" y="0"/>
+          <a:ext cx="0" cy="0"/>
+          <a:chOff x="0" y="0"/>
+          <a:chExt cx="0" cy="0"/>
+        </a:xfrm>
+      </p:grpSpPr>
+      <p:pic>
+        <p:nvPicPr>
+          <p:cNvPr id="138" name="Google Shape;138;p22"/>
+          <p:cNvPicPr preferRelativeResize="0"/>
+          <p:nvPr/>
+        </p:nvPicPr>
+        <p:blipFill>
+          <a:blip r:embed="rId3">
+            <a:alphaModFix/>
+          </a:blip>
+          <a:stretch>
+            <a:fillRect/>
+          </a:stretch>
+        </p:blipFill>
+        <p:spPr>
+          <a:xfrm>
+            <a:off x="0" y="0"/>
+            <a:ext cx="9144000" cy="5143500"/>
+          </a:xfrm>
+          <a:prstGeom prst="rect">
+            <a:avLst/>
+          </a:prstGeom>
+          <a:noFill/>
+          <a:ln>
+            <a:noFill/>
+          </a:ln>
+        </p:spPr>
+      </p:pic>
+      <p:pic>
+        <p:nvPicPr>
+          <p:cNvPr id="139" name="Google Shape;139;p22"/>
+          <p:cNvPicPr preferRelativeResize="0"/>
+          <p:nvPr/>
+        </p:nvPicPr>
+        <p:blipFill>
+          <a:blip r:embed="rId4">
+            <a:alphaModFix/>
+          </a:blip>
+          <a:stretch>
+            <a:fillRect/>
+          </a:stretch>
+        </p:blipFill>
+        <p:spPr>
+          <a:xfrm>
+            <a:off x="7685125" y="4591675"/>
+            <a:ext cx="1371926" cy="441325"/>
+          </a:xfrm>
+          <a:prstGeom prst="rect">
+            <a:avLst/>
+          </a:prstGeom>
+          <a:noFill/>
+          <a:ln>
+            <a:noFill/>
+          </a:ln>
+        </p:spPr>
+      </p:pic>
+      <p:pic>
+        <p:nvPicPr>
+          <p:cNvPr id="140" name="Google Shape;140;p22"/>
+          <p:cNvPicPr preferRelativeResize="0"/>
+          <p:nvPr/>
+        </p:nvPicPr>
+        <p:blipFill>
+          <a:blip r:embed="rId5">
+            <a:alphaModFix/>
+          </a:blip>
+          <a:stretch>
+            <a:fillRect/>
+          </a:stretch>
+        </p:blipFill>
+        <p:spPr>
+          <a:xfrm>
+            <a:off x="-50250" y="0"/>
+            <a:ext cx="1224649" cy="1135175"/>
+          </a:xfrm>
+          <a:prstGeom prst="rect">
+            <a:avLst/>
+          </a:prstGeom>
+          <a:noFill/>
+          <a:ln>
+            <a:noFill/>
+          </a:ln>
+        </p:spPr>
+      </p:pic>
+      <p:sp>
+        <p:nvSpPr>
+          <p:cNvPr id="141" name="Google Shape;141;p22"/>
+          <p:cNvSpPr txBox="1"/>
+          <p:nvPr/>
+        </p:nvSpPr>
+        <p:spPr>
+          <a:xfrm>
+            <a:off x="3620063" y="981925"/>
+            <a:ext cx="2772600" cy="554100"/>
+          </a:xfrm>
+          <a:prstGeom prst="rect">
+            <a:avLst/>
+          </a:prstGeom>
+          <a:noFill/>
+          <a:ln>
+            <a:noFill/>
+          </a:ln>
+        </p:spPr>
+        <p:txBody>
+          <a:bodyPr spcFirstLastPara="1" wrap="square" lIns="91425" tIns="91425" rIns="91425" bIns="91425" anchor="t" anchorCtr="0">
+            <a:spAutoFit/>
+          </a:bodyPr>
+          <a:lstStyle/>
+          <a:p>
+            <a:pPr marL="0" lvl="0" indent="0" algn="l" rtl="0">
+              <a:spcBef>
+                <a:spcPts val="0"/>
+              </a:spcBef>
+              <a:spcAft>
+                <a:spcPts val="0"/>
+              </a:spcAft>
+              <a:buNone/>
+            </a:pPr>
+            <a:r>
+              <a:rPr lang="en" sz="2400" b="1">
+                <a:solidFill>
+                  <a:srgbClr val="FFFFFF"/>
+                </a:solidFill>
+              </a:rPr>
+              <a:t>Key takeaways</a:t>
+            </a:r>
+            <a:endParaRPr sz="2400" b="1">
+              <a:solidFill>
+                <a:srgbClr val="FFFFFF"/>
+              </a:solidFill>
+            </a:endParaRPr>
+          </a:p>
+        </p:txBody>
+      </p:sp>
+      <p:pic>
+        <p:nvPicPr>
+          <p:cNvPr id="142" name="Google Shape;142;p22"/>
+          <p:cNvPicPr preferRelativeResize="0"/>
+          <p:nvPr/>
+        </p:nvPicPr>
+        <p:blipFill>
+          <a:blip r:embed="rId6">
+            <a:alphaModFix/>
+          </a:blip>
+          <a:stretch>
+            <a:fillRect/>
+          </a:stretch>
+        </p:blipFill>
+        <p:spPr>
+          <a:xfrm>
+            <a:off x="2751338" y="884025"/>
+            <a:ext cx="747025" cy="749925"/>
+          </a:xfrm>
+          <a:prstGeom prst="rect">
+            <a:avLst/>
+          </a:prstGeom>
+          <a:noFill/>
+          <a:ln>
+            <a:noFill/>
+          </a:ln>
+        </p:spPr>
+      </p:pic>
+      <p:sp>
+        <p:nvSpPr>
+          <p:cNvPr id="143" name="Google Shape;143;p22"/>
+          <p:cNvSpPr txBox="1"/>
+          <p:nvPr/>
+        </p:nvSpPr>
+        <p:spPr>
+          <a:xfrm>
+            <a:off x="1174400" y="2201750"/>
+            <a:ext cx="6862200" cy="2031295"/>
+          </a:xfrm>
+          <a:prstGeom prst="rect">
+            <a:avLst/>
+          </a:prstGeom>
+          <a:noFill/>
+          <a:ln>
+            <a:noFill/>
+          </a:ln>
+        </p:spPr>
+        <p:txBody>
+          <a:bodyPr spcFirstLastPara="1" wrap="square" lIns="91425" tIns="91425" rIns="91425" bIns="91425" anchor="t" anchorCtr="0">
+            <a:spAutoFit/>
+          </a:bodyPr>
+          <a:lstStyle/>
+          <a:p>
+            <a:pPr marL="457200" lvl="0" indent="-381000" algn="l" rtl="0">
+              <a:spcBef>
+                <a:spcPts val="0"/>
+              </a:spcBef>
+              <a:spcAft>
+                <a:spcPts val="0"/>
+              </a:spcAft>
+              <a:buClr>
+                <a:srgbClr val="FFFFFF"/>
+              </a:buClr>
+              <a:buSzPts val="2400"/>
+              <a:buChar char="-"/>
+            </a:pPr>
+            <a:r>
+              <a:rPr lang="en-US" sz="2400" b="1" dirty="0">
+                <a:solidFill>
+                  <a:srgbClr val="FFFFFF"/>
+                </a:solidFill>
+              </a:rPr>
+              <a:t>Function pointers can increase the performance of your application by leveraging opcodes access, calling conventions </a:t>
+            </a:r>
+            <a:r>
+              <a:rPr lang="en-US" sz="2400" b="1">
+                <a:solidFill>
+                  <a:srgbClr val="FFFFFF"/>
+                </a:solidFill>
+              </a:rPr>
+              <a:t>and bypassing CLR </a:t>
+            </a:r>
+            <a:r>
+              <a:rPr lang="en-US" sz="2400" b="1" dirty="0">
+                <a:solidFill>
+                  <a:srgbClr val="FFFFFF"/>
+                </a:solidFill>
+              </a:rPr>
+              <a:t>checking</a:t>
+            </a:r>
+            <a:endParaRPr sz="2400" b="1" dirty="0">
+              <a:solidFill>
+                <a:srgbClr val="FFFFFF"/>
+              </a:solidFill>
+            </a:endParaRPr>
+          </a:p>
+          <a:p>
+            <a:pPr marL="457200" lvl="0" indent="0" algn="l" rtl="0">
+              <a:spcBef>
+                <a:spcPts val="0"/>
+              </a:spcBef>
+              <a:spcAft>
+                <a:spcPts val="0"/>
+              </a:spcAft>
+              <a:buNone/>
+            </a:pPr>
+            <a:endParaRPr sz="2400" b="1" dirty="0">
+              <a:solidFill>
+                <a:srgbClr val="FFFFFF"/>
+              </a:solidFill>
+            </a:endParaRPr>
+          </a:p>
+        </p:txBody>
+      </p:sp>
+    </p:spTree>
+  </p:cSld>
+  <p:clrMapOvr>
+    <a:masterClrMapping/>
+  </p:clrMapOvr>
+</p:sld>
+</file>
+
+<file path=ppt/slides/slide12.xml><?xml version="1.0" encoding="utf-8"?>
 <p:sld xmlns:a="http://schemas.openxmlformats.org/drawingml/2006/main" xmlns:r="http://schemas.openxmlformats.org/officeDocument/2006/relationships" xmlns:p="http://schemas.openxmlformats.org/presentationml/2006/main">
   <p:cSld>
     <p:spTree>
@@ -9979,7 +10458,7 @@
         <p:spPr>
           <a:xfrm>
             <a:off x="1174400" y="2017650"/>
-            <a:ext cx="7290900" cy="554100"/>
+            <a:ext cx="7290900" cy="923299"/>
           </a:xfrm>
           <a:prstGeom prst="rect">
             <a:avLst/>
@@ -10011,6 +10490,25 @@
                 </a:solidFill>
               </a:rPr>
               <a:t>Function pointer conversion</a:t>
+            </a:r>
+          </a:p>
+          <a:p>
+            <a:pPr marL="0" lvl="0" indent="0" algn="ctr" rtl="0">
+              <a:spcBef>
+                <a:spcPts val="0"/>
+              </a:spcBef>
+              <a:spcAft>
+                <a:spcPts val="0"/>
+              </a:spcAft>
+              <a:buNone/>
+            </a:pPr>
+            <a:r>
+              <a:rPr lang="en" sz="2400" b="1" dirty="0">
+                <a:solidFill>
+                  <a:srgbClr val="FFFFFF"/>
+                </a:solidFill>
+              </a:rPr>
+              <a:t>(implicit)</a:t>
             </a:r>
             <a:endParaRPr sz="2400" b="1" dirty="0">
               <a:solidFill>
@@ -10142,8 +10640,8 @@
         </p:nvSpPr>
         <p:spPr>
           <a:xfrm>
-            <a:off x="562074" y="1468898"/>
-            <a:ext cx="6862200" cy="1508075"/>
+            <a:off x="362238" y="1394612"/>
+            <a:ext cx="6838662" cy="3847177"/>
           </a:xfrm>
           <a:prstGeom prst="rect">
             <a:avLst/>
@@ -10159,7 +10657,7 @@
           </a:bodyPr>
           <a:lstStyle/>
           <a:p>
-            <a:pPr marL="457200" lvl="0" indent="-349250" algn="l" rtl="0">
+            <a:pPr marL="107950" lvl="0" algn="l" rtl="0">
               <a:spcBef>
                 <a:spcPts val="0"/>
               </a:spcBef>
@@ -10170,7 +10668,6 @@
                 <a:srgbClr val="FFFFFF"/>
               </a:buClr>
               <a:buSzPts val="1900"/>
-              <a:buChar char="-"/>
             </a:pPr>
             <a:r>
               <a:rPr lang="en" sz="1900" b="1" dirty="0">
@@ -10178,7 +10675,7 @@
                   <a:srgbClr val="FFFFFF"/>
                 </a:solidFill>
               </a:rPr>
-              <a:t>New language constructs that expose IL opcodes </a:t>
+              <a:t>	</a:t>
             </a:r>
           </a:p>
           <a:p>
@@ -10201,8 +10698,92 @@
                   <a:srgbClr val="FFFFFF"/>
                 </a:solidFill>
               </a:rPr>
-              <a:t>Optimization for high performance</a:t>
+              <a:t>A &amp; B have the same number of parameters, types and modifiers (reference)</a:t>
             </a:r>
+          </a:p>
+          <a:p>
+            <a:pPr marL="457200" lvl="0" indent="-349250" algn="l" rtl="0">
+              <a:spcBef>
+                <a:spcPts val="0"/>
+              </a:spcBef>
+              <a:spcAft>
+                <a:spcPts val="0"/>
+              </a:spcAft>
+              <a:buClr>
+                <a:srgbClr val="FFFFFF"/>
+              </a:buClr>
+              <a:buSzPts val="1900"/>
+              <a:buChar char="-"/>
+            </a:pPr>
+            <a:r>
+              <a:rPr lang="en-US" sz="1900" b="1" dirty="0">
+                <a:solidFill>
+                  <a:srgbClr val="FFFFFF"/>
+                </a:solidFill>
+              </a:rPr>
+              <a:t>An identity, implicit reference or pointer conversion exists from value params in A to the corresponding param in B</a:t>
+            </a:r>
+          </a:p>
+          <a:p>
+            <a:pPr marL="457200" lvl="0" indent="-349250" algn="l" rtl="0">
+              <a:spcBef>
+                <a:spcPts val="0"/>
+              </a:spcBef>
+              <a:spcAft>
+                <a:spcPts val="0"/>
+              </a:spcAft>
+              <a:buClr>
+                <a:srgbClr val="FFFFFF"/>
+              </a:buClr>
+              <a:buSzPts val="1900"/>
+              <a:buChar char="-"/>
+            </a:pPr>
+            <a:r>
+              <a:rPr lang="en-US" sz="1900" b="1" dirty="0">
+                <a:solidFill>
+                  <a:srgbClr val="FFFFFF"/>
+                </a:solidFill>
+              </a:rPr>
+              <a:t>Same rules apply for the return type</a:t>
+            </a:r>
+          </a:p>
+          <a:p>
+            <a:pPr marL="457200" lvl="0" indent="-349250" algn="l" rtl="0">
+              <a:spcBef>
+                <a:spcPts val="0"/>
+              </a:spcBef>
+              <a:spcAft>
+                <a:spcPts val="0"/>
+              </a:spcAft>
+              <a:buClr>
+                <a:srgbClr val="FFFFFF"/>
+              </a:buClr>
+              <a:buSzPts val="1900"/>
+              <a:buChar char="-"/>
+            </a:pPr>
+            <a:r>
+              <a:rPr lang="en-US" sz="1900" b="1" dirty="0">
+                <a:solidFill>
+                  <a:srgbClr val="FFFFFF"/>
+                </a:solidFill>
+              </a:rPr>
+              <a:t>Calling convention of A is the same as the calling convention of B</a:t>
+            </a:r>
+          </a:p>
+          <a:p>
+            <a:pPr marL="457200" lvl="0" indent="-349250" algn="l" rtl="0">
+              <a:spcBef>
+                <a:spcPts val="0"/>
+              </a:spcBef>
+              <a:spcAft>
+                <a:spcPts val="0"/>
+              </a:spcAft>
+              <a:buClr>
+                <a:srgbClr val="FFFFFF"/>
+              </a:buClr>
+              <a:buSzPts val="1900"/>
+              <a:buChar char="-"/>
+            </a:pPr>
             <a:endParaRPr sz="1900" b="1" dirty="0">
               <a:solidFill>
                 <a:srgbClr val="FFFFFF"/>
@@ -10257,7 +10838,7 @@
         </p:nvSpPr>
         <p:spPr>
           <a:xfrm>
-            <a:off x="562074" y="858191"/>
+            <a:off x="772649" y="186641"/>
             <a:ext cx="6272565" cy="553968"/>
           </a:xfrm>
           <a:prstGeom prst="rect">
@@ -10291,6 +10872,124 @@
               </a:rPr>
               <a:t>Rules:</a:t>
             </a:r>
+            <a:endParaRPr sz="2400" b="1" dirty="0">
+              <a:solidFill>
+                <a:srgbClr val="FFFFFF"/>
+              </a:solidFill>
+            </a:endParaRPr>
+          </a:p>
+        </p:txBody>
+      </p:sp>
+      <p:sp>
+        <p:nvSpPr>
+          <p:cNvPr id="7" name="Google Shape;67;p14">
+            <a:extLst>
+              <a:ext uri="{FF2B5EF4-FFF2-40B4-BE49-F238E27FC236}">
+                <a16:creationId xmlns:a16="http://schemas.microsoft.com/office/drawing/2014/main" id="{B46CF745-7C8D-47C0-90BA-15B2FAB8F6E4}"/>
+              </a:ext>
+            </a:extLst>
+          </p:cNvPr>
+          <p:cNvSpPr txBox="1"/>
+          <p:nvPr/>
+        </p:nvSpPr>
+        <p:spPr>
+          <a:xfrm>
+            <a:off x="308450" y="640574"/>
+            <a:ext cx="6686514" cy="1508075"/>
+          </a:xfrm>
+          <a:prstGeom prst="rect">
+            <a:avLst/>
+          </a:prstGeom>
+          <a:noFill/>
+          <a:ln>
+            <a:noFill/>
+          </a:ln>
+        </p:spPr>
+        <p:txBody>
+          <a:bodyPr spcFirstLastPara="1" wrap="square" lIns="91425" tIns="91425" rIns="91425" bIns="91425" anchor="t" anchorCtr="0">
+            <a:spAutoFit/>
+          </a:bodyPr>
+          <a:lstStyle/>
+          <a:p>
+            <a:pPr marL="107950" lvl="0" algn="l" rtl="0">
+              <a:spcBef>
+                <a:spcPts val="0"/>
+              </a:spcBef>
+              <a:spcAft>
+                <a:spcPts val="0"/>
+              </a:spcAft>
+              <a:buClr>
+                <a:srgbClr val="FFFFFF"/>
+              </a:buClr>
+              <a:buSzPts val="1900"/>
+            </a:pPr>
+            <a:r>
+              <a:rPr lang="en" sz="1900" b="1" dirty="0">
+                <a:solidFill>
+                  <a:srgbClr val="FFFFFF"/>
+                </a:solidFill>
+              </a:rPr>
+              <a:t>	Converting from </a:t>
+            </a:r>
+            <a:r>
+              <a:rPr lang="en" sz="1900" b="1" dirty="0">
+                <a:solidFill>
+                  <a:srgbClr val="FF0000"/>
+                </a:solidFill>
+              </a:rPr>
+              <a:t>function pointer A </a:t>
+            </a:r>
+            <a:r>
+              <a:rPr lang="en" sz="1900" b="1" dirty="0">
+                <a:solidFill>
+                  <a:srgbClr val="FFFFFF"/>
+                </a:solidFill>
+              </a:rPr>
+              <a:t>to </a:t>
+            </a:r>
+            <a:r>
+              <a:rPr lang="en" sz="1900" b="1" dirty="0">
+                <a:solidFill>
+                  <a:srgbClr val="FF0000"/>
+                </a:solidFill>
+              </a:rPr>
+              <a:t>function pointer B </a:t>
+            </a:r>
+            <a:r>
+              <a:rPr lang="en" sz="1900" b="1" dirty="0">
+                <a:solidFill>
+                  <a:srgbClr val="FFFFFF"/>
+                </a:solidFill>
+              </a:rPr>
+              <a:t>implicitly only if:</a:t>
+            </a:r>
+          </a:p>
+          <a:p>
+            <a:pPr marL="457200" lvl="0" indent="0" algn="l" rtl="0">
+              <a:spcBef>
+                <a:spcPts val="0"/>
+              </a:spcBef>
+              <a:spcAft>
+                <a:spcPts val="0"/>
+              </a:spcAft>
+              <a:buNone/>
+            </a:pPr>
+            <a:endParaRPr sz="2400" b="1" dirty="0">
+              <a:solidFill>
+                <a:srgbClr val="FFFFFF"/>
+              </a:solidFill>
+            </a:endParaRPr>
+          </a:p>
+          <a:p>
+            <a:pPr marL="457200" lvl="0" indent="0" algn="l" rtl="0">
+              <a:spcBef>
+                <a:spcPts val="0"/>
+              </a:spcBef>
+              <a:spcAft>
+                <a:spcPts val="0"/>
+              </a:spcAft>
+              <a:buNone/>
+            </a:pPr>
             <a:endParaRPr sz="2400" b="1" dirty="0">
               <a:solidFill>
                 <a:srgbClr val="FFFFFF"/>
@@ -10317,7 +11016,7 @@
   <p:cSld>
     <p:spTree>
       <p:nvGrpSpPr>
-        <p:cNvPr id="1" name="Shape 137"/>
+        <p:cNvPr id="1" name="Shape 71"/>
         <p:cNvGrpSpPr/>
         <p:nvPr/>
       </p:nvGrpSpPr>
@@ -10331,7 +11030,7 @@
       </p:grpSpPr>
       <p:pic>
         <p:nvPicPr>
-          <p:cNvPr id="138" name="Google Shape;138;p22"/>
+          <p:cNvPr id="72" name="Google Shape;72;p15"/>
           <p:cNvPicPr preferRelativeResize="0"/>
           <p:nvPr/>
         </p:nvPicPr>
@@ -10359,7 +11058,7 @@
       </p:pic>
       <p:pic>
         <p:nvPicPr>
-          <p:cNvPr id="139" name="Google Shape;139;p22"/>
+          <p:cNvPr id="73" name="Google Shape;73;p15"/>
           <p:cNvPicPr preferRelativeResize="0"/>
           <p:nvPr/>
         </p:nvPicPr>
@@ -10387,7 +11086,7 @@
       </p:pic>
       <p:pic>
         <p:nvPicPr>
-          <p:cNvPr id="140" name="Google Shape;140;p22"/>
+          <p:cNvPr id="74" name="Google Shape;74;p15"/>
           <p:cNvPicPr preferRelativeResize="0"/>
           <p:nvPr/>
         </p:nvPicPr>
@@ -10415,14 +11114,14 @@
       </p:pic>
       <p:sp>
         <p:nvSpPr>
-          <p:cNvPr id="141" name="Google Shape;141;p22"/>
+          <p:cNvPr id="75" name="Google Shape;75;p15"/>
           <p:cNvSpPr txBox="1"/>
           <p:nvPr/>
         </p:nvSpPr>
         <p:spPr>
           <a:xfrm>
-            <a:off x="3620063" y="981925"/>
-            <a:ext cx="2772600" cy="554100"/>
+            <a:off x="838223" y="673525"/>
+            <a:ext cx="7290900" cy="923299"/>
           </a:xfrm>
           <a:prstGeom prst="rect">
             <a:avLst/>
@@ -10438,7 +11137,7 @@
           </a:bodyPr>
           <a:lstStyle/>
           <a:p>
-            <a:pPr marL="0" lvl="0" indent="0" algn="l" rtl="0">
+            <a:pPr marL="0" lvl="0" indent="0" algn="ctr" rtl="0">
               <a:spcBef>
                 <a:spcPts val="0"/>
               </a:spcBef>
@@ -10448,14 +11147,33 @@
               <a:buNone/>
             </a:pPr>
             <a:r>
-              <a:rPr lang="en" sz="2400" b="1">
+              <a:rPr lang="en" sz="2400" b="1" dirty="0">
                 <a:solidFill>
                   <a:srgbClr val="FFFFFF"/>
                 </a:solidFill>
               </a:rPr>
-              <a:t>Key takeaways</a:t>
+              <a:t>Function pointer conversion</a:t>
             </a:r>
-            <a:endParaRPr sz="2400" b="1">
+          </a:p>
+          <a:p>
+            <a:pPr marL="0" lvl="0" indent="0" algn="ctr" rtl="0">
+              <a:spcBef>
+                <a:spcPts val="0"/>
+              </a:spcBef>
+              <a:spcAft>
+                <a:spcPts val="0"/>
+              </a:spcAft>
+              <a:buNone/>
+            </a:pPr>
+            <a:r>
+              <a:rPr lang="en" sz="2400" b="1" dirty="0">
+                <a:solidFill>
+                  <a:srgbClr val="FFFFFF"/>
+                </a:solidFill>
+              </a:rPr>
+              <a:t>(implicit)</a:t>
+            </a:r>
+            <a:endParaRPr sz="2400" b="1" dirty="0">
               <a:solidFill>
                 <a:srgbClr val="FFFFFF"/>
               </a:solidFill>
@@ -10463,44 +11181,22 @@
           </a:p>
         </p:txBody>
       </p:sp>
-      <p:pic>
-        <p:nvPicPr>
-          <p:cNvPr id="142" name="Google Shape;142;p22"/>
-          <p:cNvPicPr preferRelativeResize="0"/>
-          <p:nvPr/>
-        </p:nvPicPr>
-        <p:blipFill>
-          <a:blip r:embed="rId6">
-            <a:alphaModFix/>
-          </a:blip>
-          <a:stretch>
-            <a:fillRect/>
-          </a:stretch>
-        </p:blipFill>
-        <p:spPr>
-          <a:xfrm>
-            <a:off x="2751338" y="884025"/>
-            <a:ext cx="747025" cy="749925"/>
-          </a:xfrm>
-          <a:prstGeom prst="rect">
-            <a:avLst/>
-          </a:prstGeom>
-          <a:noFill/>
-          <a:ln>
-            <a:noFill/>
-          </a:ln>
-        </p:spPr>
-      </p:pic>
       <p:sp>
         <p:nvSpPr>
-          <p:cNvPr id="143" name="Google Shape;143;p22"/>
+          <p:cNvPr id="6" name="Google Shape;75;p15">
+            <a:extLst>
+              <a:ext uri="{FF2B5EF4-FFF2-40B4-BE49-F238E27FC236}">
+                <a16:creationId xmlns:a16="http://schemas.microsoft.com/office/drawing/2014/main" id="{7CFE1217-B98E-4247-90AD-8768C8687045}"/>
+              </a:ext>
+            </a:extLst>
+          </p:cNvPr>
           <p:cNvSpPr txBox="1"/>
           <p:nvPr/>
         </p:nvSpPr>
         <p:spPr>
           <a:xfrm>
-            <a:off x="1174400" y="2201750"/>
-            <a:ext cx="6862200" cy="2031295"/>
+            <a:off x="775470" y="2270349"/>
+            <a:ext cx="7290900" cy="553968"/>
           </a:xfrm>
           <a:prstGeom prst="rect">
             <a:avLst/>
@@ -10516,43 +11212,23 @@
           </a:bodyPr>
           <a:lstStyle/>
           <a:p>
-            <a:pPr marL="457200" lvl="0" indent="-381000" algn="l" rtl="0">
-              <a:spcBef>
-                <a:spcPts val="0"/>
-              </a:spcBef>
-              <a:spcAft>
-                <a:spcPts val="0"/>
-              </a:spcAft>
-              <a:buClr>
-                <a:srgbClr val="FFFFFF"/>
-              </a:buClr>
-              <a:buSzPts val="2400"/>
-              <a:buChar char="-"/>
+            <a:pPr marL="0" lvl="0" indent="0" algn="ctr" rtl="0">
+              <a:spcBef>
+                <a:spcPts val="0"/>
+              </a:spcBef>
+              <a:spcAft>
+                <a:spcPts val="0"/>
+              </a:spcAft>
+              <a:buNone/>
             </a:pPr>
             <a:r>
-              <a:rPr lang="en-US" sz="2400" b="1" dirty="0">
+              <a:rPr lang="en" sz="2400" b="1" dirty="0">
                 <a:solidFill>
                   <a:srgbClr val="FFFFFF"/>
                 </a:solidFill>
               </a:rPr>
-              <a:t>Function pointers can increase the performance of your application by leveraging opcodes access, calling conventions and CLR checking</a:t>
+              <a:t>EXAMPLE</a:t>
             </a:r>
-            <a:endParaRPr sz="2400" b="1" dirty="0">
-              <a:solidFill>
-                <a:srgbClr val="FFFFFF"/>
-              </a:solidFill>
-            </a:endParaRPr>
-          </a:p>
-          <a:p>
-            <a:pPr marL="457200" lvl="0" indent="0" algn="l" rtl="0">
-              <a:spcBef>
-                <a:spcPts val="0"/>
-              </a:spcBef>
-              <a:spcAft>
-                <a:spcPts val="0"/>
-              </a:spcAft>
-              <a:buNone/>
-            </a:pPr>
             <a:endParaRPr sz="2400" b="1" dirty="0">
               <a:solidFill>
                 <a:srgbClr val="FFFFFF"/>
@@ -10562,6 +11238,11 @@
         </p:txBody>
       </p:sp>
     </p:spTree>
+    <p:extLst>
+      <p:ext uri="{BB962C8B-B14F-4D97-AF65-F5344CB8AC3E}">
+        <p14:creationId xmlns:p14="http://schemas.microsoft.com/office/powerpoint/2010/main" val="681903325"/>
+      </p:ext>
+    </p:extLst>
   </p:cSld>
   <p:clrMapOvr>
     <a:masterClrMapping/>

</xml_diff>

<commit_message>
fct ptr pres 2
</commit_message>
<xml_diff>
--- a/FunctionPointer/Function Pointers proviz.pptx
+++ b/FunctionPointer/Function Pointers proviz.pptx
@@ -5,7 +5,7 @@
     <p:sldMasterId id="2147483659" r:id="rId1"/>
   </p:sldMasterIdLst>
   <p:notesMasterIdLst>
-    <p:notesMasterId r:id="rId12"/>
+    <p:notesMasterId r:id="rId14"/>
   </p:notesMasterIdLst>
   <p:sldIdLst>
     <p:sldId id="256" r:id="rId2"/>
@@ -16,22 +16,24 @@
     <p:sldId id="259" r:id="rId7"/>
     <p:sldId id="270" r:id="rId8"/>
     <p:sldId id="271" r:id="rId9"/>
-    <p:sldId id="265" r:id="rId10"/>
-    <p:sldId id="266" r:id="rId11"/>
+    <p:sldId id="272" r:id="rId10"/>
+    <p:sldId id="273" r:id="rId11"/>
+    <p:sldId id="265" r:id="rId12"/>
+    <p:sldId id="266" r:id="rId13"/>
   </p:sldIdLst>
   <p:sldSz cx="9144000" cy="5143500" type="screen16x9"/>
   <p:notesSz cx="6858000" cy="9144000"/>
   <p:embeddedFontLst>
     <p:embeddedFont>
       <p:font typeface="Proxima Nova" panose="020B0604020202020204" charset="0"/>
-      <p:regular r:id="rId13"/>
-      <p:bold r:id="rId14"/>
-      <p:italic r:id="rId15"/>
-      <p:boldItalic r:id="rId16"/>
+      <p:regular r:id="rId15"/>
+      <p:bold r:id="rId16"/>
+      <p:italic r:id="rId17"/>
+      <p:boldItalic r:id="rId18"/>
     </p:embeddedFont>
     <p:embeddedFont>
       <p:font typeface="Proxima Nova Extrabold" panose="020B0604020202020204" charset="0"/>
-      <p:bold r:id="rId17"/>
+      <p:bold r:id="rId19"/>
     </p:embeddedFont>
   </p:embeddedFontLst>
   <p:defaultTextStyle>
@@ -832,6 +834,219 @@
   <p:cSld>
     <p:spTree>
       <p:nvGrpSpPr>
+        <p:cNvPr id="1" name="Shape 68"/>
+        <p:cNvGrpSpPr/>
+        <p:nvPr/>
+      </p:nvGrpSpPr>
+      <p:grpSpPr>
+        <a:xfrm>
+          <a:off x="0" y="0"/>
+          <a:ext cx="0" cy="0"/>
+          <a:chOff x="0" y="0"/>
+          <a:chExt cx="0" cy="0"/>
+        </a:xfrm>
+      </p:grpSpPr>
+      <p:sp>
+        <p:nvSpPr>
+          <p:cNvPr id="69" name="Google Shape;69;ge35dfbd706_0_27:notes"/>
+          <p:cNvSpPr>
+            <a:spLocks noGrp="1" noRot="1" noChangeAspect="1"/>
+          </p:cNvSpPr>
+          <p:nvPr>
+            <p:ph type="sldImg" idx="2"/>
+          </p:nvPr>
+        </p:nvSpPr>
+        <p:spPr>
+          <a:xfrm>
+            <a:off x="381000" y="685800"/>
+            <a:ext cx="6096000" cy="3429000"/>
+          </a:xfrm>
+          <a:custGeom>
+            <a:avLst/>
+            <a:gdLst/>
+            <a:ahLst/>
+            <a:cxnLst/>
+            <a:rect l="l" t="t" r="r" b="b"/>
+            <a:pathLst>
+              <a:path w="120000" h="120000" extrusionOk="0">
+                <a:moveTo>
+                  <a:pt x="0" y="0"/>
+                </a:moveTo>
+                <a:lnTo>
+                  <a:pt x="120000" y="0"/>
+                </a:lnTo>
+                <a:lnTo>
+                  <a:pt x="120000" y="120000"/>
+                </a:lnTo>
+                <a:lnTo>
+                  <a:pt x="0" y="120000"/>
+                </a:lnTo>
+                <a:close/>
+              </a:path>
+            </a:pathLst>
+          </a:custGeom>
+        </p:spPr>
+      </p:sp>
+      <p:sp>
+        <p:nvSpPr>
+          <p:cNvPr id="70" name="Google Shape;70;ge35dfbd706_0_27:notes"/>
+          <p:cNvSpPr txBox="1">
+            <a:spLocks noGrp="1"/>
+          </p:cNvSpPr>
+          <p:nvPr>
+            <p:ph type="body" idx="1"/>
+          </p:nvPr>
+        </p:nvSpPr>
+        <p:spPr>
+          <a:xfrm>
+            <a:off x="685800" y="4343400"/>
+            <a:ext cx="5486400" cy="4114800"/>
+          </a:xfrm>
+          <a:prstGeom prst="rect">
+            <a:avLst/>
+          </a:prstGeom>
+        </p:spPr>
+        <p:txBody>
+          <a:bodyPr spcFirstLastPara="1" wrap="square" lIns="91425" tIns="91425" rIns="91425" bIns="91425" anchor="t" anchorCtr="0">
+            <a:noAutofit/>
+          </a:bodyPr>
+          <a:lstStyle/>
+          <a:p>
+            <a:pPr marL="0" lvl="0" indent="0" algn="l" rtl="0">
+              <a:spcBef>
+                <a:spcPts val="0"/>
+              </a:spcBef>
+              <a:spcAft>
+                <a:spcPts val="0"/>
+              </a:spcAft>
+              <a:buNone/>
+            </a:pPr>
+            <a:endParaRPr/>
+          </a:p>
+        </p:txBody>
+      </p:sp>
+    </p:spTree>
+    <p:extLst>
+      <p:ext uri="{BB962C8B-B14F-4D97-AF65-F5344CB8AC3E}">
+        <p14:creationId xmlns:p14="http://schemas.microsoft.com/office/powerpoint/2010/main" val="2303714926"/>
+      </p:ext>
+    </p:extLst>
+  </p:cSld>
+  <p:clrMapOvr>
+    <a:masterClrMapping/>
+  </p:clrMapOvr>
+</p:notes>
+</file>
+
+<file path=ppt/notesSlides/notesSlide11.xml><?xml version="1.0" encoding="utf-8"?>
+<p:notes xmlns:a="http://schemas.openxmlformats.org/drawingml/2006/main" xmlns:r="http://schemas.openxmlformats.org/officeDocument/2006/relationships" xmlns:p="http://schemas.openxmlformats.org/presentationml/2006/main" showMasterSp="0" showMasterPhAnim="0">
+  <p:cSld>
+    <p:spTree>
+      <p:nvGrpSpPr>
+        <p:cNvPr id="1" name="Shape 134"/>
+        <p:cNvGrpSpPr/>
+        <p:nvPr/>
+      </p:nvGrpSpPr>
+      <p:grpSpPr>
+        <a:xfrm>
+          <a:off x="0" y="0"/>
+          <a:ext cx="0" cy="0"/>
+          <a:chOff x="0" y="0"/>
+          <a:chExt cx="0" cy="0"/>
+        </a:xfrm>
+      </p:grpSpPr>
+      <p:sp>
+        <p:nvSpPr>
+          <p:cNvPr id="135" name="Google Shape;135;gb576238e23_0_19:notes"/>
+          <p:cNvSpPr>
+            <a:spLocks noGrp="1" noRot="1" noChangeAspect="1"/>
+          </p:cNvSpPr>
+          <p:nvPr>
+            <p:ph type="sldImg" idx="2"/>
+          </p:nvPr>
+        </p:nvSpPr>
+        <p:spPr>
+          <a:xfrm>
+            <a:off x="381000" y="685800"/>
+            <a:ext cx="6096000" cy="3429000"/>
+          </a:xfrm>
+          <a:custGeom>
+            <a:avLst/>
+            <a:gdLst/>
+            <a:ahLst/>
+            <a:cxnLst/>
+            <a:rect l="l" t="t" r="r" b="b"/>
+            <a:pathLst>
+              <a:path w="120000" h="120000" extrusionOk="0">
+                <a:moveTo>
+                  <a:pt x="0" y="0"/>
+                </a:moveTo>
+                <a:lnTo>
+                  <a:pt x="120000" y="0"/>
+                </a:lnTo>
+                <a:lnTo>
+                  <a:pt x="120000" y="120000"/>
+                </a:lnTo>
+                <a:lnTo>
+                  <a:pt x="0" y="120000"/>
+                </a:lnTo>
+                <a:close/>
+              </a:path>
+            </a:pathLst>
+          </a:custGeom>
+        </p:spPr>
+      </p:sp>
+      <p:sp>
+        <p:nvSpPr>
+          <p:cNvPr id="136" name="Google Shape;136;gb576238e23_0_19:notes"/>
+          <p:cNvSpPr txBox="1">
+            <a:spLocks noGrp="1"/>
+          </p:cNvSpPr>
+          <p:nvPr>
+            <p:ph type="body" idx="1"/>
+          </p:nvPr>
+        </p:nvSpPr>
+        <p:spPr>
+          <a:xfrm>
+            <a:off x="685800" y="4343400"/>
+            <a:ext cx="5486400" cy="4114800"/>
+          </a:xfrm>
+          <a:prstGeom prst="rect">
+            <a:avLst/>
+          </a:prstGeom>
+        </p:spPr>
+        <p:txBody>
+          <a:bodyPr spcFirstLastPara="1" wrap="square" lIns="91425" tIns="91425" rIns="91425" bIns="91425" anchor="t" anchorCtr="0">
+            <a:noAutofit/>
+          </a:bodyPr>
+          <a:lstStyle/>
+          <a:p>
+            <a:pPr marL="0" lvl="0" indent="0" algn="l" rtl="0">
+              <a:spcBef>
+                <a:spcPts val="0"/>
+              </a:spcBef>
+              <a:spcAft>
+                <a:spcPts val="0"/>
+              </a:spcAft>
+              <a:buNone/>
+            </a:pPr>
+            <a:endParaRPr/>
+          </a:p>
+        </p:txBody>
+      </p:sp>
+    </p:spTree>
+  </p:cSld>
+  <p:clrMapOvr>
+    <a:masterClrMapping/>
+  </p:clrMapOvr>
+</p:notes>
+</file>
+
+<file path=ppt/notesSlides/notesSlide12.xml><?xml version="1.0" encoding="utf-8"?>
+<p:notes xmlns:a="http://schemas.openxmlformats.org/drawingml/2006/main" xmlns:r="http://schemas.openxmlformats.org/officeDocument/2006/relationships" xmlns:p="http://schemas.openxmlformats.org/presentationml/2006/main" showMasterSp="0" showMasterPhAnim="0">
+  <p:cSld>
+    <p:spTree>
+      <p:nvGrpSpPr>
         <p:cNvPr id="1" name="Shape 144"/>
         <p:cNvGrpSpPr/>
         <p:nvPr/>
@@ -1684,7 +1899,7 @@
   <p:cSld>
     <p:spTree>
       <p:nvGrpSpPr>
-        <p:cNvPr id="1" name="Shape 134"/>
+        <p:cNvPr id="1" name="Shape 68"/>
         <p:cNvGrpSpPr/>
         <p:nvPr/>
       </p:nvGrpSpPr>
@@ -1698,7 +1913,7 @@
       </p:grpSpPr>
       <p:sp>
         <p:nvSpPr>
-          <p:cNvPr id="135" name="Google Shape;135;gb576238e23_0_19:notes"/>
+          <p:cNvPr id="69" name="Google Shape;69;ge35dfbd706_0_27:notes"/>
           <p:cNvSpPr>
             <a:spLocks noGrp="1" noRot="1" noChangeAspect="1"/>
           </p:cNvSpPr>
@@ -1739,7 +1954,7 @@
       </p:sp>
       <p:sp>
         <p:nvSpPr>
-          <p:cNvPr id="136" name="Google Shape;136;gb576238e23_0_19:notes"/>
+          <p:cNvPr id="70" name="Google Shape;70;ge35dfbd706_0_27:notes"/>
           <p:cNvSpPr txBox="1">
             <a:spLocks noGrp="1"/>
           </p:cNvSpPr>
@@ -1776,6 +1991,11 @@
         </p:txBody>
       </p:sp>
     </p:spTree>
+    <p:extLst>
+      <p:ext uri="{BB962C8B-B14F-4D97-AF65-F5344CB8AC3E}">
+        <p14:creationId xmlns:p14="http://schemas.microsoft.com/office/powerpoint/2010/main" val="3008367328"/>
+      </p:ext>
+    </p:extLst>
   </p:cSld>
   <p:clrMapOvr>
     <a:masterClrMapping/>
@@ -2173,370 +2393,6 @@
 </file>
 
 <file path=ppt/slideLayouts/slideLayout10.xml><?xml version="1.0" encoding="utf-8"?>
-<p:sldLayout xmlns:a="http://schemas.openxmlformats.org/drawingml/2006/main" xmlns:r="http://schemas.openxmlformats.org/officeDocument/2006/relationships" xmlns:p="http://schemas.openxmlformats.org/presentationml/2006/main" matchingName="Big number">
-  <p:cSld name="BIG_NUMBER">
-    <p:spTree>
-      <p:nvGrpSpPr>
-        <p:cNvPr id="1" name="Shape 44"/>
-        <p:cNvGrpSpPr/>
-        <p:nvPr/>
-      </p:nvGrpSpPr>
-      <p:grpSpPr>
-        <a:xfrm>
-          <a:off x="0" y="0"/>
-          <a:ext cx="0" cy="0"/>
-          <a:chOff x="0" y="0"/>
-          <a:chExt cx="0" cy="0"/>
-        </a:xfrm>
-      </p:grpSpPr>
-      <p:sp>
-        <p:nvSpPr>
-          <p:cNvPr id="45" name="Google Shape;45;p11"/>
-          <p:cNvSpPr txBox="1">
-            <a:spLocks noGrp="1"/>
-          </p:cNvSpPr>
-          <p:nvPr>
-            <p:ph type="title" hasCustomPrompt="1"/>
-          </p:nvPr>
-        </p:nvSpPr>
-        <p:spPr>
-          <a:xfrm>
-            <a:off x="311700" y="1106125"/>
-            <a:ext cx="8520600" cy="1963500"/>
-          </a:xfrm>
-          <a:prstGeom prst="rect">
-            <a:avLst/>
-          </a:prstGeom>
-        </p:spPr>
-        <p:txBody>
-          <a:bodyPr spcFirstLastPara="1" wrap="square" lIns="91425" tIns="91425" rIns="91425" bIns="91425" anchor="b" anchorCtr="0">
-            <a:normAutofit/>
-          </a:bodyPr>
-          <a:lstStyle>
-            <a:lvl1pPr lvl="0" algn="ctr">
-              <a:spcBef>
-                <a:spcPts val="0"/>
-              </a:spcBef>
-              <a:spcAft>
-                <a:spcPts val="0"/>
-              </a:spcAft>
-              <a:buSzPts val="12000"/>
-              <a:buNone/>
-              <a:defRPr sz="12000"/>
-            </a:lvl1pPr>
-            <a:lvl2pPr lvl="1" algn="ctr">
-              <a:spcBef>
-                <a:spcPts val="0"/>
-              </a:spcBef>
-              <a:spcAft>
-                <a:spcPts val="0"/>
-              </a:spcAft>
-              <a:buSzPts val="12000"/>
-              <a:buNone/>
-              <a:defRPr sz="12000"/>
-            </a:lvl2pPr>
-            <a:lvl3pPr lvl="2" algn="ctr">
-              <a:spcBef>
-                <a:spcPts val="0"/>
-              </a:spcBef>
-              <a:spcAft>
-                <a:spcPts val="0"/>
-              </a:spcAft>
-              <a:buSzPts val="12000"/>
-              <a:buNone/>
-              <a:defRPr sz="12000"/>
-            </a:lvl3pPr>
-            <a:lvl4pPr lvl="3" algn="ctr">
-              <a:spcBef>
-                <a:spcPts val="0"/>
-              </a:spcBef>
-              <a:spcAft>
-                <a:spcPts val="0"/>
-              </a:spcAft>
-              <a:buSzPts val="12000"/>
-              <a:buNone/>
-              <a:defRPr sz="12000"/>
-            </a:lvl4pPr>
-            <a:lvl5pPr lvl="4" algn="ctr">
-              <a:spcBef>
-                <a:spcPts val="0"/>
-              </a:spcBef>
-              <a:spcAft>
-                <a:spcPts val="0"/>
-              </a:spcAft>
-              <a:buSzPts val="12000"/>
-              <a:buNone/>
-              <a:defRPr sz="12000"/>
-            </a:lvl5pPr>
-            <a:lvl6pPr lvl="5" algn="ctr">
-              <a:spcBef>
-                <a:spcPts val="0"/>
-              </a:spcBef>
-              <a:spcAft>
-                <a:spcPts val="0"/>
-              </a:spcAft>
-              <a:buSzPts val="12000"/>
-              <a:buNone/>
-              <a:defRPr sz="12000"/>
-            </a:lvl6pPr>
-            <a:lvl7pPr lvl="6" algn="ctr">
-              <a:spcBef>
-                <a:spcPts val="0"/>
-              </a:spcBef>
-              <a:spcAft>
-                <a:spcPts val="0"/>
-              </a:spcAft>
-              <a:buSzPts val="12000"/>
-              <a:buNone/>
-              <a:defRPr sz="12000"/>
-            </a:lvl7pPr>
-            <a:lvl8pPr lvl="7" algn="ctr">
-              <a:spcBef>
-                <a:spcPts val="0"/>
-              </a:spcBef>
-              <a:spcAft>
-                <a:spcPts val="0"/>
-              </a:spcAft>
-              <a:buSzPts val="12000"/>
-              <a:buNone/>
-              <a:defRPr sz="12000"/>
-            </a:lvl8pPr>
-            <a:lvl9pPr lvl="8" algn="ctr">
-              <a:spcBef>
-                <a:spcPts val="0"/>
-              </a:spcBef>
-              <a:spcAft>
-                <a:spcPts val="0"/>
-              </a:spcAft>
-              <a:buSzPts val="12000"/>
-              <a:buNone/>
-              <a:defRPr sz="12000"/>
-            </a:lvl9pPr>
-          </a:lstStyle>
-          <a:p>
-            <a:r>
-              <a:t>xx%</a:t>
-            </a:r>
-          </a:p>
-        </p:txBody>
-      </p:sp>
-      <p:sp>
-        <p:nvSpPr>
-          <p:cNvPr id="46" name="Google Shape;46;p11"/>
-          <p:cNvSpPr txBox="1">
-            <a:spLocks noGrp="1"/>
-          </p:cNvSpPr>
-          <p:nvPr>
-            <p:ph type="body" idx="1"/>
-          </p:nvPr>
-        </p:nvSpPr>
-        <p:spPr>
-          <a:xfrm>
-            <a:off x="311700" y="3152225"/>
-            <a:ext cx="8520600" cy="1300800"/>
-          </a:xfrm>
-          <a:prstGeom prst="rect">
-            <a:avLst/>
-          </a:prstGeom>
-        </p:spPr>
-        <p:txBody>
-          <a:bodyPr spcFirstLastPara="1" wrap="square" lIns="91425" tIns="91425" rIns="91425" bIns="91425" anchor="t" anchorCtr="0">
-            <a:normAutofit/>
-          </a:bodyPr>
-          <a:lstStyle>
-            <a:lvl1pPr marL="457200" lvl="0" indent="-342900" algn="ctr">
-              <a:spcBef>
-                <a:spcPts val="0"/>
-              </a:spcBef>
-              <a:spcAft>
-                <a:spcPts val="0"/>
-              </a:spcAft>
-              <a:buSzPts val="1800"/>
-              <a:buChar char="●"/>
-              <a:defRPr/>
-            </a:lvl1pPr>
-            <a:lvl2pPr marL="914400" lvl="1" indent="-317500" algn="ctr">
-              <a:spcBef>
-                <a:spcPts val="0"/>
-              </a:spcBef>
-              <a:spcAft>
-                <a:spcPts val="0"/>
-              </a:spcAft>
-              <a:buSzPts val="1400"/>
-              <a:buChar char="○"/>
-              <a:defRPr/>
-            </a:lvl2pPr>
-            <a:lvl3pPr marL="1371600" lvl="2" indent="-317500" algn="ctr">
-              <a:spcBef>
-                <a:spcPts val="0"/>
-              </a:spcBef>
-              <a:spcAft>
-                <a:spcPts val="0"/>
-              </a:spcAft>
-              <a:buSzPts val="1400"/>
-              <a:buChar char="■"/>
-              <a:defRPr/>
-            </a:lvl3pPr>
-            <a:lvl4pPr marL="1828800" lvl="3" indent="-317500" algn="ctr">
-              <a:spcBef>
-                <a:spcPts val="0"/>
-              </a:spcBef>
-              <a:spcAft>
-                <a:spcPts val="0"/>
-              </a:spcAft>
-              <a:buSzPts val="1400"/>
-              <a:buChar char="●"/>
-              <a:defRPr/>
-            </a:lvl4pPr>
-            <a:lvl5pPr marL="2286000" lvl="4" indent="-317500" algn="ctr">
-              <a:spcBef>
-                <a:spcPts val="0"/>
-              </a:spcBef>
-              <a:spcAft>
-                <a:spcPts val="0"/>
-              </a:spcAft>
-              <a:buSzPts val="1400"/>
-              <a:buChar char="○"/>
-              <a:defRPr/>
-            </a:lvl5pPr>
-            <a:lvl6pPr marL="2743200" lvl="5" indent="-317500" algn="ctr">
-              <a:spcBef>
-                <a:spcPts val="0"/>
-              </a:spcBef>
-              <a:spcAft>
-                <a:spcPts val="0"/>
-              </a:spcAft>
-              <a:buSzPts val="1400"/>
-              <a:buChar char="■"/>
-              <a:defRPr/>
-            </a:lvl6pPr>
-            <a:lvl7pPr marL="3200400" lvl="6" indent="-317500" algn="ctr">
-              <a:spcBef>
-                <a:spcPts val="0"/>
-              </a:spcBef>
-              <a:spcAft>
-                <a:spcPts val="0"/>
-              </a:spcAft>
-              <a:buSzPts val="1400"/>
-              <a:buChar char="●"/>
-              <a:defRPr/>
-            </a:lvl7pPr>
-            <a:lvl8pPr marL="3657600" lvl="7" indent="-317500" algn="ctr">
-              <a:spcBef>
-                <a:spcPts val="0"/>
-              </a:spcBef>
-              <a:spcAft>
-                <a:spcPts val="0"/>
-              </a:spcAft>
-              <a:buSzPts val="1400"/>
-              <a:buChar char="○"/>
-              <a:defRPr/>
-            </a:lvl8pPr>
-            <a:lvl9pPr marL="4114800" lvl="8" indent="-317500" algn="ctr">
-              <a:spcBef>
-                <a:spcPts val="0"/>
-              </a:spcBef>
-              <a:spcAft>
-                <a:spcPts val="0"/>
-              </a:spcAft>
-              <a:buSzPts val="1400"/>
-              <a:buChar char="■"/>
-              <a:defRPr/>
-            </a:lvl9pPr>
-          </a:lstStyle>
-          <a:p>
-            <a:endParaRPr/>
-          </a:p>
-        </p:txBody>
-      </p:sp>
-      <p:sp>
-        <p:nvSpPr>
-          <p:cNvPr id="47" name="Google Shape;47;p11"/>
-          <p:cNvSpPr txBox="1">
-            <a:spLocks noGrp="1"/>
-          </p:cNvSpPr>
-          <p:nvPr>
-            <p:ph type="sldNum" idx="12"/>
-          </p:nvPr>
-        </p:nvSpPr>
-        <p:spPr>
-          <a:xfrm>
-            <a:off x="8472458" y="4663217"/>
-            <a:ext cx="548700" cy="393600"/>
-          </a:xfrm>
-          <a:prstGeom prst="rect">
-            <a:avLst/>
-          </a:prstGeom>
-        </p:spPr>
-        <p:txBody>
-          <a:bodyPr spcFirstLastPara="1" wrap="square" lIns="91425" tIns="91425" rIns="91425" bIns="91425" anchor="ctr" anchorCtr="0">
-            <a:normAutofit/>
-          </a:bodyPr>
-          <a:lstStyle>
-            <a:lvl1pPr lvl="0">
-              <a:buNone/>
-              <a:defRPr/>
-            </a:lvl1pPr>
-            <a:lvl2pPr lvl="1">
-              <a:buNone/>
-              <a:defRPr/>
-            </a:lvl2pPr>
-            <a:lvl3pPr lvl="2">
-              <a:buNone/>
-              <a:defRPr/>
-            </a:lvl3pPr>
-            <a:lvl4pPr lvl="3">
-              <a:buNone/>
-              <a:defRPr/>
-            </a:lvl4pPr>
-            <a:lvl5pPr lvl="4">
-              <a:buNone/>
-              <a:defRPr/>
-            </a:lvl5pPr>
-            <a:lvl6pPr lvl="5">
-              <a:buNone/>
-              <a:defRPr/>
-            </a:lvl6pPr>
-            <a:lvl7pPr lvl="6">
-              <a:buNone/>
-              <a:defRPr/>
-            </a:lvl7pPr>
-            <a:lvl8pPr lvl="7">
-              <a:buNone/>
-              <a:defRPr/>
-            </a:lvl8pPr>
-            <a:lvl9pPr lvl="8">
-              <a:buNone/>
-              <a:defRPr/>
-            </a:lvl9pPr>
-          </a:lstStyle>
-          <a:p>
-            <a:pPr marL="0" lvl="0" indent="0" algn="r" rtl="0">
-              <a:spcBef>
-                <a:spcPts val="0"/>
-              </a:spcBef>
-              <a:spcAft>
-                <a:spcPts val="0"/>
-              </a:spcAft>
-              <a:buNone/>
-            </a:pPr>
-            <a:fld id="{00000000-1234-1234-1234-123412341234}" type="slidenum">
-              <a:rPr lang="en"/>
-              <a:t>‹#›</a:t>
-            </a:fld>
-            <a:endParaRPr/>
-          </a:p>
-        </p:txBody>
-      </p:sp>
-    </p:spTree>
-  </p:cSld>
-  <p:clrMapOvr>
-    <a:masterClrMapping/>
-  </p:clrMapOvr>
-</p:sldLayout>
-</file>
-
-<file path=ppt/slideLayouts/slideLayout11.xml><?xml version="1.0" encoding="utf-8"?>
 <p:sldLayout xmlns:a="http://schemas.openxmlformats.org/drawingml/2006/main" xmlns:r="http://schemas.openxmlformats.org/officeDocument/2006/relationships" xmlns:p="http://schemas.openxmlformats.org/presentationml/2006/main" matchingName="Blank" type="blank">
   <p:cSld name="BLANK">
     <p:spTree>
@@ -2641,239 +2497,6 @@
 </file>
 
 <file path=ppt/slideLayouts/slideLayout2.xml><?xml version="1.0" encoding="utf-8"?>
-<p:sldLayout xmlns:a="http://schemas.openxmlformats.org/drawingml/2006/main" xmlns:r="http://schemas.openxmlformats.org/officeDocument/2006/relationships" xmlns:p="http://schemas.openxmlformats.org/presentationml/2006/main" matchingName="Section header" type="secHead">
-  <p:cSld name="SECTION_HEADER">
-    <p:spTree>
-      <p:nvGrpSpPr>
-        <p:cNvPr id="1" name="Shape 13"/>
-        <p:cNvGrpSpPr/>
-        <p:nvPr/>
-      </p:nvGrpSpPr>
-      <p:grpSpPr>
-        <a:xfrm>
-          <a:off x="0" y="0"/>
-          <a:ext cx="0" cy="0"/>
-          <a:chOff x="0" y="0"/>
-          <a:chExt cx="0" cy="0"/>
-        </a:xfrm>
-      </p:grpSpPr>
-      <p:sp>
-        <p:nvSpPr>
-          <p:cNvPr id="14" name="Google Shape;14;p3"/>
-          <p:cNvSpPr txBox="1">
-            <a:spLocks noGrp="1"/>
-          </p:cNvSpPr>
-          <p:nvPr>
-            <p:ph type="title"/>
-          </p:nvPr>
-        </p:nvSpPr>
-        <p:spPr>
-          <a:xfrm>
-            <a:off x="311700" y="2150850"/>
-            <a:ext cx="8520600" cy="841800"/>
-          </a:xfrm>
-          <a:prstGeom prst="rect">
-            <a:avLst/>
-          </a:prstGeom>
-        </p:spPr>
-        <p:txBody>
-          <a:bodyPr spcFirstLastPara="1" wrap="square" lIns="91425" tIns="91425" rIns="91425" bIns="91425" anchor="ctr" anchorCtr="0">
-            <a:normAutofit/>
-          </a:bodyPr>
-          <a:lstStyle>
-            <a:lvl1pPr lvl="0" algn="ctr">
-              <a:spcBef>
-                <a:spcPts val="0"/>
-              </a:spcBef>
-              <a:spcAft>
-                <a:spcPts val="0"/>
-              </a:spcAft>
-              <a:buSzPts val="3600"/>
-              <a:buNone/>
-              <a:defRPr sz="3600"/>
-            </a:lvl1pPr>
-            <a:lvl2pPr lvl="1" algn="ctr">
-              <a:spcBef>
-                <a:spcPts val="0"/>
-              </a:spcBef>
-              <a:spcAft>
-                <a:spcPts val="0"/>
-              </a:spcAft>
-              <a:buSzPts val="3600"/>
-              <a:buNone/>
-              <a:defRPr sz="3600"/>
-            </a:lvl2pPr>
-            <a:lvl3pPr lvl="2" algn="ctr">
-              <a:spcBef>
-                <a:spcPts val="0"/>
-              </a:spcBef>
-              <a:spcAft>
-                <a:spcPts val="0"/>
-              </a:spcAft>
-              <a:buSzPts val="3600"/>
-              <a:buNone/>
-              <a:defRPr sz="3600"/>
-            </a:lvl3pPr>
-            <a:lvl4pPr lvl="3" algn="ctr">
-              <a:spcBef>
-                <a:spcPts val="0"/>
-              </a:spcBef>
-              <a:spcAft>
-                <a:spcPts val="0"/>
-              </a:spcAft>
-              <a:buSzPts val="3600"/>
-              <a:buNone/>
-              <a:defRPr sz="3600"/>
-            </a:lvl4pPr>
-            <a:lvl5pPr lvl="4" algn="ctr">
-              <a:spcBef>
-                <a:spcPts val="0"/>
-              </a:spcBef>
-              <a:spcAft>
-                <a:spcPts val="0"/>
-              </a:spcAft>
-              <a:buSzPts val="3600"/>
-              <a:buNone/>
-              <a:defRPr sz="3600"/>
-            </a:lvl5pPr>
-            <a:lvl6pPr lvl="5" algn="ctr">
-              <a:spcBef>
-                <a:spcPts val="0"/>
-              </a:spcBef>
-              <a:spcAft>
-                <a:spcPts val="0"/>
-              </a:spcAft>
-              <a:buSzPts val="3600"/>
-              <a:buNone/>
-              <a:defRPr sz="3600"/>
-            </a:lvl6pPr>
-            <a:lvl7pPr lvl="6" algn="ctr">
-              <a:spcBef>
-                <a:spcPts val="0"/>
-              </a:spcBef>
-              <a:spcAft>
-                <a:spcPts val="0"/>
-              </a:spcAft>
-              <a:buSzPts val="3600"/>
-              <a:buNone/>
-              <a:defRPr sz="3600"/>
-            </a:lvl7pPr>
-            <a:lvl8pPr lvl="7" algn="ctr">
-              <a:spcBef>
-                <a:spcPts val="0"/>
-              </a:spcBef>
-              <a:spcAft>
-                <a:spcPts val="0"/>
-              </a:spcAft>
-              <a:buSzPts val="3600"/>
-              <a:buNone/>
-              <a:defRPr sz="3600"/>
-            </a:lvl8pPr>
-            <a:lvl9pPr lvl="8" algn="ctr">
-              <a:spcBef>
-                <a:spcPts val="0"/>
-              </a:spcBef>
-              <a:spcAft>
-                <a:spcPts val="0"/>
-              </a:spcAft>
-              <a:buSzPts val="3600"/>
-              <a:buNone/>
-              <a:defRPr sz="3600"/>
-            </a:lvl9pPr>
-          </a:lstStyle>
-          <a:p>
-            <a:endParaRPr/>
-          </a:p>
-        </p:txBody>
-      </p:sp>
-      <p:sp>
-        <p:nvSpPr>
-          <p:cNvPr id="15" name="Google Shape;15;p3"/>
-          <p:cNvSpPr txBox="1">
-            <a:spLocks noGrp="1"/>
-          </p:cNvSpPr>
-          <p:nvPr>
-            <p:ph type="sldNum" idx="12"/>
-          </p:nvPr>
-        </p:nvSpPr>
-        <p:spPr>
-          <a:xfrm>
-            <a:off x="8472458" y="4663217"/>
-            <a:ext cx="548700" cy="393600"/>
-          </a:xfrm>
-          <a:prstGeom prst="rect">
-            <a:avLst/>
-          </a:prstGeom>
-        </p:spPr>
-        <p:txBody>
-          <a:bodyPr spcFirstLastPara="1" wrap="square" lIns="91425" tIns="91425" rIns="91425" bIns="91425" anchor="ctr" anchorCtr="0">
-            <a:normAutofit/>
-          </a:bodyPr>
-          <a:lstStyle>
-            <a:lvl1pPr lvl="0">
-              <a:buNone/>
-              <a:defRPr/>
-            </a:lvl1pPr>
-            <a:lvl2pPr lvl="1">
-              <a:buNone/>
-              <a:defRPr/>
-            </a:lvl2pPr>
-            <a:lvl3pPr lvl="2">
-              <a:buNone/>
-              <a:defRPr/>
-            </a:lvl3pPr>
-            <a:lvl4pPr lvl="3">
-              <a:buNone/>
-              <a:defRPr/>
-            </a:lvl4pPr>
-            <a:lvl5pPr lvl="4">
-              <a:buNone/>
-              <a:defRPr/>
-            </a:lvl5pPr>
-            <a:lvl6pPr lvl="5">
-              <a:buNone/>
-              <a:defRPr/>
-            </a:lvl6pPr>
-            <a:lvl7pPr lvl="6">
-              <a:buNone/>
-              <a:defRPr/>
-            </a:lvl7pPr>
-            <a:lvl8pPr lvl="7">
-              <a:buNone/>
-              <a:defRPr/>
-            </a:lvl8pPr>
-            <a:lvl9pPr lvl="8">
-              <a:buNone/>
-              <a:defRPr/>
-            </a:lvl9pPr>
-          </a:lstStyle>
-          <a:p>
-            <a:pPr marL="0" lvl="0" indent="0" algn="r" rtl="0">
-              <a:spcBef>
-                <a:spcPts val="0"/>
-              </a:spcBef>
-              <a:spcAft>
-                <a:spcPts val="0"/>
-              </a:spcAft>
-              <a:buNone/>
-            </a:pPr>
-            <a:fld id="{00000000-1234-1234-1234-123412341234}" type="slidenum">
-              <a:rPr lang="en"/>
-              <a:t>‹#›</a:t>
-            </a:fld>
-            <a:endParaRPr/>
-          </a:p>
-        </p:txBody>
-      </p:sp>
-    </p:spTree>
-  </p:cSld>
-  <p:clrMapOvr>
-    <a:masterClrMapping/>
-  </p:clrMapOvr>
-</p:sldLayout>
-</file>
-
-<file path=ppt/slideLayouts/slideLayout3.xml><?xml version="1.0" encoding="utf-8"?>
 <p:sldLayout xmlns:a="http://schemas.openxmlformats.org/drawingml/2006/main" xmlns:r="http://schemas.openxmlformats.org/officeDocument/2006/relationships" xmlns:p="http://schemas.openxmlformats.org/presentationml/2006/main" matchingName="Title and body" type="tx">
   <p:cSld name="TITLE_AND_BODY">
     <p:spTree>
@@ -3235,7 +2858,7 @@
 </p:sldLayout>
 </file>
 
-<file path=ppt/slideLayouts/slideLayout4.xml><?xml version="1.0" encoding="utf-8"?>
+<file path=ppt/slideLayouts/slideLayout3.xml><?xml version="1.0" encoding="utf-8"?>
 <p:sldLayout xmlns:a="http://schemas.openxmlformats.org/drawingml/2006/main" xmlns:r="http://schemas.openxmlformats.org/officeDocument/2006/relationships" xmlns:p="http://schemas.openxmlformats.org/presentationml/2006/main" matchingName="Title and two columns" type="twoColTx">
   <p:cSld name="TITLE_AND_TWO_COLUMNS">
     <p:spTree>
@@ -3726,7 +3349,7 @@
 </p:sldLayout>
 </file>
 
-<file path=ppt/slideLayouts/slideLayout5.xml><?xml version="1.0" encoding="utf-8"?>
+<file path=ppt/slideLayouts/slideLayout4.xml><?xml version="1.0" encoding="utf-8"?>
 <p:sldLayout xmlns:a="http://schemas.openxmlformats.org/drawingml/2006/main" xmlns:r="http://schemas.openxmlformats.org/officeDocument/2006/relationships" xmlns:p="http://schemas.openxmlformats.org/presentationml/2006/main" matchingName="Title only" type="titleOnly">
   <p:cSld name="TITLE_ONLY">
     <p:spTree>
@@ -3959,7 +3582,7 @@
 </p:sldLayout>
 </file>
 
-<file path=ppt/slideLayouts/slideLayout6.xml><?xml version="1.0" encoding="utf-8"?>
+<file path=ppt/slideLayouts/slideLayout5.xml><?xml version="1.0" encoding="utf-8"?>
 <p:sldLayout xmlns:a="http://schemas.openxmlformats.org/drawingml/2006/main" xmlns:r="http://schemas.openxmlformats.org/officeDocument/2006/relationships" xmlns:p="http://schemas.openxmlformats.org/presentationml/2006/main" matchingName="One column text">
   <p:cSld name="ONE_COLUMN_TEXT">
     <p:spTree>
@@ -4321,7 +3944,7 @@
 </p:sldLayout>
 </file>
 
-<file path=ppt/slideLayouts/slideLayout7.xml><?xml version="1.0" encoding="utf-8"?>
+<file path=ppt/slideLayouts/slideLayout6.xml><?xml version="1.0" encoding="utf-8"?>
 <p:sldLayout xmlns:a="http://schemas.openxmlformats.org/drawingml/2006/main" xmlns:r="http://schemas.openxmlformats.org/officeDocument/2006/relationships" xmlns:p="http://schemas.openxmlformats.org/presentationml/2006/main" matchingName="Main point">
   <p:cSld name="MAIN_POINT">
     <p:spTree>
@@ -4554,7 +4177,7 @@
 </p:sldLayout>
 </file>
 
-<file path=ppt/slideLayouts/slideLayout8.xml><?xml version="1.0" encoding="utf-8"?>
+<file path=ppt/slideLayouts/slideLayout7.xml><?xml version="1.0" encoding="utf-8"?>
 <p:sldLayout xmlns:a="http://schemas.openxmlformats.org/drawingml/2006/main" xmlns:r="http://schemas.openxmlformats.org/officeDocument/2006/relationships" xmlns:p="http://schemas.openxmlformats.org/presentationml/2006/main" matchingName="Section title and description">
   <p:cSld name="SECTION_TITLE_AND_DESCRIPTION">
     <p:spTree>
@@ -5112,7 +4735,7 @@
 </p:sldLayout>
 </file>
 
-<file path=ppt/slideLayouts/slideLayout9.xml><?xml version="1.0" encoding="utf-8"?>
+<file path=ppt/slideLayouts/slideLayout8.xml><?xml version="1.0" encoding="utf-8"?>
 <p:sldLayout xmlns:a="http://schemas.openxmlformats.org/drawingml/2006/main" xmlns:r="http://schemas.openxmlformats.org/officeDocument/2006/relationships" xmlns:p="http://schemas.openxmlformats.org/presentationml/2006/main" matchingName="Caption">
   <p:cSld name="CAPTION_ONLY">
     <p:spTree>
@@ -5176,6 +4799,370 @@
       <p:sp>
         <p:nvSpPr>
           <p:cNvPr id="43" name="Google Shape;43;p10"/>
+          <p:cNvSpPr txBox="1">
+            <a:spLocks noGrp="1"/>
+          </p:cNvSpPr>
+          <p:nvPr>
+            <p:ph type="sldNum" idx="12"/>
+          </p:nvPr>
+        </p:nvSpPr>
+        <p:spPr>
+          <a:xfrm>
+            <a:off x="8472458" y="4663217"/>
+            <a:ext cx="548700" cy="393600"/>
+          </a:xfrm>
+          <a:prstGeom prst="rect">
+            <a:avLst/>
+          </a:prstGeom>
+        </p:spPr>
+        <p:txBody>
+          <a:bodyPr spcFirstLastPara="1" wrap="square" lIns="91425" tIns="91425" rIns="91425" bIns="91425" anchor="ctr" anchorCtr="0">
+            <a:normAutofit/>
+          </a:bodyPr>
+          <a:lstStyle>
+            <a:lvl1pPr lvl="0">
+              <a:buNone/>
+              <a:defRPr/>
+            </a:lvl1pPr>
+            <a:lvl2pPr lvl="1">
+              <a:buNone/>
+              <a:defRPr/>
+            </a:lvl2pPr>
+            <a:lvl3pPr lvl="2">
+              <a:buNone/>
+              <a:defRPr/>
+            </a:lvl3pPr>
+            <a:lvl4pPr lvl="3">
+              <a:buNone/>
+              <a:defRPr/>
+            </a:lvl4pPr>
+            <a:lvl5pPr lvl="4">
+              <a:buNone/>
+              <a:defRPr/>
+            </a:lvl5pPr>
+            <a:lvl6pPr lvl="5">
+              <a:buNone/>
+              <a:defRPr/>
+            </a:lvl6pPr>
+            <a:lvl7pPr lvl="6">
+              <a:buNone/>
+              <a:defRPr/>
+            </a:lvl7pPr>
+            <a:lvl8pPr lvl="7">
+              <a:buNone/>
+              <a:defRPr/>
+            </a:lvl8pPr>
+            <a:lvl9pPr lvl="8">
+              <a:buNone/>
+              <a:defRPr/>
+            </a:lvl9pPr>
+          </a:lstStyle>
+          <a:p>
+            <a:pPr marL="0" lvl="0" indent="0" algn="r" rtl="0">
+              <a:spcBef>
+                <a:spcPts val="0"/>
+              </a:spcBef>
+              <a:spcAft>
+                <a:spcPts val="0"/>
+              </a:spcAft>
+              <a:buNone/>
+            </a:pPr>
+            <a:fld id="{00000000-1234-1234-1234-123412341234}" type="slidenum">
+              <a:rPr lang="en"/>
+              <a:t>‹#›</a:t>
+            </a:fld>
+            <a:endParaRPr/>
+          </a:p>
+        </p:txBody>
+      </p:sp>
+    </p:spTree>
+  </p:cSld>
+  <p:clrMapOvr>
+    <a:masterClrMapping/>
+  </p:clrMapOvr>
+</p:sldLayout>
+</file>
+
+<file path=ppt/slideLayouts/slideLayout9.xml><?xml version="1.0" encoding="utf-8"?>
+<p:sldLayout xmlns:a="http://schemas.openxmlformats.org/drawingml/2006/main" xmlns:r="http://schemas.openxmlformats.org/officeDocument/2006/relationships" xmlns:p="http://schemas.openxmlformats.org/presentationml/2006/main" matchingName="Big number">
+  <p:cSld name="BIG_NUMBER">
+    <p:spTree>
+      <p:nvGrpSpPr>
+        <p:cNvPr id="1" name="Shape 44"/>
+        <p:cNvGrpSpPr/>
+        <p:nvPr/>
+      </p:nvGrpSpPr>
+      <p:grpSpPr>
+        <a:xfrm>
+          <a:off x="0" y="0"/>
+          <a:ext cx="0" cy="0"/>
+          <a:chOff x="0" y="0"/>
+          <a:chExt cx="0" cy="0"/>
+        </a:xfrm>
+      </p:grpSpPr>
+      <p:sp>
+        <p:nvSpPr>
+          <p:cNvPr id="45" name="Google Shape;45;p11"/>
+          <p:cNvSpPr txBox="1">
+            <a:spLocks noGrp="1"/>
+          </p:cNvSpPr>
+          <p:nvPr>
+            <p:ph type="title" hasCustomPrompt="1"/>
+          </p:nvPr>
+        </p:nvSpPr>
+        <p:spPr>
+          <a:xfrm>
+            <a:off x="311700" y="1106125"/>
+            <a:ext cx="8520600" cy="1963500"/>
+          </a:xfrm>
+          <a:prstGeom prst="rect">
+            <a:avLst/>
+          </a:prstGeom>
+        </p:spPr>
+        <p:txBody>
+          <a:bodyPr spcFirstLastPara="1" wrap="square" lIns="91425" tIns="91425" rIns="91425" bIns="91425" anchor="b" anchorCtr="0">
+            <a:normAutofit/>
+          </a:bodyPr>
+          <a:lstStyle>
+            <a:lvl1pPr lvl="0" algn="ctr">
+              <a:spcBef>
+                <a:spcPts val="0"/>
+              </a:spcBef>
+              <a:spcAft>
+                <a:spcPts val="0"/>
+              </a:spcAft>
+              <a:buSzPts val="12000"/>
+              <a:buNone/>
+              <a:defRPr sz="12000"/>
+            </a:lvl1pPr>
+            <a:lvl2pPr lvl="1" algn="ctr">
+              <a:spcBef>
+                <a:spcPts val="0"/>
+              </a:spcBef>
+              <a:spcAft>
+                <a:spcPts val="0"/>
+              </a:spcAft>
+              <a:buSzPts val="12000"/>
+              <a:buNone/>
+              <a:defRPr sz="12000"/>
+            </a:lvl2pPr>
+            <a:lvl3pPr lvl="2" algn="ctr">
+              <a:spcBef>
+                <a:spcPts val="0"/>
+              </a:spcBef>
+              <a:spcAft>
+                <a:spcPts val="0"/>
+              </a:spcAft>
+              <a:buSzPts val="12000"/>
+              <a:buNone/>
+              <a:defRPr sz="12000"/>
+            </a:lvl3pPr>
+            <a:lvl4pPr lvl="3" algn="ctr">
+              <a:spcBef>
+                <a:spcPts val="0"/>
+              </a:spcBef>
+              <a:spcAft>
+                <a:spcPts val="0"/>
+              </a:spcAft>
+              <a:buSzPts val="12000"/>
+              <a:buNone/>
+              <a:defRPr sz="12000"/>
+            </a:lvl4pPr>
+            <a:lvl5pPr lvl="4" algn="ctr">
+              <a:spcBef>
+                <a:spcPts val="0"/>
+              </a:spcBef>
+              <a:spcAft>
+                <a:spcPts val="0"/>
+              </a:spcAft>
+              <a:buSzPts val="12000"/>
+              <a:buNone/>
+              <a:defRPr sz="12000"/>
+            </a:lvl5pPr>
+            <a:lvl6pPr lvl="5" algn="ctr">
+              <a:spcBef>
+                <a:spcPts val="0"/>
+              </a:spcBef>
+              <a:spcAft>
+                <a:spcPts val="0"/>
+              </a:spcAft>
+              <a:buSzPts val="12000"/>
+              <a:buNone/>
+              <a:defRPr sz="12000"/>
+            </a:lvl6pPr>
+            <a:lvl7pPr lvl="6" algn="ctr">
+              <a:spcBef>
+                <a:spcPts val="0"/>
+              </a:spcBef>
+              <a:spcAft>
+                <a:spcPts val="0"/>
+              </a:spcAft>
+              <a:buSzPts val="12000"/>
+              <a:buNone/>
+              <a:defRPr sz="12000"/>
+            </a:lvl7pPr>
+            <a:lvl8pPr lvl="7" algn="ctr">
+              <a:spcBef>
+                <a:spcPts val="0"/>
+              </a:spcBef>
+              <a:spcAft>
+                <a:spcPts val="0"/>
+              </a:spcAft>
+              <a:buSzPts val="12000"/>
+              <a:buNone/>
+              <a:defRPr sz="12000"/>
+            </a:lvl8pPr>
+            <a:lvl9pPr lvl="8" algn="ctr">
+              <a:spcBef>
+                <a:spcPts val="0"/>
+              </a:spcBef>
+              <a:spcAft>
+                <a:spcPts val="0"/>
+              </a:spcAft>
+              <a:buSzPts val="12000"/>
+              <a:buNone/>
+              <a:defRPr sz="12000"/>
+            </a:lvl9pPr>
+          </a:lstStyle>
+          <a:p>
+            <a:r>
+              <a:t>xx%</a:t>
+            </a:r>
+          </a:p>
+        </p:txBody>
+      </p:sp>
+      <p:sp>
+        <p:nvSpPr>
+          <p:cNvPr id="46" name="Google Shape;46;p11"/>
+          <p:cNvSpPr txBox="1">
+            <a:spLocks noGrp="1"/>
+          </p:cNvSpPr>
+          <p:nvPr>
+            <p:ph type="body" idx="1"/>
+          </p:nvPr>
+        </p:nvSpPr>
+        <p:spPr>
+          <a:xfrm>
+            <a:off x="311700" y="3152225"/>
+            <a:ext cx="8520600" cy="1300800"/>
+          </a:xfrm>
+          <a:prstGeom prst="rect">
+            <a:avLst/>
+          </a:prstGeom>
+        </p:spPr>
+        <p:txBody>
+          <a:bodyPr spcFirstLastPara="1" wrap="square" lIns="91425" tIns="91425" rIns="91425" bIns="91425" anchor="t" anchorCtr="0">
+            <a:normAutofit/>
+          </a:bodyPr>
+          <a:lstStyle>
+            <a:lvl1pPr marL="457200" lvl="0" indent="-342900" algn="ctr">
+              <a:spcBef>
+                <a:spcPts val="0"/>
+              </a:spcBef>
+              <a:spcAft>
+                <a:spcPts val="0"/>
+              </a:spcAft>
+              <a:buSzPts val="1800"/>
+              <a:buChar char="●"/>
+              <a:defRPr/>
+            </a:lvl1pPr>
+            <a:lvl2pPr marL="914400" lvl="1" indent="-317500" algn="ctr">
+              <a:spcBef>
+                <a:spcPts val="0"/>
+              </a:spcBef>
+              <a:spcAft>
+                <a:spcPts val="0"/>
+              </a:spcAft>
+              <a:buSzPts val="1400"/>
+              <a:buChar char="○"/>
+              <a:defRPr/>
+            </a:lvl2pPr>
+            <a:lvl3pPr marL="1371600" lvl="2" indent="-317500" algn="ctr">
+              <a:spcBef>
+                <a:spcPts val="0"/>
+              </a:spcBef>
+              <a:spcAft>
+                <a:spcPts val="0"/>
+              </a:spcAft>
+              <a:buSzPts val="1400"/>
+              <a:buChar char="■"/>
+              <a:defRPr/>
+            </a:lvl3pPr>
+            <a:lvl4pPr marL="1828800" lvl="3" indent="-317500" algn="ctr">
+              <a:spcBef>
+                <a:spcPts val="0"/>
+              </a:spcBef>
+              <a:spcAft>
+                <a:spcPts val="0"/>
+              </a:spcAft>
+              <a:buSzPts val="1400"/>
+              <a:buChar char="●"/>
+              <a:defRPr/>
+            </a:lvl4pPr>
+            <a:lvl5pPr marL="2286000" lvl="4" indent="-317500" algn="ctr">
+              <a:spcBef>
+                <a:spcPts val="0"/>
+              </a:spcBef>
+              <a:spcAft>
+                <a:spcPts val="0"/>
+              </a:spcAft>
+              <a:buSzPts val="1400"/>
+              <a:buChar char="○"/>
+              <a:defRPr/>
+            </a:lvl5pPr>
+            <a:lvl6pPr marL="2743200" lvl="5" indent="-317500" algn="ctr">
+              <a:spcBef>
+                <a:spcPts val="0"/>
+              </a:spcBef>
+              <a:spcAft>
+                <a:spcPts val="0"/>
+              </a:spcAft>
+              <a:buSzPts val="1400"/>
+              <a:buChar char="■"/>
+              <a:defRPr/>
+            </a:lvl6pPr>
+            <a:lvl7pPr marL="3200400" lvl="6" indent="-317500" algn="ctr">
+              <a:spcBef>
+                <a:spcPts val="0"/>
+              </a:spcBef>
+              <a:spcAft>
+                <a:spcPts val="0"/>
+              </a:spcAft>
+              <a:buSzPts val="1400"/>
+              <a:buChar char="●"/>
+              <a:defRPr/>
+            </a:lvl7pPr>
+            <a:lvl8pPr marL="3657600" lvl="7" indent="-317500" algn="ctr">
+              <a:spcBef>
+                <a:spcPts val="0"/>
+              </a:spcBef>
+              <a:spcAft>
+                <a:spcPts val="0"/>
+              </a:spcAft>
+              <a:buSzPts val="1400"/>
+              <a:buChar char="○"/>
+              <a:defRPr/>
+            </a:lvl8pPr>
+            <a:lvl9pPr marL="4114800" lvl="8" indent="-317500" algn="ctr">
+              <a:spcBef>
+                <a:spcPts val="0"/>
+              </a:spcBef>
+              <a:spcAft>
+                <a:spcPts val="0"/>
+              </a:spcAft>
+              <a:buSzPts val="1400"/>
+              <a:buChar char="■"/>
+              <a:defRPr/>
+            </a:lvl9pPr>
+          </a:lstStyle>
+          <a:p>
+            <a:endParaRPr/>
+          </a:p>
+        </p:txBody>
+      </p:sp>
+      <p:sp>
+        <p:nvSpPr>
+          <p:cNvPr id="47" name="Google Shape;47;p11"/>
           <p:cNvSpPr txBox="1">
             <a:spLocks noGrp="1"/>
           </p:cNvSpPr>
@@ -5828,16 +5815,15 @@
   <p:clrMap bg1="lt1" tx1="dk1" bg2="dk2" tx2="lt2" accent1="accent1" accent2="accent2" accent3="accent3" accent4="accent4" accent5="accent5" accent6="accent6" hlink="hlink" folHlink="folHlink"/>
   <p:sldLayoutIdLst>
     <p:sldLayoutId id="2147483648" r:id="rId1"/>
-    <p:sldLayoutId id="2147483649" r:id="rId2"/>
-    <p:sldLayoutId id="2147483650" r:id="rId3"/>
-    <p:sldLayoutId id="2147483651" r:id="rId4"/>
-    <p:sldLayoutId id="2147483652" r:id="rId5"/>
-    <p:sldLayoutId id="2147483653" r:id="rId6"/>
-    <p:sldLayoutId id="2147483654" r:id="rId7"/>
-    <p:sldLayoutId id="2147483655" r:id="rId8"/>
-    <p:sldLayoutId id="2147483656" r:id="rId9"/>
-    <p:sldLayoutId id="2147483657" r:id="rId10"/>
-    <p:sldLayoutId id="2147483658" r:id="rId11"/>
+    <p:sldLayoutId id="2147483650" r:id="rId2"/>
+    <p:sldLayoutId id="2147483651" r:id="rId3"/>
+    <p:sldLayoutId id="2147483652" r:id="rId4"/>
+    <p:sldLayoutId id="2147483653" r:id="rId5"/>
+    <p:sldLayoutId id="2147483654" r:id="rId6"/>
+    <p:sldLayoutId id="2147483655" r:id="rId7"/>
+    <p:sldLayoutId id="2147483656" r:id="rId8"/>
+    <p:sldLayoutId id="2147483657" r:id="rId9"/>
+    <p:sldLayoutId id="2147483658" r:id="rId10"/>
   </p:sldLayoutIdLst>
   <p:hf sldNum="0" hdr="0" ftr="0" dt="0"/>
   <p:txStyles>
@@ -6692,6 +6678,499 @@
 </file>
 
 <file path=ppt/slides/slide10.xml><?xml version="1.0" encoding="utf-8"?>
+<p:sld xmlns:a="http://schemas.openxmlformats.org/drawingml/2006/main" xmlns:r="http://schemas.openxmlformats.org/officeDocument/2006/relationships" xmlns:p="http://schemas.openxmlformats.org/presentationml/2006/main">
+  <p:cSld>
+    <p:spTree>
+      <p:nvGrpSpPr>
+        <p:cNvPr id="1" name="Shape 71"/>
+        <p:cNvGrpSpPr/>
+        <p:nvPr/>
+      </p:nvGrpSpPr>
+      <p:grpSpPr>
+        <a:xfrm>
+          <a:off x="0" y="0"/>
+          <a:ext cx="0" cy="0"/>
+          <a:chOff x="0" y="0"/>
+          <a:chExt cx="0" cy="0"/>
+        </a:xfrm>
+      </p:grpSpPr>
+      <p:pic>
+        <p:nvPicPr>
+          <p:cNvPr id="72" name="Google Shape;72;p15"/>
+          <p:cNvPicPr preferRelativeResize="0"/>
+          <p:nvPr/>
+        </p:nvPicPr>
+        <p:blipFill>
+          <a:blip r:embed="rId3">
+            <a:alphaModFix/>
+          </a:blip>
+          <a:stretch>
+            <a:fillRect/>
+          </a:stretch>
+        </p:blipFill>
+        <p:spPr>
+          <a:xfrm>
+            <a:off x="0" y="0"/>
+            <a:ext cx="9144000" cy="5143500"/>
+          </a:xfrm>
+          <a:prstGeom prst="rect">
+            <a:avLst/>
+          </a:prstGeom>
+          <a:noFill/>
+          <a:ln>
+            <a:noFill/>
+          </a:ln>
+        </p:spPr>
+      </p:pic>
+      <p:pic>
+        <p:nvPicPr>
+          <p:cNvPr id="73" name="Google Shape;73;p15"/>
+          <p:cNvPicPr preferRelativeResize="0"/>
+          <p:nvPr/>
+        </p:nvPicPr>
+        <p:blipFill>
+          <a:blip r:embed="rId4">
+            <a:alphaModFix/>
+          </a:blip>
+          <a:stretch>
+            <a:fillRect/>
+          </a:stretch>
+        </p:blipFill>
+        <p:spPr>
+          <a:xfrm>
+            <a:off x="7685125" y="4591675"/>
+            <a:ext cx="1371926" cy="441325"/>
+          </a:xfrm>
+          <a:prstGeom prst="rect">
+            <a:avLst/>
+          </a:prstGeom>
+          <a:noFill/>
+          <a:ln>
+            <a:noFill/>
+          </a:ln>
+        </p:spPr>
+      </p:pic>
+      <p:pic>
+        <p:nvPicPr>
+          <p:cNvPr id="74" name="Google Shape;74;p15"/>
+          <p:cNvPicPr preferRelativeResize="0"/>
+          <p:nvPr/>
+        </p:nvPicPr>
+        <p:blipFill>
+          <a:blip r:embed="rId5">
+            <a:alphaModFix/>
+          </a:blip>
+          <a:stretch>
+            <a:fillRect/>
+          </a:stretch>
+        </p:blipFill>
+        <p:spPr>
+          <a:xfrm>
+            <a:off x="-50250" y="0"/>
+            <a:ext cx="1224649" cy="1135175"/>
+          </a:xfrm>
+          <a:prstGeom prst="rect">
+            <a:avLst/>
+          </a:prstGeom>
+          <a:noFill/>
+          <a:ln>
+            <a:noFill/>
+          </a:ln>
+        </p:spPr>
+      </p:pic>
+      <p:sp>
+        <p:nvSpPr>
+          <p:cNvPr id="75" name="Google Shape;75;p15"/>
+          <p:cNvSpPr txBox="1"/>
+          <p:nvPr/>
+        </p:nvSpPr>
+        <p:spPr>
+          <a:xfrm>
+            <a:off x="926550" y="1187902"/>
+            <a:ext cx="7290900" cy="553968"/>
+          </a:xfrm>
+          <a:prstGeom prst="rect">
+            <a:avLst/>
+          </a:prstGeom>
+          <a:noFill/>
+          <a:ln>
+            <a:noFill/>
+          </a:ln>
+        </p:spPr>
+        <p:txBody>
+          <a:bodyPr spcFirstLastPara="1" wrap="square" lIns="91425" tIns="91425" rIns="91425" bIns="91425" anchor="t" anchorCtr="0">
+            <a:spAutoFit/>
+          </a:bodyPr>
+          <a:lstStyle/>
+          <a:p>
+            <a:pPr marL="0" lvl="0" indent="0" algn="ctr" rtl="0">
+              <a:spcBef>
+                <a:spcPts val="0"/>
+              </a:spcBef>
+              <a:spcAft>
+                <a:spcPts val="0"/>
+              </a:spcAft>
+              <a:buNone/>
+            </a:pPr>
+            <a:r>
+              <a:rPr lang="en" sz="2400" b="1" dirty="0">
+                <a:solidFill>
+                  <a:srgbClr val="FFFFFF"/>
+                </a:solidFill>
+              </a:rPr>
+              <a:t>Assign target methods to function pointers</a:t>
+            </a:r>
+            <a:endParaRPr sz="2400" b="1" dirty="0">
+              <a:solidFill>
+                <a:srgbClr val="FFFFFF"/>
+              </a:solidFill>
+            </a:endParaRPr>
+          </a:p>
+        </p:txBody>
+      </p:sp>
+      <p:sp>
+        <p:nvSpPr>
+          <p:cNvPr id="6" name="Google Shape;75;p15">
+            <a:extLst>
+              <a:ext uri="{FF2B5EF4-FFF2-40B4-BE49-F238E27FC236}">
+                <a16:creationId xmlns:a16="http://schemas.microsoft.com/office/drawing/2014/main" id="{7CFE1217-B98E-4247-90AD-8768C8687045}"/>
+              </a:ext>
+            </a:extLst>
+          </p:cNvPr>
+          <p:cNvSpPr txBox="1"/>
+          <p:nvPr/>
+        </p:nvSpPr>
+        <p:spPr>
+          <a:xfrm>
+            <a:off x="775470" y="2270349"/>
+            <a:ext cx="7290900" cy="553968"/>
+          </a:xfrm>
+          <a:prstGeom prst="rect">
+            <a:avLst/>
+          </a:prstGeom>
+          <a:noFill/>
+          <a:ln>
+            <a:noFill/>
+          </a:ln>
+        </p:spPr>
+        <p:txBody>
+          <a:bodyPr spcFirstLastPara="1" wrap="square" lIns="91425" tIns="91425" rIns="91425" bIns="91425" anchor="t" anchorCtr="0">
+            <a:spAutoFit/>
+          </a:bodyPr>
+          <a:lstStyle/>
+          <a:p>
+            <a:pPr marL="0" lvl="0" indent="0" algn="ctr" rtl="0">
+              <a:spcBef>
+                <a:spcPts val="0"/>
+              </a:spcBef>
+              <a:spcAft>
+                <a:spcPts val="0"/>
+              </a:spcAft>
+              <a:buNone/>
+            </a:pPr>
+            <a:r>
+              <a:rPr lang="en" sz="2400" b="1" dirty="0">
+                <a:solidFill>
+                  <a:srgbClr val="FFFFFF"/>
+                </a:solidFill>
+              </a:rPr>
+              <a:t>EXAMPLE</a:t>
+            </a:r>
+            <a:endParaRPr sz="2400" b="1" dirty="0">
+              <a:solidFill>
+                <a:srgbClr val="FFFFFF"/>
+              </a:solidFill>
+            </a:endParaRPr>
+          </a:p>
+        </p:txBody>
+      </p:sp>
+    </p:spTree>
+    <p:extLst>
+      <p:ext uri="{BB962C8B-B14F-4D97-AF65-F5344CB8AC3E}">
+        <p14:creationId xmlns:p14="http://schemas.microsoft.com/office/powerpoint/2010/main" val="906761070"/>
+      </p:ext>
+    </p:extLst>
+  </p:cSld>
+  <p:clrMapOvr>
+    <a:masterClrMapping/>
+  </p:clrMapOvr>
+</p:sld>
+</file>
+
+<file path=ppt/slides/slide11.xml><?xml version="1.0" encoding="utf-8"?>
+<p:sld xmlns:a="http://schemas.openxmlformats.org/drawingml/2006/main" xmlns:r="http://schemas.openxmlformats.org/officeDocument/2006/relationships" xmlns:p="http://schemas.openxmlformats.org/presentationml/2006/main">
+  <p:cSld>
+    <p:spTree>
+      <p:nvGrpSpPr>
+        <p:cNvPr id="1" name="Shape 137"/>
+        <p:cNvGrpSpPr/>
+        <p:nvPr/>
+      </p:nvGrpSpPr>
+      <p:grpSpPr>
+        <a:xfrm>
+          <a:off x="0" y="0"/>
+          <a:ext cx="0" cy="0"/>
+          <a:chOff x="0" y="0"/>
+          <a:chExt cx="0" cy="0"/>
+        </a:xfrm>
+      </p:grpSpPr>
+      <p:pic>
+        <p:nvPicPr>
+          <p:cNvPr id="138" name="Google Shape;138;p22"/>
+          <p:cNvPicPr preferRelativeResize="0"/>
+          <p:nvPr/>
+        </p:nvPicPr>
+        <p:blipFill>
+          <a:blip r:embed="rId3">
+            <a:alphaModFix/>
+          </a:blip>
+          <a:stretch>
+            <a:fillRect/>
+          </a:stretch>
+        </p:blipFill>
+        <p:spPr>
+          <a:xfrm>
+            <a:off x="0" y="0"/>
+            <a:ext cx="9144000" cy="5143500"/>
+          </a:xfrm>
+          <a:prstGeom prst="rect">
+            <a:avLst/>
+          </a:prstGeom>
+          <a:noFill/>
+          <a:ln>
+            <a:noFill/>
+          </a:ln>
+        </p:spPr>
+      </p:pic>
+      <p:pic>
+        <p:nvPicPr>
+          <p:cNvPr id="139" name="Google Shape;139;p22"/>
+          <p:cNvPicPr preferRelativeResize="0"/>
+          <p:nvPr/>
+        </p:nvPicPr>
+        <p:blipFill>
+          <a:blip r:embed="rId4">
+            <a:alphaModFix/>
+          </a:blip>
+          <a:stretch>
+            <a:fillRect/>
+          </a:stretch>
+        </p:blipFill>
+        <p:spPr>
+          <a:xfrm>
+            <a:off x="7685125" y="4591675"/>
+            <a:ext cx="1371926" cy="441325"/>
+          </a:xfrm>
+          <a:prstGeom prst="rect">
+            <a:avLst/>
+          </a:prstGeom>
+          <a:noFill/>
+          <a:ln>
+            <a:noFill/>
+          </a:ln>
+        </p:spPr>
+      </p:pic>
+      <p:pic>
+        <p:nvPicPr>
+          <p:cNvPr id="140" name="Google Shape;140;p22"/>
+          <p:cNvPicPr preferRelativeResize="0"/>
+          <p:nvPr/>
+        </p:nvPicPr>
+        <p:blipFill>
+          <a:blip r:embed="rId5">
+            <a:alphaModFix/>
+          </a:blip>
+          <a:stretch>
+            <a:fillRect/>
+          </a:stretch>
+        </p:blipFill>
+        <p:spPr>
+          <a:xfrm>
+            <a:off x="-50250" y="0"/>
+            <a:ext cx="1224649" cy="1135175"/>
+          </a:xfrm>
+          <a:prstGeom prst="rect">
+            <a:avLst/>
+          </a:prstGeom>
+          <a:noFill/>
+          <a:ln>
+            <a:noFill/>
+          </a:ln>
+        </p:spPr>
+      </p:pic>
+      <p:sp>
+        <p:nvSpPr>
+          <p:cNvPr id="141" name="Google Shape;141;p22"/>
+          <p:cNvSpPr txBox="1"/>
+          <p:nvPr/>
+        </p:nvSpPr>
+        <p:spPr>
+          <a:xfrm>
+            <a:off x="3620063" y="981925"/>
+            <a:ext cx="2772600" cy="554100"/>
+          </a:xfrm>
+          <a:prstGeom prst="rect">
+            <a:avLst/>
+          </a:prstGeom>
+          <a:noFill/>
+          <a:ln>
+            <a:noFill/>
+          </a:ln>
+        </p:spPr>
+        <p:txBody>
+          <a:bodyPr spcFirstLastPara="1" wrap="square" lIns="91425" tIns="91425" rIns="91425" bIns="91425" anchor="t" anchorCtr="0">
+            <a:spAutoFit/>
+          </a:bodyPr>
+          <a:lstStyle/>
+          <a:p>
+            <a:pPr marL="0" lvl="0" indent="0" algn="l" rtl="0">
+              <a:spcBef>
+                <a:spcPts val="0"/>
+              </a:spcBef>
+              <a:spcAft>
+                <a:spcPts val="0"/>
+              </a:spcAft>
+              <a:buNone/>
+            </a:pPr>
+            <a:r>
+              <a:rPr lang="en" sz="2400" b="1">
+                <a:solidFill>
+                  <a:srgbClr val="FFFFFF"/>
+                </a:solidFill>
+              </a:rPr>
+              <a:t>Key takeaways</a:t>
+            </a:r>
+            <a:endParaRPr sz="2400" b="1">
+              <a:solidFill>
+                <a:srgbClr val="FFFFFF"/>
+              </a:solidFill>
+            </a:endParaRPr>
+          </a:p>
+        </p:txBody>
+      </p:sp>
+      <p:pic>
+        <p:nvPicPr>
+          <p:cNvPr id="142" name="Google Shape;142;p22"/>
+          <p:cNvPicPr preferRelativeResize="0"/>
+          <p:nvPr/>
+        </p:nvPicPr>
+        <p:blipFill>
+          <a:blip r:embed="rId6">
+            <a:alphaModFix/>
+          </a:blip>
+          <a:stretch>
+            <a:fillRect/>
+          </a:stretch>
+        </p:blipFill>
+        <p:spPr>
+          <a:xfrm>
+            <a:off x="2751338" y="884025"/>
+            <a:ext cx="747025" cy="749925"/>
+          </a:xfrm>
+          <a:prstGeom prst="rect">
+            <a:avLst/>
+          </a:prstGeom>
+          <a:noFill/>
+          <a:ln>
+            <a:noFill/>
+          </a:ln>
+        </p:spPr>
+      </p:pic>
+      <p:sp>
+        <p:nvSpPr>
+          <p:cNvPr id="143" name="Google Shape;143;p22"/>
+          <p:cNvSpPr txBox="1"/>
+          <p:nvPr/>
+        </p:nvSpPr>
+        <p:spPr>
+          <a:xfrm>
+            <a:off x="1174400" y="2201750"/>
+            <a:ext cx="6862200" cy="2031295"/>
+          </a:xfrm>
+          <a:prstGeom prst="rect">
+            <a:avLst/>
+          </a:prstGeom>
+          <a:noFill/>
+          <a:ln>
+            <a:noFill/>
+          </a:ln>
+        </p:spPr>
+        <p:txBody>
+          <a:bodyPr spcFirstLastPara="1" wrap="square" lIns="91425" tIns="91425" rIns="91425" bIns="91425" anchor="t" anchorCtr="0">
+            <a:spAutoFit/>
+          </a:bodyPr>
+          <a:lstStyle/>
+          <a:p>
+            <a:pPr marL="457200" lvl="0" indent="-381000" algn="l" rtl="0">
+              <a:spcBef>
+                <a:spcPts val="0"/>
+              </a:spcBef>
+              <a:spcAft>
+                <a:spcPts val="0"/>
+              </a:spcAft>
+              <a:buClr>
+                <a:srgbClr val="FFFFFF"/>
+              </a:buClr>
+              <a:buSzPts val="2400"/>
+              <a:buChar char="-"/>
+            </a:pPr>
+            <a:r>
+              <a:rPr lang="en-US" sz="2400" b="1" dirty="0">
+                <a:solidFill>
+                  <a:srgbClr val="FFFFFF"/>
+                </a:solidFill>
+              </a:rPr>
+              <a:t>Function pointers can increase the performance of your application by leveraging opcodes access, calling conventions </a:t>
+            </a:r>
+            <a:r>
+              <a:rPr lang="en-US" sz="2400" b="1">
+                <a:solidFill>
+                  <a:srgbClr val="FFFFFF"/>
+                </a:solidFill>
+              </a:rPr>
+              <a:t>and bypassing CLR </a:t>
+            </a:r>
+            <a:r>
+              <a:rPr lang="en-US" sz="2400" b="1" dirty="0">
+                <a:solidFill>
+                  <a:srgbClr val="FFFFFF"/>
+                </a:solidFill>
+              </a:rPr>
+              <a:t>checking</a:t>
+            </a:r>
+            <a:endParaRPr sz="2400" b="1" dirty="0">
+              <a:solidFill>
+                <a:srgbClr val="FFFFFF"/>
+              </a:solidFill>
+            </a:endParaRPr>
+          </a:p>
+          <a:p>
+            <a:pPr marL="457200" lvl="0" indent="0" algn="l" rtl="0">
+              <a:spcBef>
+                <a:spcPts val="0"/>
+              </a:spcBef>
+              <a:spcAft>
+                <a:spcPts val="0"/>
+              </a:spcAft>
+              <a:buNone/>
+            </a:pPr>
+            <a:endParaRPr sz="2400" b="1" dirty="0">
+              <a:solidFill>
+                <a:srgbClr val="FFFFFF"/>
+              </a:solidFill>
+            </a:endParaRPr>
+          </a:p>
+        </p:txBody>
+      </p:sp>
+    </p:spTree>
+  </p:cSld>
+  <p:clrMapOvr>
+    <a:masterClrMapping/>
+  </p:clrMapOvr>
+</p:sld>
+</file>
+
+<file path=ppt/slides/slide12.xml><?xml version="1.0" encoding="utf-8"?>
 <p:sld xmlns:a="http://schemas.openxmlformats.org/drawingml/2006/main" xmlns:r="http://schemas.openxmlformats.org/officeDocument/2006/relationships" xmlns:p="http://schemas.openxmlformats.org/presentationml/2006/main">
   <p:cSld>
     <p:spTree>
@@ -9979,7 +10458,7 @@
         <p:spPr>
           <a:xfrm>
             <a:off x="1174400" y="2017650"/>
-            <a:ext cx="7290900" cy="554100"/>
+            <a:ext cx="7290900" cy="923299"/>
           </a:xfrm>
           <a:prstGeom prst="rect">
             <a:avLst/>
@@ -10011,6 +10490,25 @@
                 </a:solidFill>
               </a:rPr>
               <a:t>Function pointer conversion</a:t>
+            </a:r>
+          </a:p>
+          <a:p>
+            <a:pPr marL="0" lvl="0" indent="0" algn="ctr" rtl="0">
+              <a:spcBef>
+                <a:spcPts val="0"/>
+              </a:spcBef>
+              <a:spcAft>
+                <a:spcPts val="0"/>
+              </a:spcAft>
+              <a:buNone/>
+            </a:pPr>
+            <a:r>
+              <a:rPr lang="en" sz="2400" b="1" dirty="0">
+                <a:solidFill>
+                  <a:srgbClr val="FFFFFF"/>
+                </a:solidFill>
+              </a:rPr>
+              <a:t>(implicit)</a:t>
             </a:r>
             <a:endParaRPr sz="2400" b="1" dirty="0">
               <a:solidFill>
@@ -10142,8 +10640,8 @@
         </p:nvSpPr>
         <p:spPr>
           <a:xfrm>
-            <a:off x="562074" y="1468898"/>
-            <a:ext cx="6862200" cy="1508075"/>
+            <a:off x="362238" y="1394612"/>
+            <a:ext cx="6838662" cy="3847177"/>
           </a:xfrm>
           <a:prstGeom prst="rect">
             <a:avLst/>
@@ -10159,7 +10657,7 @@
           </a:bodyPr>
           <a:lstStyle/>
           <a:p>
-            <a:pPr marL="457200" lvl="0" indent="-349250" algn="l" rtl="0">
+            <a:pPr marL="107950" lvl="0" algn="l" rtl="0">
               <a:spcBef>
                 <a:spcPts val="0"/>
               </a:spcBef>
@@ -10170,7 +10668,6 @@
                 <a:srgbClr val="FFFFFF"/>
               </a:buClr>
               <a:buSzPts val="1900"/>
-              <a:buChar char="-"/>
             </a:pPr>
             <a:r>
               <a:rPr lang="en" sz="1900" b="1" dirty="0">
@@ -10178,7 +10675,7 @@
                   <a:srgbClr val="FFFFFF"/>
                 </a:solidFill>
               </a:rPr>
-              <a:t>New language constructs that expose IL opcodes </a:t>
+              <a:t>	</a:t>
             </a:r>
           </a:p>
           <a:p>
@@ -10201,8 +10698,92 @@
                   <a:srgbClr val="FFFFFF"/>
                 </a:solidFill>
               </a:rPr>
-              <a:t>Optimization for high performance</a:t>
+              <a:t>A &amp; B have the same number of parameters, types and modifiers (reference)</a:t>
             </a:r>
+          </a:p>
+          <a:p>
+            <a:pPr marL="457200" lvl="0" indent="-349250" algn="l" rtl="0">
+              <a:spcBef>
+                <a:spcPts val="0"/>
+              </a:spcBef>
+              <a:spcAft>
+                <a:spcPts val="0"/>
+              </a:spcAft>
+              <a:buClr>
+                <a:srgbClr val="FFFFFF"/>
+              </a:buClr>
+              <a:buSzPts val="1900"/>
+              <a:buChar char="-"/>
+            </a:pPr>
+            <a:r>
+              <a:rPr lang="en-US" sz="1900" b="1" dirty="0">
+                <a:solidFill>
+                  <a:srgbClr val="FFFFFF"/>
+                </a:solidFill>
+              </a:rPr>
+              <a:t>An identity, implicit reference or pointer conversion exists from value params in A to the corresponding param in B</a:t>
+            </a:r>
+          </a:p>
+          <a:p>
+            <a:pPr marL="457200" lvl="0" indent="-349250" algn="l" rtl="0">
+              <a:spcBef>
+                <a:spcPts val="0"/>
+              </a:spcBef>
+              <a:spcAft>
+                <a:spcPts val="0"/>
+              </a:spcAft>
+              <a:buClr>
+                <a:srgbClr val="FFFFFF"/>
+              </a:buClr>
+              <a:buSzPts val="1900"/>
+              <a:buChar char="-"/>
+            </a:pPr>
+            <a:r>
+              <a:rPr lang="en-US" sz="1900" b="1" dirty="0">
+                <a:solidFill>
+                  <a:srgbClr val="FFFFFF"/>
+                </a:solidFill>
+              </a:rPr>
+              <a:t>Same rules apply for the return type</a:t>
+            </a:r>
+          </a:p>
+          <a:p>
+            <a:pPr marL="457200" lvl="0" indent="-349250" algn="l" rtl="0">
+              <a:spcBef>
+                <a:spcPts val="0"/>
+              </a:spcBef>
+              <a:spcAft>
+                <a:spcPts val="0"/>
+              </a:spcAft>
+              <a:buClr>
+                <a:srgbClr val="FFFFFF"/>
+              </a:buClr>
+              <a:buSzPts val="1900"/>
+              <a:buChar char="-"/>
+            </a:pPr>
+            <a:r>
+              <a:rPr lang="en-US" sz="1900" b="1" dirty="0">
+                <a:solidFill>
+                  <a:srgbClr val="FFFFFF"/>
+                </a:solidFill>
+              </a:rPr>
+              <a:t>Calling convention of A is the same as the calling convention of B</a:t>
+            </a:r>
+          </a:p>
+          <a:p>
+            <a:pPr marL="457200" lvl="0" indent="-349250" algn="l" rtl="0">
+              <a:spcBef>
+                <a:spcPts val="0"/>
+              </a:spcBef>
+              <a:spcAft>
+                <a:spcPts val="0"/>
+              </a:spcAft>
+              <a:buClr>
+                <a:srgbClr val="FFFFFF"/>
+              </a:buClr>
+              <a:buSzPts val="1900"/>
+              <a:buChar char="-"/>
+            </a:pPr>
             <a:endParaRPr sz="1900" b="1" dirty="0">
               <a:solidFill>
                 <a:srgbClr val="FFFFFF"/>
@@ -10257,7 +10838,7 @@
         </p:nvSpPr>
         <p:spPr>
           <a:xfrm>
-            <a:off x="562074" y="858191"/>
+            <a:off x="772649" y="186641"/>
             <a:ext cx="6272565" cy="553968"/>
           </a:xfrm>
           <a:prstGeom prst="rect">
@@ -10291,6 +10872,124 @@
               </a:rPr>
               <a:t>Rules:</a:t>
             </a:r>
+            <a:endParaRPr sz="2400" b="1" dirty="0">
+              <a:solidFill>
+                <a:srgbClr val="FFFFFF"/>
+              </a:solidFill>
+            </a:endParaRPr>
+          </a:p>
+        </p:txBody>
+      </p:sp>
+      <p:sp>
+        <p:nvSpPr>
+          <p:cNvPr id="7" name="Google Shape;67;p14">
+            <a:extLst>
+              <a:ext uri="{FF2B5EF4-FFF2-40B4-BE49-F238E27FC236}">
+                <a16:creationId xmlns:a16="http://schemas.microsoft.com/office/drawing/2014/main" id="{B46CF745-7C8D-47C0-90BA-15B2FAB8F6E4}"/>
+              </a:ext>
+            </a:extLst>
+          </p:cNvPr>
+          <p:cNvSpPr txBox="1"/>
+          <p:nvPr/>
+        </p:nvSpPr>
+        <p:spPr>
+          <a:xfrm>
+            <a:off x="308450" y="640574"/>
+            <a:ext cx="6686514" cy="1508075"/>
+          </a:xfrm>
+          <a:prstGeom prst="rect">
+            <a:avLst/>
+          </a:prstGeom>
+          <a:noFill/>
+          <a:ln>
+            <a:noFill/>
+          </a:ln>
+        </p:spPr>
+        <p:txBody>
+          <a:bodyPr spcFirstLastPara="1" wrap="square" lIns="91425" tIns="91425" rIns="91425" bIns="91425" anchor="t" anchorCtr="0">
+            <a:spAutoFit/>
+          </a:bodyPr>
+          <a:lstStyle/>
+          <a:p>
+            <a:pPr marL="107950" lvl="0" algn="l" rtl="0">
+              <a:spcBef>
+                <a:spcPts val="0"/>
+              </a:spcBef>
+              <a:spcAft>
+                <a:spcPts val="0"/>
+              </a:spcAft>
+              <a:buClr>
+                <a:srgbClr val="FFFFFF"/>
+              </a:buClr>
+              <a:buSzPts val="1900"/>
+            </a:pPr>
+            <a:r>
+              <a:rPr lang="en" sz="1900" b="1" dirty="0">
+                <a:solidFill>
+                  <a:srgbClr val="FFFFFF"/>
+                </a:solidFill>
+              </a:rPr>
+              <a:t>	Converting from </a:t>
+            </a:r>
+            <a:r>
+              <a:rPr lang="en" sz="1900" b="1" dirty="0">
+                <a:solidFill>
+                  <a:srgbClr val="FF0000"/>
+                </a:solidFill>
+              </a:rPr>
+              <a:t>function pointer A </a:t>
+            </a:r>
+            <a:r>
+              <a:rPr lang="en" sz="1900" b="1" dirty="0">
+                <a:solidFill>
+                  <a:srgbClr val="FFFFFF"/>
+                </a:solidFill>
+              </a:rPr>
+              <a:t>to </a:t>
+            </a:r>
+            <a:r>
+              <a:rPr lang="en" sz="1900" b="1" dirty="0">
+                <a:solidFill>
+                  <a:srgbClr val="FF0000"/>
+                </a:solidFill>
+              </a:rPr>
+              <a:t>function pointer B </a:t>
+            </a:r>
+            <a:r>
+              <a:rPr lang="en" sz="1900" b="1" dirty="0">
+                <a:solidFill>
+                  <a:srgbClr val="FFFFFF"/>
+                </a:solidFill>
+              </a:rPr>
+              <a:t>implicitly only if:</a:t>
+            </a:r>
+          </a:p>
+          <a:p>
+            <a:pPr marL="457200" lvl="0" indent="0" algn="l" rtl="0">
+              <a:spcBef>
+                <a:spcPts val="0"/>
+              </a:spcBef>
+              <a:spcAft>
+                <a:spcPts val="0"/>
+              </a:spcAft>
+              <a:buNone/>
+            </a:pPr>
+            <a:endParaRPr sz="2400" b="1" dirty="0">
+              <a:solidFill>
+                <a:srgbClr val="FFFFFF"/>
+              </a:solidFill>
+            </a:endParaRPr>
+          </a:p>
+          <a:p>
+            <a:pPr marL="457200" lvl="0" indent="0" algn="l" rtl="0">
+              <a:spcBef>
+                <a:spcPts val="0"/>
+              </a:spcBef>
+              <a:spcAft>
+                <a:spcPts val="0"/>
+              </a:spcAft>
+              <a:buNone/>
+            </a:pPr>
             <a:endParaRPr sz="2400" b="1" dirty="0">
               <a:solidFill>
                 <a:srgbClr val="FFFFFF"/>
@@ -10317,7 +11016,7 @@
   <p:cSld>
     <p:spTree>
       <p:nvGrpSpPr>
-        <p:cNvPr id="1" name="Shape 137"/>
+        <p:cNvPr id="1" name="Shape 71"/>
         <p:cNvGrpSpPr/>
         <p:nvPr/>
       </p:nvGrpSpPr>
@@ -10331,7 +11030,7 @@
       </p:grpSpPr>
       <p:pic>
         <p:nvPicPr>
-          <p:cNvPr id="138" name="Google Shape;138;p22"/>
+          <p:cNvPr id="72" name="Google Shape;72;p15"/>
           <p:cNvPicPr preferRelativeResize="0"/>
           <p:nvPr/>
         </p:nvPicPr>
@@ -10359,7 +11058,7 @@
       </p:pic>
       <p:pic>
         <p:nvPicPr>
-          <p:cNvPr id="139" name="Google Shape;139;p22"/>
+          <p:cNvPr id="73" name="Google Shape;73;p15"/>
           <p:cNvPicPr preferRelativeResize="0"/>
           <p:nvPr/>
         </p:nvPicPr>
@@ -10387,7 +11086,7 @@
       </p:pic>
       <p:pic>
         <p:nvPicPr>
-          <p:cNvPr id="140" name="Google Shape;140;p22"/>
+          <p:cNvPr id="74" name="Google Shape;74;p15"/>
           <p:cNvPicPr preferRelativeResize="0"/>
           <p:nvPr/>
         </p:nvPicPr>
@@ -10415,14 +11114,14 @@
       </p:pic>
       <p:sp>
         <p:nvSpPr>
-          <p:cNvPr id="141" name="Google Shape;141;p22"/>
+          <p:cNvPr id="75" name="Google Shape;75;p15"/>
           <p:cNvSpPr txBox="1"/>
           <p:nvPr/>
         </p:nvSpPr>
         <p:spPr>
           <a:xfrm>
-            <a:off x="3620063" y="981925"/>
-            <a:ext cx="2772600" cy="554100"/>
+            <a:off x="838223" y="673525"/>
+            <a:ext cx="7290900" cy="923299"/>
           </a:xfrm>
           <a:prstGeom prst="rect">
             <a:avLst/>
@@ -10438,7 +11137,7 @@
           </a:bodyPr>
           <a:lstStyle/>
           <a:p>
-            <a:pPr marL="0" lvl="0" indent="0" algn="l" rtl="0">
+            <a:pPr marL="0" lvl="0" indent="0" algn="ctr" rtl="0">
               <a:spcBef>
                 <a:spcPts val="0"/>
               </a:spcBef>
@@ -10448,14 +11147,33 @@
               <a:buNone/>
             </a:pPr>
             <a:r>
-              <a:rPr lang="en" sz="2400" b="1">
+              <a:rPr lang="en" sz="2400" b="1" dirty="0">
                 <a:solidFill>
                   <a:srgbClr val="FFFFFF"/>
                 </a:solidFill>
               </a:rPr>
-              <a:t>Key takeaways</a:t>
+              <a:t>Function pointer conversion</a:t>
             </a:r>
-            <a:endParaRPr sz="2400" b="1">
+          </a:p>
+          <a:p>
+            <a:pPr marL="0" lvl="0" indent="0" algn="ctr" rtl="0">
+              <a:spcBef>
+                <a:spcPts val="0"/>
+              </a:spcBef>
+              <a:spcAft>
+                <a:spcPts val="0"/>
+              </a:spcAft>
+              <a:buNone/>
+            </a:pPr>
+            <a:r>
+              <a:rPr lang="en" sz="2400" b="1" dirty="0">
+                <a:solidFill>
+                  <a:srgbClr val="FFFFFF"/>
+                </a:solidFill>
+              </a:rPr>
+              <a:t>(implicit)</a:t>
+            </a:r>
+            <a:endParaRPr sz="2400" b="1" dirty="0">
               <a:solidFill>
                 <a:srgbClr val="FFFFFF"/>
               </a:solidFill>
@@ -10463,44 +11181,22 @@
           </a:p>
         </p:txBody>
       </p:sp>
-      <p:pic>
-        <p:nvPicPr>
-          <p:cNvPr id="142" name="Google Shape;142;p22"/>
-          <p:cNvPicPr preferRelativeResize="0"/>
-          <p:nvPr/>
-        </p:nvPicPr>
-        <p:blipFill>
-          <a:blip r:embed="rId6">
-            <a:alphaModFix/>
-          </a:blip>
-          <a:stretch>
-            <a:fillRect/>
-          </a:stretch>
-        </p:blipFill>
-        <p:spPr>
-          <a:xfrm>
-            <a:off x="2751338" y="884025"/>
-            <a:ext cx="747025" cy="749925"/>
-          </a:xfrm>
-          <a:prstGeom prst="rect">
-            <a:avLst/>
-          </a:prstGeom>
-          <a:noFill/>
-          <a:ln>
-            <a:noFill/>
-          </a:ln>
-        </p:spPr>
-      </p:pic>
       <p:sp>
         <p:nvSpPr>
-          <p:cNvPr id="143" name="Google Shape;143;p22"/>
+          <p:cNvPr id="6" name="Google Shape;75;p15">
+            <a:extLst>
+              <a:ext uri="{FF2B5EF4-FFF2-40B4-BE49-F238E27FC236}">
+                <a16:creationId xmlns:a16="http://schemas.microsoft.com/office/drawing/2014/main" id="{7CFE1217-B98E-4247-90AD-8768C8687045}"/>
+              </a:ext>
+            </a:extLst>
+          </p:cNvPr>
           <p:cNvSpPr txBox="1"/>
           <p:nvPr/>
         </p:nvSpPr>
         <p:spPr>
           <a:xfrm>
-            <a:off x="1174400" y="2201750"/>
-            <a:ext cx="6862200" cy="2031295"/>
+            <a:off x="775470" y="2270349"/>
+            <a:ext cx="7290900" cy="553968"/>
           </a:xfrm>
           <a:prstGeom prst="rect">
             <a:avLst/>
@@ -10516,43 +11212,23 @@
           </a:bodyPr>
           <a:lstStyle/>
           <a:p>
-            <a:pPr marL="457200" lvl="0" indent="-381000" algn="l" rtl="0">
-              <a:spcBef>
-                <a:spcPts val="0"/>
-              </a:spcBef>
-              <a:spcAft>
-                <a:spcPts val="0"/>
-              </a:spcAft>
-              <a:buClr>
-                <a:srgbClr val="FFFFFF"/>
-              </a:buClr>
-              <a:buSzPts val="2400"/>
-              <a:buChar char="-"/>
+            <a:pPr marL="0" lvl="0" indent="0" algn="ctr" rtl="0">
+              <a:spcBef>
+                <a:spcPts val="0"/>
+              </a:spcBef>
+              <a:spcAft>
+                <a:spcPts val="0"/>
+              </a:spcAft>
+              <a:buNone/>
             </a:pPr>
             <a:r>
-              <a:rPr lang="en-US" sz="2400" b="1" dirty="0">
+              <a:rPr lang="en" sz="2400" b="1" dirty="0">
                 <a:solidFill>
                   <a:srgbClr val="FFFFFF"/>
                 </a:solidFill>
               </a:rPr>
-              <a:t>Function pointers can increase the performance of your application by leveraging opcodes access, calling conventions and CLR checking</a:t>
+              <a:t>EXAMPLE</a:t>
             </a:r>
-            <a:endParaRPr sz="2400" b="1" dirty="0">
-              <a:solidFill>
-                <a:srgbClr val="FFFFFF"/>
-              </a:solidFill>
-            </a:endParaRPr>
-          </a:p>
-          <a:p>
-            <a:pPr marL="457200" lvl="0" indent="0" algn="l" rtl="0">
-              <a:spcBef>
-                <a:spcPts val="0"/>
-              </a:spcBef>
-              <a:spcAft>
-                <a:spcPts val="0"/>
-              </a:spcAft>
-              <a:buNone/>
-            </a:pPr>
             <a:endParaRPr sz="2400" b="1" dirty="0">
               <a:solidFill>
                 <a:srgbClr val="FFFFFF"/>
@@ -10562,6 +11238,11 @@
         </p:txBody>
       </p:sp>
     </p:spTree>
+    <p:extLst>
+      <p:ext uri="{BB962C8B-B14F-4D97-AF65-F5344CB8AC3E}">
+        <p14:creationId xmlns:p14="http://schemas.microsoft.com/office/powerpoint/2010/main" val="681903325"/>
+      </p:ext>
+    </p:extLst>
   </p:cSld>
   <p:clrMapOvr>
     <a:masterClrMapping/>

</xml_diff>

<commit_message>
function pointer | presentation update
</commit_message>
<xml_diff>
--- a/FunctionPointer/Function Pointers proviz.pptx
+++ b/FunctionPointer/Function Pointers proviz.pptx
@@ -11,13 +11,13 @@
     <p:sldId id="256" r:id="rId2"/>
     <p:sldId id="257" r:id="rId3"/>
     <p:sldId id="267" r:id="rId4"/>
-    <p:sldId id="269" r:id="rId5"/>
-    <p:sldId id="258" r:id="rId6"/>
-    <p:sldId id="259" r:id="rId7"/>
-    <p:sldId id="270" r:id="rId8"/>
-    <p:sldId id="271" r:id="rId9"/>
-    <p:sldId id="272" r:id="rId10"/>
-    <p:sldId id="273" r:id="rId11"/>
+    <p:sldId id="258" r:id="rId5"/>
+    <p:sldId id="259" r:id="rId6"/>
+    <p:sldId id="270" r:id="rId7"/>
+    <p:sldId id="271" r:id="rId8"/>
+    <p:sldId id="272" r:id="rId9"/>
+    <p:sldId id="273" r:id="rId10"/>
+    <p:sldId id="274" r:id="rId11"/>
     <p:sldId id="265" r:id="rId12"/>
     <p:sldId id="266" r:id="rId13"/>
   </p:sldIdLst>
@@ -928,7 +928,7 @@
     </p:spTree>
     <p:extLst>
       <p:ext uri="{BB962C8B-B14F-4D97-AF65-F5344CB8AC3E}">
-        <p14:creationId xmlns:p14="http://schemas.microsoft.com/office/powerpoint/2010/main" val="2303714926"/>
+        <p14:creationId xmlns:p14="http://schemas.microsoft.com/office/powerpoint/2010/main" val="3474818575"/>
       </p:ext>
     </p:extLst>
   </p:cSld>
@@ -1364,7 +1364,7 @@
   <p:cSld>
     <p:spTree>
       <p:nvGrpSpPr>
-        <p:cNvPr id="1" name="Shape 58"/>
+        <p:cNvPr id="1" name="Shape 68"/>
         <p:cNvGrpSpPr/>
         <p:nvPr/>
       </p:nvGrpSpPr>
@@ -1378,7 +1378,7 @@
       </p:grpSpPr>
       <p:sp>
         <p:nvSpPr>
-          <p:cNvPr id="59" name="Google Shape;59;gb576238e23_0_11:notes"/>
+          <p:cNvPr id="69" name="Google Shape;69;ge35dfbd706_0_27:notes"/>
           <p:cNvSpPr>
             <a:spLocks noGrp="1" noRot="1" noChangeAspect="1"/>
           </p:cNvSpPr>
@@ -1419,7 +1419,7 @@
       </p:sp>
       <p:sp>
         <p:nvSpPr>
-          <p:cNvPr id="60" name="Google Shape;60;gb576238e23_0_11:notes"/>
+          <p:cNvPr id="70" name="Google Shape;70;ge35dfbd706_0_27:notes"/>
           <p:cNvSpPr txBox="1">
             <a:spLocks noGrp="1"/>
           </p:cNvSpPr>
@@ -1456,11 +1456,6 @@
         </p:txBody>
       </p:sp>
     </p:spTree>
-    <p:extLst>
-      <p:ext uri="{BB962C8B-B14F-4D97-AF65-F5344CB8AC3E}">
-        <p14:creationId xmlns:p14="http://schemas.microsoft.com/office/powerpoint/2010/main" val="2330609493"/>
-      </p:ext>
-    </p:extLst>
   </p:cSld>
   <p:clrMapOvr>
     <a:masterClrMapping/>
@@ -1469,6 +1464,110 @@
 </file>
 
 <file path=ppt/notesSlides/notesSlide5.xml><?xml version="1.0" encoding="utf-8"?>
+<p:notes xmlns:a="http://schemas.openxmlformats.org/drawingml/2006/main" xmlns:r="http://schemas.openxmlformats.org/officeDocument/2006/relationships" xmlns:p="http://schemas.openxmlformats.org/presentationml/2006/main" showMasterSp="0" showMasterPhAnim="0">
+  <p:cSld>
+    <p:spTree>
+      <p:nvGrpSpPr>
+        <p:cNvPr id="1" name="Shape 76"/>
+        <p:cNvGrpSpPr/>
+        <p:nvPr/>
+      </p:nvGrpSpPr>
+      <p:grpSpPr>
+        <a:xfrm>
+          <a:off x="0" y="0"/>
+          <a:ext cx="0" cy="0"/>
+          <a:chOff x="0" y="0"/>
+          <a:chExt cx="0" cy="0"/>
+        </a:xfrm>
+      </p:grpSpPr>
+      <p:sp>
+        <p:nvSpPr>
+          <p:cNvPr id="77" name="Google Shape;77;ge35dfbd706_0_1:notes"/>
+          <p:cNvSpPr>
+            <a:spLocks noGrp="1" noRot="1" noChangeAspect="1"/>
+          </p:cNvSpPr>
+          <p:nvPr>
+            <p:ph type="sldImg" idx="2"/>
+          </p:nvPr>
+        </p:nvSpPr>
+        <p:spPr>
+          <a:xfrm>
+            <a:off x="381000" y="685800"/>
+            <a:ext cx="6096000" cy="3429000"/>
+          </a:xfrm>
+          <a:custGeom>
+            <a:avLst/>
+            <a:gdLst/>
+            <a:ahLst/>
+            <a:cxnLst/>
+            <a:rect l="l" t="t" r="r" b="b"/>
+            <a:pathLst>
+              <a:path w="120000" h="120000" extrusionOk="0">
+                <a:moveTo>
+                  <a:pt x="0" y="0"/>
+                </a:moveTo>
+                <a:lnTo>
+                  <a:pt x="120000" y="0"/>
+                </a:lnTo>
+                <a:lnTo>
+                  <a:pt x="120000" y="120000"/>
+                </a:lnTo>
+                <a:lnTo>
+                  <a:pt x="0" y="120000"/>
+                </a:lnTo>
+                <a:close/>
+              </a:path>
+            </a:pathLst>
+          </a:custGeom>
+        </p:spPr>
+      </p:sp>
+      <p:sp>
+        <p:nvSpPr>
+          <p:cNvPr id="78" name="Google Shape;78;ge35dfbd706_0_1:notes"/>
+          <p:cNvSpPr txBox="1">
+            <a:spLocks noGrp="1"/>
+          </p:cNvSpPr>
+          <p:nvPr>
+            <p:ph type="body" idx="1"/>
+          </p:nvPr>
+        </p:nvSpPr>
+        <p:spPr>
+          <a:xfrm>
+            <a:off x="685800" y="4343400"/>
+            <a:ext cx="5486400" cy="4114800"/>
+          </a:xfrm>
+          <a:prstGeom prst="rect">
+            <a:avLst/>
+          </a:prstGeom>
+        </p:spPr>
+        <p:txBody>
+          <a:bodyPr spcFirstLastPara="1" wrap="square" lIns="91425" tIns="91425" rIns="91425" bIns="91425" anchor="t" anchorCtr="0">
+            <a:noAutofit/>
+          </a:bodyPr>
+          <a:lstStyle/>
+          <a:p>
+            <a:pPr marL="0" lvl="0" indent="0" algn="l" rtl="0">
+              <a:spcBef>
+                <a:spcPts val="0"/>
+              </a:spcBef>
+              <a:spcAft>
+                <a:spcPts val="0"/>
+              </a:spcAft>
+              <a:buNone/>
+            </a:pPr>
+            <a:endParaRPr/>
+          </a:p>
+        </p:txBody>
+      </p:sp>
+    </p:spTree>
+  </p:cSld>
+  <p:clrMapOvr>
+    <a:masterClrMapping/>
+  </p:clrMapOvr>
+</p:notes>
+</file>
+
+<file path=ppt/notesSlides/notesSlide6.xml><?xml version="1.0" encoding="utf-8"?>
 <p:notes xmlns:a="http://schemas.openxmlformats.org/drawingml/2006/main" xmlns:r="http://schemas.openxmlformats.org/officeDocument/2006/relationships" xmlns:p="http://schemas.openxmlformats.org/presentationml/2006/main" showMasterSp="0" showMasterPhAnim="0">
   <p:cSld>
     <p:spTree>
@@ -1565,6 +1664,11 @@
         </p:txBody>
       </p:sp>
     </p:spTree>
+    <p:extLst>
+      <p:ext uri="{BB962C8B-B14F-4D97-AF65-F5344CB8AC3E}">
+        <p14:creationId xmlns:p14="http://schemas.microsoft.com/office/powerpoint/2010/main" val="1671709530"/>
+      </p:ext>
+    </p:extLst>
   </p:cSld>
   <p:clrMapOvr>
     <a:masterClrMapping/>
@@ -1572,12 +1676,12 @@
 </p:notes>
 </file>
 
-<file path=ppt/notesSlides/notesSlide6.xml><?xml version="1.0" encoding="utf-8"?>
+<file path=ppt/notesSlides/notesSlide7.xml><?xml version="1.0" encoding="utf-8"?>
 <p:notes xmlns:a="http://schemas.openxmlformats.org/drawingml/2006/main" xmlns:r="http://schemas.openxmlformats.org/officeDocument/2006/relationships" xmlns:p="http://schemas.openxmlformats.org/presentationml/2006/main" showMasterSp="0" showMasterPhAnim="0">
   <p:cSld>
     <p:spTree>
       <p:nvGrpSpPr>
-        <p:cNvPr id="1" name="Shape 76"/>
+        <p:cNvPr id="1" name="Shape 58"/>
         <p:cNvGrpSpPr/>
         <p:nvPr/>
       </p:nvGrpSpPr>
@@ -1591,7 +1695,7 @@
       </p:grpSpPr>
       <p:sp>
         <p:nvSpPr>
-          <p:cNvPr id="77" name="Google Shape;77;ge35dfbd706_0_1:notes"/>
+          <p:cNvPr id="59" name="Google Shape;59;gb576238e23_0_11:notes"/>
           <p:cNvSpPr>
             <a:spLocks noGrp="1" noRot="1" noChangeAspect="1"/>
           </p:cNvSpPr>
@@ -1632,7 +1736,7 @@
       </p:sp>
       <p:sp>
         <p:nvSpPr>
-          <p:cNvPr id="78" name="Google Shape;78;ge35dfbd706_0_1:notes"/>
+          <p:cNvPr id="60" name="Google Shape;60;gb576238e23_0_11:notes"/>
           <p:cNvSpPr txBox="1">
             <a:spLocks noGrp="1"/>
           </p:cNvSpPr>
@@ -1669,6 +1773,11 @@
         </p:txBody>
       </p:sp>
     </p:spTree>
+    <p:extLst>
+      <p:ext uri="{BB962C8B-B14F-4D97-AF65-F5344CB8AC3E}">
+        <p14:creationId xmlns:p14="http://schemas.microsoft.com/office/powerpoint/2010/main" val="1441105189"/>
+      </p:ext>
+    </p:extLst>
   </p:cSld>
   <p:clrMapOvr>
     <a:masterClrMapping/>
@@ -1676,7 +1785,7 @@
 </p:notes>
 </file>
 
-<file path=ppt/notesSlides/notesSlide7.xml><?xml version="1.0" encoding="utf-8"?>
+<file path=ppt/notesSlides/notesSlide8.xml><?xml version="1.0" encoding="utf-8"?>
 <p:notes xmlns:a="http://schemas.openxmlformats.org/drawingml/2006/main" xmlns:r="http://schemas.openxmlformats.org/officeDocument/2006/relationships" xmlns:p="http://schemas.openxmlformats.org/presentationml/2006/main" showMasterSp="0" showMasterPhAnim="0">
   <p:cSld>
     <p:spTree>
@@ -1775,116 +1884,7 @@
     </p:spTree>
     <p:extLst>
       <p:ext uri="{BB962C8B-B14F-4D97-AF65-F5344CB8AC3E}">
-        <p14:creationId xmlns:p14="http://schemas.microsoft.com/office/powerpoint/2010/main" val="1671709530"/>
-      </p:ext>
-    </p:extLst>
-  </p:cSld>
-  <p:clrMapOvr>
-    <a:masterClrMapping/>
-  </p:clrMapOvr>
-</p:notes>
-</file>
-
-<file path=ppt/notesSlides/notesSlide8.xml><?xml version="1.0" encoding="utf-8"?>
-<p:notes xmlns:a="http://schemas.openxmlformats.org/drawingml/2006/main" xmlns:r="http://schemas.openxmlformats.org/officeDocument/2006/relationships" xmlns:p="http://schemas.openxmlformats.org/presentationml/2006/main" showMasterSp="0" showMasterPhAnim="0">
-  <p:cSld>
-    <p:spTree>
-      <p:nvGrpSpPr>
-        <p:cNvPr id="1" name="Shape 58"/>
-        <p:cNvGrpSpPr/>
-        <p:nvPr/>
-      </p:nvGrpSpPr>
-      <p:grpSpPr>
-        <a:xfrm>
-          <a:off x="0" y="0"/>
-          <a:ext cx="0" cy="0"/>
-          <a:chOff x="0" y="0"/>
-          <a:chExt cx="0" cy="0"/>
-        </a:xfrm>
-      </p:grpSpPr>
-      <p:sp>
-        <p:nvSpPr>
-          <p:cNvPr id="59" name="Google Shape;59;gb576238e23_0_11:notes"/>
-          <p:cNvSpPr>
-            <a:spLocks noGrp="1" noRot="1" noChangeAspect="1"/>
-          </p:cNvSpPr>
-          <p:nvPr>
-            <p:ph type="sldImg" idx="2"/>
-          </p:nvPr>
-        </p:nvSpPr>
-        <p:spPr>
-          <a:xfrm>
-            <a:off x="381000" y="685800"/>
-            <a:ext cx="6096000" cy="3429000"/>
-          </a:xfrm>
-          <a:custGeom>
-            <a:avLst/>
-            <a:gdLst/>
-            <a:ahLst/>
-            <a:cxnLst/>
-            <a:rect l="l" t="t" r="r" b="b"/>
-            <a:pathLst>
-              <a:path w="120000" h="120000" extrusionOk="0">
-                <a:moveTo>
-                  <a:pt x="0" y="0"/>
-                </a:moveTo>
-                <a:lnTo>
-                  <a:pt x="120000" y="0"/>
-                </a:lnTo>
-                <a:lnTo>
-                  <a:pt x="120000" y="120000"/>
-                </a:lnTo>
-                <a:lnTo>
-                  <a:pt x="0" y="120000"/>
-                </a:lnTo>
-                <a:close/>
-              </a:path>
-            </a:pathLst>
-          </a:custGeom>
-        </p:spPr>
-      </p:sp>
-      <p:sp>
-        <p:nvSpPr>
-          <p:cNvPr id="60" name="Google Shape;60;gb576238e23_0_11:notes"/>
-          <p:cNvSpPr txBox="1">
-            <a:spLocks noGrp="1"/>
-          </p:cNvSpPr>
-          <p:nvPr>
-            <p:ph type="body" idx="1"/>
-          </p:nvPr>
-        </p:nvSpPr>
-        <p:spPr>
-          <a:xfrm>
-            <a:off x="685800" y="4343400"/>
-            <a:ext cx="5486400" cy="4114800"/>
-          </a:xfrm>
-          <a:prstGeom prst="rect">
-            <a:avLst/>
-          </a:prstGeom>
-        </p:spPr>
-        <p:txBody>
-          <a:bodyPr spcFirstLastPara="1" wrap="square" lIns="91425" tIns="91425" rIns="91425" bIns="91425" anchor="t" anchorCtr="0">
-            <a:noAutofit/>
-          </a:bodyPr>
-          <a:lstStyle/>
-          <a:p>
-            <a:pPr marL="0" lvl="0" indent="0" algn="l" rtl="0">
-              <a:spcBef>
-                <a:spcPts val="0"/>
-              </a:spcBef>
-              <a:spcAft>
-                <a:spcPts val="0"/>
-              </a:spcAft>
-              <a:buNone/>
-            </a:pPr>
-            <a:endParaRPr/>
-          </a:p>
-        </p:txBody>
-      </p:sp>
-    </p:spTree>
-    <p:extLst>
-      <p:ext uri="{BB962C8B-B14F-4D97-AF65-F5344CB8AC3E}">
-        <p14:creationId xmlns:p14="http://schemas.microsoft.com/office/powerpoint/2010/main" val="1441105189"/>
+        <p14:creationId xmlns:p14="http://schemas.microsoft.com/office/powerpoint/2010/main" val="3008367328"/>
       </p:ext>
     </p:extLst>
   </p:cSld>
@@ -1993,7 +1993,7 @@
     </p:spTree>
     <p:extLst>
       <p:ext uri="{BB962C8B-B14F-4D97-AF65-F5344CB8AC3E}">
-        <p14:creationId xmlns:p14="http://schemas.microsoft.com/office/powerpoint/2010/main" val="3008367328"/>
+        <p14:creationId xmlns:p14="http://schemas.microsoft.com/office/powerpoint/2010/main" val="2303714926"/>
       </p:ext>
     </p:extLst>
   </p:cSld>
@@ -6787,7 +6787,7 @@
         <p:spPr>
           <a:xfrm>
             <a:off x="926550" y="1187902"/>
-            <a:ext cx="7290900" cy="553968"/>
+            <a:ext cx="7290900" cy="923299"/>
           </a:xfrm>
           <a:prstGeom prst="rect">
             <a:avLst/>
@@ -6818,7 +6818,15 @@
                   <a:srgbClr val="FFFFFF"/>
                 </a:solidFill>
               </a:rPr>
-              <a:t>Assign target methods to function pointers</a:t>
+              <a:t>Function pointers vs delegates </a:t>
+            </a:r>
+            <a:r>
+              <a:rPr lang="en" sz="2400" b="1">
+                <a:solidFill>
+                  <a:srgbClr val="FFFFFF"/>
+                </a:solidFill>
+              </a:rPr>
+              <a:t>performance results</a:t>
             </a:r>
             <a:endParaRPr sz="2400" b="1" dirty="0">
               <a:solidFill>
@@ -6874,7 +6882,7 @@
                   <a:srgbClr val="FFFFFF"/>
                 </a:solidFill>
               </a:rPr>
-              <a:t>EXAMPLE</a:t>
+              <a:t>TBD</a:t>
             </a:r>
             <a:endParaRPr sz="2400" b="1" dirty="0">
               <a:solidFill>
@@ -6887,7 +6895,7 @@
     </p:spTree>
     <p:extLst>
       <p:ext uri="{BB962C8B-B14F-4D97-AF65-F5344CB8AC3E}">
-        <p14:creationId xmlns:p14="http://schemas.microsoft.com/office/powerpoint/2010/main" val="906761070"/>
+        <p14:creationId xmlns:p14="http://schemas.microsoft.com/office/powerpoint/2010/main" val="3875068914"/>
       </p:ext>
     </p:extLst>
   </p:cSld>
@@ -7855,7 +7863,7 @@
                   <a:srgbClr val="FFFFFF"/>
                 </a:solidFill>
               </a:rPr>
-              <a:t>Syntax (1)</a:t>
+              <a:t>Syntax</a:t>
             </a:r>
             <a:endParaRPr sz="2400" b="1" dirty="0">
               <a:solidFill>
@@ -7902,7 +7910,7 @@
         <p:spPr>
           <a:xfrm>
             <a:off x="837846" y="1103142"/>
-            <a:ext cx="8061725" cy="3631733"/>
+            <a:ext cx="8061725" cy="677078"/>
           </a:xfrm>
           <a:prstGeom prst="rect">
             <a:avLst/>
@@ -7938,9 +7946,7 @@
             <a:r>
               <a:rPr lang="en-US" sz="1600" b="1" dirty="0" err="1">
                 <a:solidFill>
-                  <a:schemeClr val="accent6">
-                    <a:lumMod val="75000"/>
-                  </a:schemeClr>
+                  <a:srgbClr val="FFFFFF"/>
                 </a:solidFill>
               </a:rPr>
               <a:t>calling_convention_specifier</a:t>
@@ -7956,10 +7962,7 @@
             <a:r>
               <a:rPr lang="en-US" sz="1600" b="1" dirty="0" err="1">
                 <a:solidFill>
-                  <a:schemeClr val="accent4">
-                    <a:lumMod val="60000"/>
-                    <a:lumOff val="40000"/>
-                  </a:schemeClr>
+                  <a:srgbClr val="FFFFFF"/>
                 </a:solidFill>
               </a:rPr>
               <a:t>funcptr_parameter_list</a:t>
@@ -7975,7 +7978,7 @@
             <a:r>
               <a:rPr lang="en-US" sz="1600" b="1" dirty="0" err="1">
                 <a:solidFill>
-                  <a:srgbClr val="C75ECA"/>
+                  <a:srgbClr val="FFFFFF"/>
                 </a:solidFill>
               </a:rPr>
               <a:t>funcptr_return_type</a:t>
@@ -7988,16 +7991,176 @@
               </a:rPr>
               <a:t> '&gt;'</a:t>
             </a:r>
+            <a:endParaRPr sz="1600" b="1" dirty="0">
+              <a:solidFill>
+                <a:srgbClr val="FFFFFF"/>
+              </a:solidFill>
+            </a:endParaRPr>
+          </a:p>
+        </p:txBody>
+      </p:sp>
+      <p:sp>
+        <p:nvSpPr>
+          <p:cNvPr id="8" name="Google Shape;67;p14">
+            <a:extLst>
+              <a:ext uri="{FF2B5EF4-FFF2-40B4-BE49-F238E27FC236}">
+                <a16:creationId xmlns:a16="http://schemas.microsoft.com/office/drawing/2014/main" id="{5E36032D-681D-47C7-B38E-FA82440A5F25}"/>
+              </a:ext>
+            </a:extLst>
+          </p:cNvPr>
+          <p:cNvSpPr txBox="1"/>
+          <p:nvPr/>
+        </p:nvSpPr>
+        <p:spPr>
+          <a:xfrm>
+            <a:off x="837846" y="2052213"/>
+            <a:ext cx="8061725" cy="2646848"/>
+          </a:xfrm>
+          <a:prstGeom prst="rect">
+            <a:avLst/>
+          </a:prstGeom>
+          <a:noFill/>
+          <a:ln>
+            <a:noFill/>
+          </a:ln>
+        </p:spPr>
+        <p:txBody>
+          <a:bodyPr spcFirstLastPara="1" wrap="square" lIns="91425" tIns="91425" rIns="91425" bIns="91425" anchor="t" anchorCtr="0">
+            <a:spAutoFit/>
+          </a:bodyPr>
+          <a:lstStyle/>
+          <a:p>
+            <a:pPr marL="457200" lvl="0" indent="0" algn="l" rtl="0">
+              <a:spcBef>
+                <a:spcPts val="0"/>
+              </a:spcBef>
+              <a:spcAft>
+                <a:spcPts val="0"/>
+              </a:spcAft>
+              <a:buNone/>
+            </a:pPr>
+            <a:r>
+              <a:rPr lang="en-US" sz="1600" b="1" dirty="0" err="1">
+                <a:solidFill>
+                  <a:srgbClr val="FFFFFF"/>
+                </a:solidFill>
+              </a:rPr>
+              <a:t>calling_convention_specifier</a:t>
+            </a:r>
+            <a:r>
+              <a:rPr lang="en-US" sz="1600" b="1" dirty="0">
+                <a:solidFill>
+                  <a:srgbClr val="FFFFFF"/>
+                </a:solidFill>
+              </a:rPr>
+              <a:t>:</a:t>
+            </a:r>
           </a:p>
           <a:p>
-            <a:pPr marL="457200" lvl="0" indent="0" algn="l" rtl="0">
-              <a:spcBef>
-                <a:spcPts val="0"/>
-              </a:spcBef>
-              <a:spcAft>
-                <a:spcPts val="0"/>
-              </a:spcAft>
-              <a:buNone/>
+            <a:pPr marL="457200" lvl="0" algn="l" rtl="0">
+              <a:spcBef>
+                <a:spcPts val="0"/>
+              </a:spcBef>
+              <a:spcAft>
+                <a:spcPts val="0"/>
+              </a:spcAft>
+            </a:pPr>
+            <a:r>
+              <a:rPr lang="en-US" sz="1600" b="1" dirty="0">
+                <a:solidFill>
+                  <a:srgbClr val="FFFFFF"/>
+                </a:solidFill>
+              </a:rPr>
+              <a:t>	-managed</a:t>
+            </a:r>
+          </a:p>
+          <a:p>
+            <a:pPr marL="457200" lvl="0" algn="l" rtl="0">
+              <a:spcBef>
+                <a:spcPts val="0"/>
+              </a:spcBef>
+              <a:spcAft>
+                <a:spcPts val="0"/>
+              </a:spcAft>
+            </a:pPr>
+            <a:r>
+              <a:rPr lang="en-US" sz="1600" b="1" dirty="0">
+                <a:solidFill>
+                  <a:srgbClr val="FFFFFF"/>
+                </a:solidFill>
+              </a:rPr>
+              <a:t>	-unmanaged : </a:t>
+            </a:r>
+            <a:r>
+              <a:rPr lang="en-US" sz="1600" b="1" dirty="0" err="1">
+                <a:solidFill>
+                  <a:srgbClr val="FFFFFF"/>
+                </a:solidFill>
+              </a:rPr>
+              <a:t>Cdecl</a:t>
+            </a:r>
+            <a:r>
+              <a:rPr lang="en-US" sz="1600" b="1" dirty="0">
+                <a:solidFill>
+                  <a:srgbClr val="FFFFFF"/>
+                </a:solidFill>
+              </a:rPr>
+              <a:t>, </a:t>
+            </a:r>
+            <a:r>
+              <a:rPr lang="en-US" sz="1600" b="1" dirty="0" err="1">
+                <a:solidFill>
+                  <a:srgbClr val="FFFFFF"/>
+                </a:solidFill>
+              </a:rPr>
+              <a:t>Stdcall</a:t>
+            </a:r>
+            <a:r>
+              <a:rPr lang="en-US" sz="1600" b="1" dirty="0">
+                <a:solidFill>
+                  <a:srgbClr val="FFFFFF"/>
+                </a:solidFill>
+              </a:rPr>
+              <a:t>, </a:t>
+            </a:r>
+            <a:r>
+              <a:rPr lang="en-US" sz="1600" b="1" dirty="0" err="1">
+                <a:solidFill>
+                  <a:srgbClr val="FFFFFF"/>
+                </a:solidFill>
+              </a:rPr>
+              <a:t>Thiscall</a:t>
+            </a:r>
+            <a:r>
+              <a:rPr lang="en-US" sz="1600" b="1" dirty="0">
+                <a:solidFill>
+                  <a:srgbClr val="FFFFFF"/>
+                </a:solidFill>
+              </a:rPr>
+              <a:t>, </a:t>
+            </a:r>
+            <a:r>
+              <a:rPr lang="en-US" sz="1600" b="1" dirty="0" err="1">
+                <a:solidFill>
+                  <a:srgbClr val="FFFFFF"/>
+                </a:solidFill>
+              </a:rPr>
+              <a:t>Fastcall</a:t>
+            </a:r>
+            <a:endParaRPr lang="en-US" sz="1600" b="1" dirty="0">
+              <a:solidFill>
+                <a:srgbClr val="FFFFFF"/>
+              </a:solidFill>
+            </a:endParaRPr>
+          </a:p>
+          <a:p>
+            <a:pPr marL="457200" lvl="0" algn="l" rtl="0">
+              <a:spcBef>
+                <a:spcPts val="0"/>
+              </a:spcBef>
+              <a:spcAft>
+                <a:spcPts val="0"/>
+              </a:spcAft>
             </a:pPr>
             <a:endParaRPr lang="en-US" sz="1600" b="1" dirty="0">
               <a:solidFill>
@@ -8006,69 +8169,36 @@
             </a:endParaRPr>
           </a:p>
           <a:p>
-            <a:pPr marL="457200" lvl="0" indent="0" algn="l" rtl="0">
-              <a:spcBef>
-                <a:spcPts val="0"/>
-              </a:spcBef>
-              <a:spcAft>
-                <a:spcPts val="0"/>
-              </a:spcAft>
-              <a:buNone/>
+            <a:pPr marL="457200" lvl="0" algn="l" rtl="0">
+              <a:spcBef>
+                <a:spcPts val="0"/>
+              </a:spcBef>
+              <a:spcAft>
+                <a:spcPts val="0"/>
+              </a:spcAft>
+            </a:pPr>
+            <a:endParaRPr lang="en-US" sz="1600" b="1" dirty="0">
+              <a:solidFill>
+                <a:srgbClr val="FFFFFF"/>
+              </a:solidFill>
+            </a:endParaRPr>
+          </a:p>
+          <a:p>
+            <a:pPr marL="457200" lvl="0" algn="l" rtl="0">
+              <a:spcBef>
+                <a:spcPts val="0"/>
+              </a:spcBef>
+              <a:spcAft>
+                <a:spcPts val="0"/>
+              </a:spcAft>
             </a:pPr>
             <a:r>
               <a:rPr lang="en-US" sz="1600" b="1" dirty="0" err="1">
                 <a:solidFill>
-                  <a:schemeClr val="accent6">
-                    <a:lumMod val="75000"/>
-                  </a:schemeClr>
+                  <a:srgbClr val="FFFFFF"/>
                 </a:solidFill>
               </a:rPr>
-              <a:t>calling_convention_specifier</a:t>
-            </a:r>
-            <a:endParaRPr lang="en-US" sz="1600" b="1" dirty="0">
-              <a:solidFill>
-                <a:schemeClr val="accent6">
-                  <a:lumMod val="75000"/>
-                </a:schemeClr>
-              </a:solidFill>
-            </a:endParaRPr>
-          </a:p>
-          <a:p>
-            <a:pPr marL="457200" lvl="0" indent="0" rtl="0">
-              <a:spcBef>
-                <a:spcPts val="0"/>
-              </a:spcBef>
-              <a:spcAft>
-                <a:spcPts val="0"/>
-              </a:spcAft>
-              <a:buNone/>
-            </a:pPr>
-            <a:r>
-              <a:rPr lang="en-US" sz="1600" b="1" dirty="0">
-                <a:solidFill>
-                  <a:srgbClr val="FF0000"/>
-                </a:solidFill>
-              </a:rPr>
-              <a:t>	managed</a:t>
-            </a:r>
-          </a:p>
-          <a:p>
-            <a:pPr marL="457200" lvl="0" indent="0" rtl="0">
-              <a:spcBef>
-                <a:spcPts val="0"/>
-              </a:spcBef>
-              <a:spcAft>
-                <a:spcPts val="0"/>
-              </a:spcAft>
-              <a:buNone/>
-            </a:pPr>
-            <a:r>
-              <a:rPr lang="en-US" sz="1600" b="1" dirty="0">
-                <a:solidFill>
-                  <a:srgbClr val="FF0000"/>
-                </a:solidFill>
-              </a:rPr>
-              <a:t>	unmanaged </a:t>
+              <a:t>funcptr_parameter_list</a:t>
             </a:r>
             <a:r>
               <a:rPr lang="en-US" sz="1600" b="1" dirty="0">
@@ -8076,18 +8206,33 @@
                   <a:srgbClr val="FFFFFF"/>
                 </a:solidFill>
               </a:rPr>
-              <a:t>([ </a:t>
+              <a:t>:</a:t>
+            </a:r>
+          </a:p>
+          <a:p>
+            <a:pPr marL="457200" lvl="0" algn="l" rtl="0">
+              <a:spcBef>
+                <a:spcPts val="0"/>
+              </a:spcBef>
+              <a:spcAft>
+                <a:spcPts val="0"/>
+              </a:spcAft>
+            </a:pPr>
+            <a:r>
+              <a:rPr lang="en-US" sz="1600" b="1" dirty="0">
+                <a:solidFill>
+                  <a:srgbClr val="FFFFFF"/>
+                </a:solidFill>
+              </a:rPr>
+              <a:t>	- </a:t>
             </a:r>
             <a:r>
               <a:rPr lang="en-US" sz="1600" b="1" dirty="0" err="1">
                 <a:solidFill>
-                  <a:schemeClr val="accent5">
-                    <a:lumMod val="60000"/>
-                    <a:lumOff val="40000"/>
-                  </a:schemeClr>
+                  <a:srgbClr val="FFFFFF"/>
                 </a:solidFill>
               </a:rPr>
-              <a:t>unmanaged_calling_convention</a:t>
+              <a:t>funcptr_parameter_modifier</a:t>
             </a:r>
             <a:r>
               <a:rPr lang="en-US" sz="1600" b="1" dirty="0">
@@ -8095,18 +8240,56 @@
                   <a:srgbClr val="FFFFFF"/>
                 </a:solidFill>
               </a:rPr>
-              <a:t> ])?</a:t>
+              <a:t>? </a:t>
+            </a:r>
+            <a:r>
+              <a:rPr lang="en-US" sz="1600" b="1" dirty="0" err="1">
+                <a:solidFill>
+                  <a:srgbClr val="FFFFFF"/>
+                </a:solidFill>
+              </a:rPr>
+              <a:t>return_type</a:t>
+            </a:r>
+            <a:endParaRPr lang="en-US" sz="1600" b="1" dirty="0">
+              <a:solidFill>
+                <a:srgbClr val="FFFFFF"/>
+              </a:solidFill>
+            </a:endParaRPr>
+          </a:p>
+          <a:p>
+            <a:pPr marL="457200" lvl="0" algn="l" rtl="0">
+              <a:spcBef>
+                <a:spcPts val="0"/>
+              </a:spcBef>
+              <a:spcAft>
+                <a:spcPts val="0"/>
+              </a:spcAft>
+            </a:pPr>
+            <a:r>
+              <a:rPr lang="en-US" sz="1600" b="1" dirty="0" err="1">
+                <a:solidFill>
+                  <a:srgbClr val="FFFFFF"/>
+                </a:solidFill>
+              </a:rPr>
+              <a:t>funcptr_return_type</a:t>
+            </a:r>
+            <a:r>
+              <a:rPr lang="en-US" sz="1600" b="1" dirty="0">
+                <a:solidFill>
+                  <a:srgbClr val="FFFFFF"/>
+                </a:solidFill>
+              </a:rPr>
+              <a:t>:</a:t>
             </a:r>
           </a:p>
           <a:p>
-            <a:pPr marL="457200" lvl="0" indent="0" algn="l" rtl="0">
-              <a:spcBef>
-                <a:spcPts val="0"/>
-              </a:spcBef>
-              <a:spcAft>
-                <a:spcPts val="0"/>
-              </a:spcAft>
-              <a:buNone/>
+            <a:pPr marL="457200" lvl="0" algn="l" rtl="0">
+              <a:spcBef>
+                <a:spcPts val="0"/>
+              </a:spcBef>
+              <a:spcAft>
+                <a:spcPts val="0"/>
+              </a:spcAft>
             </a:pPr>
             <a:r>
               <a:rPr lang="en-US" sz="1600" b="1" dirty="0">
@@ -8114,165 +8297,48 @@
                   <a:srgbClr val="FFFFFF"/>
                 </a:solidFill>
               </a:rPr>
-              <a:t>  </a:t>
-            </a:r>
-          </a:p>
-          <a:p>
-            <a:pPr marL="457200" lvl="0" indent="0" algn="l" rtl="0">
-              <a:spcBef>
-                <a:spcPts val="0"/>
-              </a:spcBef>
-              <a:spcAft>
-                <a:spcPts val="0"/>
-              </a:spcAft>
-              <a:buNone/>
-            </a:pPr>
-            <a:r>
-              <a:rPr lang="en-US" sz="1600" b="1" dirty="0" err="1">
-                <a:solidFill>
-                  <a:schemeClr val="accent5">
-                    <a:lumMod val="60000"/>
-                    <a:lumOff val="40000"/>
-                  </a:schemeClr>
-                </a:solidFill>
-              </a:rPr>
-              <a:t>unmanaged_calling_convention</a:t>
-            </a:r>
-            <a:endParaRPr lang="en-US" sz="1600" b="1" dirty="0">
-              <a:solidFill>
-                <a:schemeClr val="accent5">
-                  <a:lumMod val="60000"/>
-                  <a:lumOff val="40000"/>
-                </a:schemeClr>
-              </a:solidFill>
-            </a:endParaRPr>
-          </a:p>
-          <a:p>
-            <a:pPr marL="457200" lvl="2"/>
-            <a:r>
-              <a:rPr lang="en-US" sz="1600" b="1" dirty="0">
-                <a:solidFill>
-                  <a:srgbClr val="FF0000"/>
-                </a:solidFill>
-              </a:rPr>
-              <a:t>	</a:t>
+              <a:t>	- </a:t>
             </a:r>
             <a:r>
               <a:rPr lang="en-US" sz="1600" b="1" dirty="0" err="1">
                 <a:solidFill>
-                  <a:srgbClr val="FF0000"/>
+                  <a:srgbClr val="FFFFFF"/>
                 </a:solidFill>
               </a:rPr>
-              <a:t>Cdecl</a:t>
+              <a:t>funcptr_return_modifier</a:t>
             </a:r>
-            <a:endParaRPr lang="en-US" sz="1600" b="1" dirty="0">
-              <a:solidFill>
-                <a:srgbClr val="FF0000"/>
-              </a:solidFill>
-            </a:endParaRPr>
-          </a:p>
-          <a:p>
-            <a:pPr marL="457200" lvl="2"/>
-            <a:r>
-              <a:rPr lang="en-US" sz="1600" b="1" dirty="0">
-                <a:solidFill>
-                  <a:srgbClr val="FF0000"/>
-                </a:solidFill>
-              </a:rPr>
-              <a:t>	</a:t>
-            </a:r>
-            <a:r>
-              <a:rPr lang="en-US" sz="1600" b="1" dirty="0" err="1">
-                <a:solidFill>
-                  <a:srgbClr val="FF0000"/>
-                </a:solidFill>
-              </a:rPr>
-              <a:t>Stdcall</a:t>
-            </a:r>
-            <a:endParaRPr lang="en-US" sz="1600" b="1" dirty="0">
-              <a:solidFill>
-                <a:srgbClr val="FF0000"/>
-              </a:solidFill>
-            </a:endParaRPr>
-          </a:p>
-          <a:p>
-            <a:pPr marL="457200" lvl="2"/>
-            <a:r>
-              <a:rPr lang="en-US" sz="1600" b="1" dirty="0">
-                <a:solidFill>
-                  <a:srgbClr val="FF0000"/>
-                </a:solidFill>
-              </a:rPr>
-              <a:t>	</a:t>
-            </a:r>
-            <a:r>
-              <a:rPr lang="en-US" sz="1600" b="1" dirty="0" err="1">
-                <a:solidFill>
-                  <a:srgbClr val="FF0000"/>
-                </a:solidFill>
-              </a:rPr>
-              <a:t>Thiscall</a:t>
-            </a:r>
-            <a:endParaRPr lang="en-US" sz="1600" b="1" dirty="0">
-              <a:solidFill>
-                <a:srgbClr val="FF0000"/>
-              </a:solidFill>
-            </a:endParaRPr>
-          </a:p>
-          <a:p>
-            <a:pPr marL="457200" lvl="2"/>
-            <a:r>
-              <a:rPr lang="en-US" sz="1600" b="1" dirty="0">
-                <a:solidFill>
-                  <a:srgbClr val="FF0000"/>
-                </a:solidFill>
-              </a:rPr>
-              <a:t>	</a:t>
-            </a:r>
-            <a:r>
-              <a:rPr lang="en-US" sz="1600" b="1" dirty="0" err="1">
-                <a:solidFill>
-                  <a:srgbClr val="FF0000"/>
-                </a:solidFill>
-              </a:rPr>
-              <a:t>Fastcall</a:t>
-            </a:r>
-            <a:endParaRPr lang="en-US" sz="1600" b="1" dirty="0">
-              <a:solidFill>
-                <a:srgbClr val="FF0000"/>
-              </a:solidFill>
-            </a:endParaRPr>
-          </a:p>
-          <a:p>
-            <a:pPr marL="457200" lvl="2"/>
             <a:r>
               <a:rPr lang="en-US" sz="1600" b="1" dirty="0">
                 <a:solidFill>
                   <a:srgbClr val="FFFFFF"/>
                 </a:solidFill>
               </a:rPr>
-              <a:t>	identifier (',' identifier)*</a:t>
+              <a:t>? </a:t>
             </a:r>
-          </a:p>
-          <a:p>
-            <a:pPr marL="457200" lvl="0" indent="0" algn="l" rtl="0">
-              <a:spcBef>
-                <a:spcPts val="0"/>
-              </a:spcBef>
-              <a:spcAft>
-                <a:spcPts val="0"/>
-              </a:spcAft>
-              <a:buNone/>
-            </a:pPr>
             <a:r>
-              <a:rPr lang="en-US" sz="1600" b="1" dirty="0">
+              <a:rPr lang="en-US" sz="1600" b="1" dirty="0" err="1">
                 <a:solidFill>
                   <a:srgbClr val="FFFFFF"/>
                 </a:solidFill>
               </a:rPr>
-              <a:t>    </a:t>
+              <a:t>return_type</a:t>
             </a:r>
-            <a:endParaRPr sz="1600" b="1" dirty="0">
+            <a:endParaRPr lang="en-US" sz="1600" b="1" dirty="0">
+              <a:solidFill>
+                <a:srgbClr val="FFFFFF"/>
+              </a:solidFill>
+            </a:endParaRPr>
+          </a:p>
+          <a:p>
+            <a:pPr marL="457200" lvl="0" algn="l" rtl="0">
+              <a:spcBef>
+                <a:spcPts val="0"/>
+              </a:spcBef>
+              <a:spcAft>
+                <a:spcPts val="0"/>
+              </a:spcAft>
+            </a:pPr>
+            <a:endParaRPr lang="en-US" sz="1600" b="1" dirty="0">
               <a:solidFill>
                 <a:srgbClr val="FFFFFF"/>
               </a:solidFill>
@@ -8294,704 +8360,6 @@
 </file>
 
 <file path=ppt/slides/slide4.xml><?xml version="1.0" encoding="utf-8"?>
-<p:sld xmlns:a="http://schemas.openxmlformats.org/drawingml/2006/main" xmlns:r="http://schemas.openxmlformats.org/officeDocument/2006/relationships" xmlns:p="http://schemas.openxmlformats.org/presentationml/2006/main">
-  <p:cSld>
-    <p:spTree>
-      <p:nvGrpSpPr>
-        <p:cNvPr id="1" name="Shape 61"/>
-        <p:cNvGrpSpPr/>
-        <p:nvPr/>
-      </p:nvGrpSpPr>
-      <p:grpSpPr>
-        <a:xfrm>
-          <a:off x="0" y="0"/>
-          <a:ext cx="0" cy="0"/>
-          <a:chOff x="0" y="0"/>
-          <a:chExt cx="0" cy="0"/>
-        </a:xfrm>
-      </p:grpSpPr>
-      <p:pic>
-        <p:nvPicPr>
-          <p:cNvPr id="62" name="Google Shape;62;p14"/>
-          <p:cNvPicPr preferRelativeResize="0"/>
-          <p:nvPr/>
-        </p:nvPicPr>
-        <p:blipFill>
-          <a:blip r:embed="rId3">
-            <a:alphaModFix/>
-          </a:blip>
-          <a:stretch>
-            <a:fillRect/>
-          </a:stretch>
-        </p:blipFill>
-        <p:spPr>
-          <a:xfrm>
-            <a:off x="0" y="0"/>
-            <a:ext cx="9144000" cy="5143500"/>
-          </a:xfrm>
-          <a:prstGeom prst="rect">
-            <a:avLst/>
-          </a:prstGeom>
-          <a:noFill/>
-          <a:ln>
-            <a:noFill/>
-          </a:ln>
-        </p:spPr>
-      </p:pic>
-      <p:pic>
-        <p:nvPicPr>
-          <p:cNvPr id="63" name="Google Shape;63;p14"/>
-          <p:cNvPicPr preferRelativeResize="0"/>
-          <p:nvPr/>
-        </p:nvPicPr>
-        <p:blipFill>
-          <a:blip r:embed="rId4">
-            <a:alphaModFix/>
-          </a:blip>
-          <a:stretch>
-            <a:fillRect/>
-          </a:stretch>
-        </p:blipFill>
-        <p:spPr>
-          <a:xfrm>
-            <a:off x="7685125" y="4591675"/>
-            <a:ext cx="1371926" cy="441325"/>
-          </a:xfrm>
-          <a:prstGeom prst="rect">
-            <a:avLst/>
-          </a:prstGeom>
-          <a:noFill/>
-          <a:ln>
-            <a:noFill/>
-          </a:ln>
-        </p:spPr>
-      </p:pic>
-      <p:pic>
-        <p:nvPicPr>
-          <p:cNvPr id="64" name="Google Shape;64;p14"/>
-          <p:cNvPicPr preferRelativeResize="0"/>
-          <p:nvPr/>
-        </p:nvPicPr>
-        <p:blipFill>
-          <a:blip r:embed="rId5">
-            <a:alphaModFix/>
-          </a:blip>
-          <a:stretch>
-            <a:fillRect/>
-          </a:stretch>
-        </p:blipFill>
-        <p:spPr>
-          <a:xfrm>
-            <a:off x="-50250" y="0"/>
-            <a:ext cx="1224649" cy="1135175"/>
-          </a:xfrm>
-          <a:prstGeom prst="rect">
-            <a:avLst/>
-          </a:prstGeom>
-          <a:noFill/>
-          <a:ln>
-            <a:noFill/>
-          </a:ln>
-        </p:spPr>
-      </p:pic>
-      <p:sp>
-        <p:nvSpPr>
-          <p:cNvPr id="65" name="Google Shape;65;p14"/>
-          <p:cNvSpPr txBox="1"/>
-          <p:nvPr/>
-        </p:nvSpPr>
-        <p:spPr>
-          <a:xfrm>
-            <a:off x="2134767" y="277049"/>
-            <a:ext cx="2009100" cy="554100"/>
-          </a:xfrm>
-          <a:prstGeom prst="rect">
-            <a:avLst/>
-          </a:prstGeom>
-          <a:noFill/>
-          <a:ln>
-            <a:noFill/>
-          </a:ln>
-        </p:spPr>
-        <p:txBody>
-          <a:bodyPr spcFirstLastPara="1" wrap="square" lIns="91425" tIns="91425" rIns="91425" bIns="91425" anchor="t" anchorCtr="0">
-            <a:spAutoFit/>
-          </a:bodyPr>
-          <a:lstStyle/>
-          <a:p>
-            <a:pPr marL="0" lvl="0" indent="0" algn="l" rtl="0">
-              <a:spcBef>
-                <a:spcPts val="0"/>
-              </a:spcBef>
-              <a:spcAft>
-                <a:spcPts val="0"/>
-              </a:spcAft>
-              <a:buNone/>
-            </a:pPr>
-            <a:r>
-              <a:rPr lang="en" sz="2400" b="1" dirty="0">
-                <a:solidFill>
-                  <a:srgbClr val="FFFFFF"/>
-                </a:solidFill>
-              </a:rPr>
-              <a:t>Syntax (2)</a:t>
-            </a:r>
-            <a:endParaRPr sz="2400" b="1" dirty="0">
-              <a:solidFill>
-                <a:srgbClr val="FFFFFF"/>
-              </a:solidFill>
-            </a:endParaRPr>
-          </a:p>
-        </p:txBody>
-      </p:sp>
-      <p:pic>
-        <p:nvPicPr>
-          <p:cNvPr id="66" name="Google Shape;66;p14"/>
-          <p:cNvPicPr preferRelativeResize="0"/>
-          <p:nvPr/>
-        </p:nvPicPr>
-        <p:blipFill>
-          <a:blip r:embed="rId6">
-            <a:alphaModFix/>
-          </a:blip>
-          <a:stretch>
-            <a:fillRect/>
-          </a:stretch>
-        </p:blipFill>
-        <p:spPr>
-          <a:xfrm>
-            <a:off x="1294867" y="134162"/>
-            <a:ext cx="839900" cy="839875"/>
-          </a:xfrm>
-          <a:prstGeom prst="rect">
-            <a:avLst/>
-          </a:prstGeom>
-          <a:noFill/>
-          <a:ln>
-            <a:noFill/>
-          </a:ln>
-        </p:spPr>
-      </p:pic>
-      <p:sp>
-        <p:nvSpPr>
-          <p:cNvPr id="67" name="Google Shape;67;p14"/>
-          <p:cNvSpPr txBox="1"/>
-          <p:nvPr/>
-        </p:nvSpPr>
-        <p:spPr>
-          <a:xfrm>
-            <a:off x="831172" y="974275"/>
-            <a:ext cx="8061725" cy="4016454"/>
-          </a:xfrm>
-          <a:prstGeom prst="rect">
-            <a:avLst/>
-          </a:prstGeom>
-          <a:noFill/>
-          <a:ln>
-            <a:noFill/>
-          </a:ln>
-        </p:spPr>
-        <p:txBody>
-          <a:bodyPr spcFirstLastPara="1" wrap="square" lIns="91425" tIns="91425" rIns="91425" bIns="91425" anchor="t" anchorCtr="0">
-            <a:spAutoFit/>
-          </a:bodyPr>
-          <a:lstStyle/>
-          <a:p>
-            <a:pPr marL="457200" lvl="0" indent="0" algn="l" rtl="0">
-              <a:spcBef>
-                <a:spcPts val="0"/>
-              </a:spcBef>
-              <a:spcAft>
-                <a:spcPts val="0"/>
-              </a:spcAft>
-              <a:buNone/>
-            </a:pPr>
-            <a:r>
-              <a:rPr lang="en-US" b="1" dirty="0" err="1">
-                <a:solidFill>
-                  <a:schemeClr val="accent4">
-                    <a:lumMod val="60000"/>
-                    <a:lumOff val="40000"/>
-                  </a:schemeClr>
-                </a:solidFill>
-              </a:rPr>
-              <a:t>funptr_parameter_list</a:t>
-            </a:r>
-            <a:endParaRPr lang="en-US" b="1" dirty="0">
-              <a:solidFill>
-                <a:schemeClr val="accent4">
-                  <a:lumMod val="60000"/>
-                  <a:lumOff val="40000"/>
-                </a:schemeClr>
-              </a:solidFill>
-            </a:endParaRPr>
-          </a:p>
-          <a:p>
-            <a:pPr marL="457200" lvl="0" indent="0" algn="l" rtl="0">
-              <a:spcBef>
-                <a:spcPts val="0"/>
-              </a:spcBef>
-              <a:spcAft>
-                <a:spcPts val="0"/>
-              </a:spcAft>
-              <a:buNone/>
-            </a:pPr>
-            <a:r>
-              <a:rPr lang="en-US" b="1" dirty="0">
-                <a:solidFill>
-                  <a:srgbClr val="FFFFFF"/>
-                </a:solidFill>
-              </a:rPr>
-              <a:t>     (</a:t>
-            </a:r>
-            <a:r>
-              <a:rPr lang="en-US" b="1" dirty="0" err="1">
-                <a:solidFill>
-                  <a:schemeClr val="accent6">
-                    <a:lumMod val="60000"/>
-                    <a:lumOff val="40000"/>
-                  </a:schemeClr>
-                </a:solidFill>
-              </a:rPr>
-              <a:t>funcptr_parameter</a:t>
-            </a:r>
-            <a:r>
-              <a:rPr lang="en-US" b="1" dirty="0">
-                <a:solidFill>
-                  <a:srgbClr val="FFFFFF"/>
-                </a:solidFill>
-              </a:rPr>
-              <a:t> ',’)*</a:t>
-            </a:r>
-          </a:p>
-          <a:p>
-            <a:pPr marL="457200" lvl="0" indent="0" algn="l" rtl="0">
-              <a:spcBef>
-                <a:spcPts val="0"/>
-              </a:spcBef>
-              <a:spcAft>
-                <a:spcPts val="0"/>
-              </a:spcAft>
-              <a:buNone/>
-            </a:pPr>
-            <a:endParaRPr lang="en-US" b="1" dirty="0">
-              <a:solidFill>
-                <a:srgbClr val="FFFFFF"/>
-              </a:solidFill>
-            </a:endParaRPr>
-          </a:p>
-          <a:p>
-            <a:pPr marL="457200" lvl="0" indent="0" algn="l" rtl="0">
-              <a:spcBef>
-                <a:spcPts val="0"/>
-              </a:spcBef>
-              <a:spcAft>
-                <a:spcPts val="0"/>
-              </a:spcAft>
-              <a:buNone/>
-            </a:pPr>
-            <a:r>
-              <a:rPr lang="en-US" b="1" dirty="0" err="1">
-                <a:solidFill>
-                  <a:schemeClr val="accent6">
-                    <a:lumMod val="60000"/>
-                    <a:lumOff val="40000"/>
-                  </a:schemeClr>
-                </a:solidFill>
-              </a:rPr>
-              <a:t>funcptr_parameter</a:t>
-            </a:r>
-            <a:endParaRPr lang="en-US" b="1" dirty="0">
-              <a:solidFill>
-                <a:schemeClr val="accent6">
-                  <a:lumMod val="60000"/>
-                  <a:lumOff val="40000"/>
-                </a:schemeClr>
-              </a:solidFill>
-            </a:endParaRPr>
-          </a:p>
-          <a:p>
-            <a:pPr marL="457200" lvl="0" indent="0" algn="l" rtl="0">
-              <a:spcBef>
-                <a:spcPts val="0"/>
-              </a:spcBef>
-              <a:spcAft>
-                <a:spcPts val="0"/>
-              </a:spcAft>
-              <a:buNone/>
-            </a:pPr>
-            <a:r>
-              <a:rPr lang="en-US" b="1" dirty="0">
-                <a:solidFill>
-                  <a:srgbClr val="FFFFFF"/>
-                </a:solidFill>
-              </a:rPr>
-              <a:t>     </a:t>
-            </a:r>
-            <a:r>
-              <a:rPr lang="en-US" b="1" dirty="0" err="1">
-                <a:solidFill>
-                  <a:schemeClr val="accent5">
-                    <a:lumMod val="60000"/>
-                    <a:lumOff val="40000"/>
-                  </a:schemeClr>
-                </a:solidFill>
-              </a:rPr>
-              <a:t>funcptr_parameter_modifier</a:t>
-            </a:r>
-            <a:r>
-              <a:rPr lang="en-US" b="1" dirty="0">
-                <a:solidFill>
-                  <a:srgbClr val="FFFFFF"/>
-                </a:solidFill>
-              </a:rPr>
-              <a:t>? Type</a:t>
-            </a:r>
-          </a:p>
-          <a:p>
-            <a:pPr marL="457200" lvl="0" indent="0" algn="l" rtl="0">
-              <a:spcBef>
-                <a:spcPts val="0"/>
-              </a:spcBef>
-              <a:spcAft>
-                <a:spcPts val="0"/>
-              </a:spcAft>
-              <a:buNone/>
-            </a:pPr>
-            <a:endParaRPr lang="en-US" b="1" dirty="0">
-              <a:solidFill>
-                <a:srgbClr val="FFFFFF"/>
-              </a:solidFill>
-            </a:endParaRPr>
-          </a:p>
-          <a:p>
-            <a:pPr marL="457200" lvl="0" indent="0" algn="l" rtl="0">
-              <a:spcBef>
-                <a:spcPts val="0"/>
-              </a:spcBef>
-              <a:spcAft>
-                <a:spcPts val="0"/>
-              </a:spcAft>
-              <a:buNone/>
-            </a:pPr>
-            <a:r>
-              <a:rPr lang="en-US" b="1" dirty="0" err="1">
-                <a:solidFill>
-                  <a:srgbClr val="C75ECA"/>
-                </a:solidFill>
-              </a:rPr>
-              <a:t>funcptr_return_type</a:t>
-            </a:r>
-            <a:endParaRPr lang="en-US" b="1" dirty="0">
-              <a:solidFill>
-                <a:srgbClr val="C75ECA"/>
-              </a:solidFill>
-            </a:endParaRPr>
-          </a:p>
-          <a:p>
-            <a:pPr marL="457200" lvl="0" indent="0" algn="l" rtl="0">
-              <a:spcBef>
-                <a:spcPts val="0"/>
-              </a:spcBef>
-              <a:spcAft>
-                <a:spcPts val="0"/>
-              </a:spcAft>
-              <a:buNone/>
-            </a:pPr>
-            <a:r>
-              <a:rPr lang="en-US" b="1" dirty="0">
-                <a:solidFill>
-                  <a:srgbClr val="FFFFFF"/>
-                </a:solidFill>
-              </a:rPr>
-              <a:t>     </a:t>
-            </a:r>
-            <a:r>
-              <a:rPr lang="en-US" b="1" dirty="0" err="1">
-                <a:solidFill>
-                  <a:srgbClr val="81DB92"/>
-                </a:solidFill>
-              </a:rPr>
-              <a:t>funcptr_return_modifier</a:t>
-            </a:r>
-            <a:r>
-              <a:rPr lang="en-US" b="1" dirty="0">
-                <a:solidFill>
-                  <a:srgbClr val="FFFFFF"/>
-                </a:solidFill>
-              </a:rPr>
-              <a:t>? </a:t>
-            </a:r>
-            <a:r>
-              <a:rPr lang="en-US" b="1" dirty="0" err="1">
-                <a:solidFill>
-                  <a:srgbClr val="FFFFFF"/>
-                </a:solidFill>
-              </a:rPr>
-              <a:t>return_type</a:t>
-            </a:r>
-            <a:endParaRPr lang="en-US" b="1" dirty="0">
-              <a:solidFill>
-                <a:srgbClr val="FFFFFF"/>
-              </a:solidFill>
-            </a:endParaRPr>
-          </a:p>
-          <a:p>
-            <a:pPr marL="457200" lvl="0" indent="0" algn="l" rtl="0">
-              <a:spcBef>
-                <a:spcPts val="0"/>
-              </a:spcBef>
-              <a:spcAft>
-                <a:spcPts val="0"/>
-              </a:spcAft>
-              <a:buNone/>
-            </a:pPr>
-            <a:endParaRPr lang="en-US" b="1" dirty="0">
-              <a:solidFill>
-                <a:srgbClr val="FFFFFF"/>
-              </a:solidFill>
-            </a:endParaRPr>
-          </a:p>
-          <a:p>
-            <a:pPr marL="457200" lvl="0" indent="0" algn="l" rtl="0">
-              <a:spcBef>
-                <a:spcPts val="0"/>
-              </a:spcBef>
-              <a:spcAft>
-                <a:spcPts val="0"/>
-              </a:spcAft>
-              <a:buNone/>
-            </a:pPr>
-            <a:r>
-              <a:rPr lang="en-US" b="1" dirty="0" err="1">
-                <a:solidFill>
-                  <a:schemeClr val="accent5">
-                    <a:lumMod val="60000"/>
-                    <a:lumOff val="40000"/>
-                  </a:schemeClr>
-                </a:solidFill>
-              </a:rPr>
-              <a:t>funcptr_parameter_modifier</a:t>
-            </a:r>
-            <a:endParaRPr lang="en-US" b="1" dirty="0">
-              <a:solidFill>
-                <a:schemeClr val="accent5">
-                  <a:lumMod val="60000"/>
-                  <a:lumOff val="40000"/>
-                </a:schemeClr>
-              </a:solidFill>
-            </a:endParaRPr>
-          </a:p>
-          <a:p>
-            <a:pPr marL="457200" lvl="0" indent="0" algn="l" rtl="0">
-              <a:spcBef>
-                <a:spcPts val="0"/>
-              </a:spcBef>
-              <a:spcAft>
-                <a:spcPts val="0"/>
-              </a:spcAft>
-              <a:buNone/>
-            </a:pPr>
-            <a:r>
-              <a:rPr lang="en-US" b="1" dirty="0">
-                <a:solidFill>
-                  <a:srgbClr val="FFFFFF"/>
-                </a:solidFill>
-              </a:rPr>
-              <a:t>	</a:t>
-            </a:r>
-            <a:r>
-              <a:rPr lang="en-US" b="1" dirty="0">
-                <a:solidFill>
-                  <a:srgbClr val="FF0000"/>
-                </a:solidFill>
-              </a:rPr>
-              <a:t>ref</a:t>
-            </a:r>
-          </a:p>
-          <a:p>
-            <a:pPr marL="457200" lvl="0" indent="0" algn="l" rtl="0">
-              <a:spcBef>
-                <a:spcPts val="0"/>
-              </a:spcBef>
-              <a:spcAft>
-                <a:spcPts val="0"/>
-              </a:spcAft>
-              <a:buNone/>
-            </a:pPr>
-            <a:r>
-              <a:rPr lang="en-US" b="1" dirty="0">
-                <a:solidFill>
-                  <a:srgbClr val="FF0000"/>
-                </a:solidFill>
-              </a:rPr>
-              <a:t>	out</a:t>
-            </a:r>
-          </a:p>
-          <a:p>
-            <a:pPr marL="457200" lvl="0" indent="0" algn="l" rtl="0">
-              <a:spcBef>
-                <a:spcPts val="0"/>
-              </a:spcBef>
-              <a:spcAft>
-                <a:spcPts val="0"/>
-              </a:spcAft>
-              <a:buNone/>
-            </a:pPr>
-            <a:r>
-              <a:rPr lang="en-US" b="1" dirty="0">
-                <a:solidFill>
-                  <a:srgbClr val="FF0000"/>
-                </a:solidFill>
-              </a:rPr>
-              <a:t>	in</a:t>
-            </a:r>
-          </a:p>
-          <a:p>
-            <a:pPr marL="457200" lvl="0" indent="0" algn="l" rtl="0">
-              <a:spcBef>
-                <a:spcPts val="0"/>
-              </a:spcBef>
-              <a:spcAft>
-                <a:spcPts val="0"/>
-              </a:spcAft>
-              <a:buNone/>
-            </a:pPr>
-            <a:endParaRPr lang="en-US" b="1" dirty="0">
-              <a:solidFill>
-                <a:srgbClr val="FFFFFF"/>
-              </a:solidFill>
-            </a:endParaRPr>
-          </a:p>
-          <a:p>
-            <a:pPr marL="457200" lvl="0" indent="0" algn="l" rtl="0">
-              <a:spcBef>
-                <a:spcPts val="0"/>
-              </a:spcBef>
-              <a:spcAft>
-                <a:spcPts val="0"/>
-              </a:spcAft>
-              <a:buNone/>
-            </a:pPr>
-            <a:r>
-              <a:rPr lang="en-US" b="1" dirty="0" err="1">
-                <a:solidFill>
-                  <a:srgbClr val="81DB92"/>
-                </a:solidFill>
-              </a:rPr>
-              <a:t>funcptr_return_modifier</a:t>
-            </a:r>
-            <a:r>
-              <a:rPr lang="en-US" b="1" dirty="0">
-                <a:solidFill>
-                  <a:srgbClr val="81DB92"/>
-                </a:solidFill>
-              </a:rPr>
-              <a:t> </a:t>
-            </a:r>
-            <a:r>
-              <a:rPr lang="en-US" b="1" dirty="0">
-                <a:solidFill>
-                  <a:srgbClr val="FFFFFF"/>
-                </a:solidFill>
-              </a:rPr>
-              <a:t>	</a:t>
-            </a:r>
-          </a:p>
-          <a:p>
-            <a:pPr marL="457200" lvl="0" indent="0" algn="l" rtl="0">
-              <a:spcBef>
-                <a:spcPts val="0"/>
-              </a:spcBef>
-              <a:spcAft>
-                <a:spcPts val="0"/>
-              </a:spcAft>
-              <a:buNone/>
-            </a:pPr>
-            <a:r>
-              <a:rPr lang="en-US" b="1" dirty="0">
-                <a:solidFill>
-                  <a:srgbClr val="FFFFFF"/>
-                </a:solidFill>
-              </a:rPr>
-              <a:t>	</a:t>
-            </a:r>
-            <a:r>
-              <a:rPr lang="en-US" b="1" dirty="0">
-                <a:solidFill>
-                  <a:srgbClr val="FF0000"/>
-                </a:solidFill>
-              </a:rPr>
-              <a:t>ref</a:t>
-            </a:r>
-          </a:p>
-          <a:p>
-            <a:pPr marL="457200" lvl="0" indent="0" algn="l" rtl="0">
-              <a:spcBef>
-                <a:spcPts val="0"/>
-              </a:spcBef>
-              <a:spcAft>
-                <a:spcPts val="0"/>
-              </a:spcAft>
-              <a:buNone/>
-            </a:pPr>
-            <a:r>
-              <a:rPr lang="en-US" b="1" dirty="0">
-                <a:solidFill>
-                  <a:srgbClr val="FF0000"/>
-                </a:solidFill>
-              </a:rPr>
-              <a:t>	ref </a:t>
-            </a:r>
-            <a:r>
-              <a:rPr lang="en-US" b="1" dirty="0" err="1">
-                <a:solidFill>
-                  <a:srgbClr val="FF0000"/>
-                </a:solidFill>
-              </a:rPr>
-              <a:t>readonly</a:t>
-            </a:r>
-            <a:endParaRPr lang="en-US" b="1" dirty="0">
-              <a:solidFill>
-                <a:srgbClr val="FF0000"/>
-              </a:solidFill>
-            </a:endParaRPr>
-          </a:p>
-          <a:p>
-            <a:pPr marL="457200" lvl="0" indent="0" algn="l" rtl="0">
-              <a:spcBef>
-                <a:spcPts val="0"/>
-              </a:spcBef>
-              <a:spcAft>
-                <a:spcPts val="0"/>
-              </a:spcAft>
-              <a:buNone/>
-            </a:pPr>
-            <a:r>
-              <a:rPr lang="en-US" sz="1100" b="1" dirty="0">
-                <a:solidFill>
-                  <a:srgbClr val="FFFFFF"/>
-                </a:solidFill>
-              </a:rPr>
-              <a:t>    </a:t>
-            </a:r>
-          </a:p>
-        </p:txBody>
-      </p:sp>
-    </p:spTree>
-    <p:extLst>
-      <p:ext uri="{BB962C8B-B14F-4D97-AF65-F5344CB8AC3E}">
-        <p14:creationId xmlns:p14="http://schemas.microsoft.com/office/powerpoint/2010/main" val="3805115152"/>
-      </p:ext>
-    </p:extLst>
-  </p:cSld>
-  <p:clrMapOvr>
-    <a:masterClrMapping/>
-  </p:clrMapOvr>
-</p:sld>
-</file>
-
-<file path=ppt/slides/slide5.xml><?xml version="1.0" encoding="utf-8"?>
 <p:sld xmlns:a="http://schemas.openxmlformats.org/drawingml/2006/main" xmlns:r="http://schemas.openxmlformats.org/officeDocument/2006/relationships" xmlns:p="http://schemas.openxmlformats.org/presentationml/2006/main">
   <p:cSld>
     <p:spTree>
@@ -9150,7 +8518,7 @@
 </p:sld>
 </file>
 
-<file path=ppt/slides/slide6.xml><?xml version="1.0" encoding="utf-8"?>
+<file path=ppt/slides/slide5.xml><?xml version="1.0" encoding="utf-8"?>
 <p:sld xmlns:a="http://schemas.openxmlformats.org/drawingml/2006/main" xmlns:r="http://schemas.openxmlformats.org/officeDocument/2006/relationships" xmlns:p="http://schemas.openxmlformats.org/presentationml/2006/main">
   <p:cSld>
     <p:spTree>
@@ -9258,13 +8626,13 @@
           <p:nvPr>
             <p:extLst>
               <p:ext uri="{D42A27DB-BD31-4B8C-83A1-F6EECF244321}">
-                <p14:modId xmlns:p14="http://schemas.microsoft.com/office/powerpoint/2010/main" val="1272560463"/>
+                <p14:modId xmlns:p14="http://schemas.microsoft.com/office/powerpoint/2010/main" val="2324381549"/>
               </p:ext>
             </p:extLst>
           </p:nvPr>
         </p:nvGraphicFramePr>
         <p:xfrm>
-          <a:off x="562074" y="1135175"/>
+          <a:off x="531151" y="819170"/>
           <a:ext cx="8081698" cy="3715250"/>
         </p:xfrm>
         <a:graphic>
@@ -10348,7 +9716,7 @@
 </p:sld>
 </file>
 
-<file path=ppt/slides/slide7.xml><?xml version="1.0" encoding="utf-8"?>
+<file path=ppt/slides/slide6.xml><?xml version="1.0" encoding="utf-8"?>
 <p:sld xmlns:a="http://schemas.openxmlformats.org/drawingml/2006/main" xmlns:r="http://schemas.openxmlformats.org/officeDocument/2006/relationships" xmlns:p="http://schemas.openxmlformats.org/presentationml/2006/main">
   <p:cSld>
     <p:spTree>
@@ -10531,7 +9899,7 @@
 </p:sld>
 </file>
 
-<file path=ppt/slides/slide8.xml><?xml version="1.0" encoding="utf-8"?>
+<file path=ppt/slides/slide7.xml><?xml version="1.0" encoding="utf-8"?>
 <p:sld xmlns:a="http://schemas.openxmlformats.org/drawingml/2006/main" xmlns:r="http://schemas.openxmlformats.org/officeDocument/2006/relationships" xmlns:p="http://schemas.openxmlformats.org/presentationml/2006/main">
   <p:cSld>
     <p:spTree>
@@ -10934,7 +10302,10 @@
             <a:r>
               <a:rPr lang="en" sz="1900" b="1" dirty="0">
                 <a:solidFill>
-                  <a:srgbClr val="FF0000"/>
+                  <a:schemeClr val="accent5">
+                    <a:lumMod val="20000"/>
+                    <a:lumOff val="80000"/>
+                  </a:schemeClr>
                 </a:solidFill>
               </a:rPr>
               <a:t>function pointer A </a:t>
@@ -10950,10 +10321,21 @@
             <a:r>
               <a:rPr lang="en" sz="1900" b="1" dirty="0">
                 <a:solidFill>
+                  <a:schemeClr val="accent5">
+                    <a:lumMod val="20000"/>
+                    <a:lumOff val="80000"/>
+                  </a:schemeClr>
+                </a:solidFill>
+              </a:rPr>
+              <a:t>function pointer B</a:t>
+            </a:r>
+            <a:r>
+              <a:rPr lang="en" sz="1900" b="1" dirty="0">
+                <a:solidFill>
                   <a:srgbClr val="FF0000"/>
                 </a:solidFill>
               </a:rPr>
-              <a:t>function pointer B </a:t>
+              <a:t> </a:t>
             </a:r>
             <a:r>
               <a:rPr lang="en" sz="1900" b="1" dirty="0">
@@ -11002,6 +10384,245 @@
     <p:extLst>
       <p:ext uri="{BB962C8B-B14F-4D97-AF65-F5344CB8AC3E}">
         <p14:creationId xmlns:p14="http://schemas.microsoft.com/office/powerpoint/2010/main" val="253986792"/>
+      </p:ext>
+    </p:extLst>
+  </p:cSld>
+  <p:clrMapOvr>
+    <a:masterClrMapping/>
+  </p:clrMapOvr>
+</p:sld>
+</file>
+
+<file path=ppt/slides/slide8.xml><?xml version="1.0" encoding="utf-8"?>
+<p:sld xmlns:a="http://schemas.openxmlformats.org/drawingml/2006/main" xmlns:r="http://schemas.openxmlformats.org/officeDocument/2006/relationships" xmlns:p="http://schemas.openxmlformats.org/presentationml/2006/main">
+  <p:cSld>
+    <p:spTree>
+      <p:nvGrpSpPr>
+        <p:cNvPr id="1" name="Shape 71"/>
+        <p:cNvGrpSpPr/>
+        <p:nvPr/>
+      </p:nvGrpSpPr>
+      <p:grpSpPr>
+        <a:xfrm>
+          <a:off x="0" y="0"/>
+          <a:ext cx="0" cy="0"/>
+          <a:chOff x="0" y="0"/>
+          <a:chExt cx="0" cy="0"/>
+        </a:xfrm>
+      </p:grpSpPr>
+      <p:pic>
+        <p:nvPicPr>
+          <p:cNvPr id="72" name="Google Shape;72;p15"/>
+          <p:cNvPicPr preferRelativeResize="0"/>
+          <p:nvPr/>
+        </p:nvPicPr>
+        <p:blipFill>
+          <a:blip r:embed="rId3">
+            <a:alphaModFix/>
+          </a:blip>
+          <a:stretch>
+            <a:fillRect/>
+          </a:stretch>
+        </p:blipFill>
+        <p:spPr>
+          <a:xfrm>
+            <a:off x="0" y="0"/>
+            <a:ext cx="9144000" cy="5143500"/>
+          </a:xfrm>
+          <a:prstGeom prst="rect">
+            <a:avLst/>
+          </a:prstGeom>
+          <a:noFill/>
+          <a:ln>
+            <a:noFill/>
+          </a:ln>
+        </p:spPr>
+      </p:pic>
+      <p:pic>
+        <p:nvPicPr>
+          <p:cNvPr id="73" name="Google Shape;73;p15"/>
+          <p:cNvPicPr preferRelativeResize="0"/>
+          <p:nvPr/>
+        </p:nvPicPr>
+        <p:blipFill>
+          <a:blip r:embed="rId4">
+            <a:alphaModFix/>
+          </a:blip>
+          <a:stretch>
+            <a:fillRect/>
+          </a:stretch>
+        </p:blipFill>
+        <p:spPr>
+          <a:xfrm>
+            <a:off x="7685125" y="4591675"/>
+            <a:ext cx="1371926" cy="441325"/>
+          </a:xfrm>
+          <a:prstGeom prst="rect">
+            <a:avLst/>
+          </a:prstGeom>
+          <a:noFill/>
+          <a:ln>
+            <a:noFill/>
+          </a:ln>
+        </p:spPr>
+      </p:pic>
+      <p:pic>
+        <p:nvPicPr>
+          <p:cNvPr id="74" name="Google Shape;74;p15"/>
+          <p:cNvPicPr preferRelativeResize="0"/>
+          <p:nvPr/>
+        </p:nvPicPr>
+        <p:blipFill>
+          <a:blip r:embed="rId5">
+            <a:alphaModFix/>
+          </a:blip>
+          <a:stretch>
+            <a:fillRect/>
+          </a:stretch>
+        </p:blipFill>
+        <p:spPr>
+          <a:xfrm>
+            <a:off x="-50250" y="0"/>
+            <a:ext cx="1224649" cy="1135175"/>
+          </a:xfrm>
+          <a:prstGeom prst="rect">
+            <a:avLst/>
+          </a:prstGeom>
+          <a:noFill/>
+          <a:ln>
+            <a:noFill/>
+          </a:ln>
+        </p:spPr>
+      </p:pic>
+      <p:sp>
+        <p:nvSpPr>
+          <p:cNvPr id="75" name="Google Shape;75;p15"/>
+          <p:cNvSpPr txBox="1"/>
+          <p:nvPr/>
+        </p:nvSpPr>
+        <p:spPr>
+          <a:xfrm>
+            <a:off x="838223" y="673525"/>
+            <a:ext cx="7290900" cy="923299"/>
+          </a:xfrm>
+          <a:prstGeom prst="rect">
+            <a:avLst/>
+          </a:prstGeom>
+          <a:noFill/>
+          <a:ln>
+            <a:noFill/>
+          </a:ln>
+        </p:spPr>
+        <p:txBody>
+          <a:bodyPr spcFirstLastPara="1" wrap="square" lIns="91425" tIns="91425" rIns="91425" bIns="91425" anchor="t" anchorCtr="0">
+            <a:spAutoFit/>
+          </a:bodyPr>
+          <a:lstStyle/>
+          <a:p>
+            <a:pPr marL="0" lvl="0" indent="0" algn="ctr" rtl="0">
+              <a:spcBef>
+                <a:spcPts val="0"/>
+              </a:spcBef>
+              <a:spcAft>
+                <a:spcPts val="0"/>
+              </a:spcAft>
+              <a:buNone/>
+            </a:pPr>
+            <a:r>
+              <a:rPr lang="en" sz="2400" b="1" dirty="0">
+                <a:solidFill>
+                  <a:srgbClr val="FFFFFF"/>
+                </a:solidFill>
+              </a:rPr>
+              <a:t>Function pointer conversion</a:t>
+            </a:r>
+          </a:p>
+          <a:p>
+            <a:pPr marL="0" lvl="0" indent="0" algn="ctr" rtl="0">
+              <a:spcBef>
+                <a:spcPts val="0"/>
+              </a:spcBef>
+              <a:spcAft>
+                <a:spcPts val="0"/>
+              </a:spcAft>
+              <a:buNone/>
+            </a:pPr>
+            <a:r>
+              <a:rPr lang="en" sz="2400" b="1" dirty="0">
+                <a:solidFill>
+                  <a:srgbClr val="FFFFFF"/>
+                </a:solidFill>
+              </a:rPr>
+              <a:t>(implicit)</a:t>
+            </a:r>
+            <a:endParaRPr sz="2400" b="1" dirty="0">
+              <a:solidFill>
+                <a:srgbClr val="FFFFFF"/>
+              </a:solidFill>
+            </a:endParaRPr>
+          </a:p>
+        </p:txBody>
+      </p:sp>
+      <p:sp>
+        <p:nvSpPr>
+          <p:cNvPr id="6" name="Google Shape;75;p15">
+            <a:extLst>
+              <a:ext uri="{FF2B5EF4-FFF2-40B4-BE49-F238E27FC236}">
+                <a16:creationId xmlns:a16="http://schemas.microsoft.com/office/drawing/2014/main" id="{7CFE1217-B98E-4247-90AD-8768C8687045}"/>
+              </a:ext>
+            </a:extLst>
+          </p:cNvPr>
+          <p:cNvSpPr txBox="1"/>
+          <p:nvPr/>
+        </p:nvSpPr>
+        <p:spPr>
+          <a:xfrm>
+            <a:off x="775470" y="2270349"/>
+            <a:ext cx="7290900" cy="553968"/>
+          </a:xfrm>
+          <a:prstGeom prst="rect">
+            <a:avLst/>
+          </a:prstGeom>
+          <a:noFill/>
+          <a:ln>
+            <a:noFill/>
+          </a:ln>
+        </p:spPr>
+        <p:txBody>
+          <a:bodyPr spcFirstLastPara="1" wrap="square" lIns="91425" tIns="91425" rIns="91425" bIns="91425" anchor="t" anchorCtr="0">
+            <a:spAutoFit/>
+          </a:bodyPr>
+          <a:lstStyle/>
+          <a:p>
+            <a:pPr marL="0" lvl="0" indent="0" algn="ctr" rtl="0">
+              <a:spcBef>
+                <a:spcPts val="0"/>
+              </a:spcBef>
+              <a:spcAft>
+                <a:spcPts val="0"/>
+              </a:spcAft>
+              <a:buNone/>
+            </a:pPr>
+            <a:r>
+              <a:rPr lang="en" sz="2400" b="1" dirty="0">
+                <a:solidFill>
+                  <a:srgbClr val="FFFFFF"/>
+                </a:solidFill>
+              </a:rPr>
+              <a:t>EXAMPLE</a:t>
+            </a:r>
+            <a:endParaRPr sz="2400" b="1" dirty="0">
+              <a:solidFill>
+                <a:srgbClr val="FFFFFF"/>
+              </a:solidFill>
+            </a:endParaRPr>
+          </a:p>
+        </p:txBody>
+      </p:sp>
+    </p:spTree>
+    <p:extLst>
+      <p:ext uri="{BB962C8B-B14F-4D97-AF65-F5344CB8AC3E}">
+        <p14:creationId xmlns:p14="http://schemas.microsoft.com/office/powerpoint/2010/main" val="681903325"/>
       </p:ext>
     </p:extLst>
   </p:cSld>
@@ -11120,8 +10741,8 @@
         </p:nvSpPr>
         <p:spPr>
           <a:xfrm>
-            <a:off x="838223" y="673525"/>
-            <a:ext cx="7290900" cy="923299"/>
+            <a:off x="926550" y="1187902"/>
+            <a:ext cx="7290900" cy="553968"/>
           </a:xfrm>
           <a:prstGeom prst="rect">
             <a:avLst/>
@@ -11152,26 +10773,7 @@
                   <a:srgbClr val="FFFFFF"/>
                 </a:solidFill>
               </a:rPr>
-              <a:t>Function pointer conversion</a:t>
-            </a:r>
-          </a:p>
-          <a:p>
-            <a:pPr marL="0" lvl="0" indent="0" algn="ctr" rtl="0">
-              <a:spcBef>
-                <a:spcPts val="0"/>
-              </a:spcBef>
-              <a:spcAft>
-                <a:spcPts val="0"/>
-              </a:spcAft>
-              <a:buNone/>
-            </a:pPr>
-            <a:r>
-              <a:rPr lang="en" sz="2400" b="1" dirty="0">
-                <a:solidFill>
-                  <a:srgbClr val="FFFFFF"/>
-                </a:solidFill>
-              </a:rPr>
-              <a:t>(implicit)</a:t>
+              <a:t>Assign target methods to function pointers</a:t>
             </a:r>
             <a:endParaRPr sz="2400" b="1" dirty="0">
               <a:solidFill>
@@ -11240,7 +10842,7 @@
     </p:spTree>
     <p:extLst>
       <p:ext uri="{BB962C8B-B14F-4D97-AF65-F5344CB8AC3E}">
-        <p14:creationId xmlns:p14="http://schemas.microsoft.com/office/powerpoint/2010/main" val="681903325"/>
+        <p14:creationId xmlns:p14="http://schemas.microsoft.com/office/powerpoint/2010/main" val="906761070"/>
       </p:ext>
     </p:extLst>
   </p:cSld>

</xml_diff>

<commit_message>
function ptr | update
</commit_message>
<xml_diff>
--- a/FunctionPointer/Function Pointers proviz.pptx
+++ b/FunctionPointer/Function Pointers proviz.pptx
@@ -10609,7 +10609,7 @@
                   <a:srgbClr val="FFFFFF"/>
                 </a:solidFill>
               </a:rPr>
-              <a:t>EXAMPLE</a:t>
+              <a:t>DEMO</a:t>
             </a:r>
             <a:endParaRPr sz="2400" b="1" dirty="0">
               <a:solidFill>
@@ -10829,7 +10829,7 @@
                   <a:srgbClr val="FFFFFF"/>
                 </a:solidFill>
               </a:rPr>
-              <a:t>EXAMPLE</a:t>
+              <a:t>DEMO</a:t>
             </a:r>
             <a:endParaRPr sz="2400" b="1" dirty="0">
               <a:solidFill>

</xml_diff>

<commit_message>
func ptr | practical example interop
</commit_message>
<xml_diff>
--- a/FunctionPointer/Function Pointers proviz.pptx
+++ b/FunctionPointer/Function Pointers proviz.pptx
@@ -6787,7 +6787,7 @@
         <p:spPr>
           <a:xfrm>
             <a:off x="926550" y="1187902"/>
-            <a:ext cx="7290900" cy="923299"/>
+            <a:ext cx="7290900" cy="553968"/>
           </a:xfrm>
           <a:prstGeom prst="rect">
             <a:avLst/>
@@ -6818,15 +6818,7 @@
                   <a:srgbClr val="FFFFFF"/>
                 </a:solidFill>
               </a:rPr>
-              <a:t>Function pointers vs delegates </a:t>
-            </a:r>
-            <a:r>
-              <a:rPr lang="en" sz="2400" b="1">
-                <a:solidFill>
-                  <a:srgbClr val="FFFFFF"/>
-                </a:solidFill>
-              </a:rPr>
-              <a:t>performance results</a:t>
+              <a:t>Function pointers practical example</a:t>
             </a:r>
             <a:endParaRPr sz="2400" b="1" dirty="0">
               <a:solidFill>
@@ -6877,12 +6869,12 @@
               <a:buNone/>
             </a:pPr>
             <a:r>
-              <a:rPr lang="en" sz="2400" b="1" dirty="0">
+              <a:rPr lang="en" sz="2400" b="1">
                 <a:solidFill>
                   <a:srgbClr val="FFFFFF"/>
                 </a:solidFill>
               </a:rPr>
-              <a:t>TBD</a:t>
+              <a:t>DEMO</a:t>
             </a:r>
             <a:endParaRPr sz="2400" b="1" dirty="0">
               <a:solidFill>

</xml_diff>